<commit_message>
MAJ Prog Android + Diapo
</commit_message>
<xml_diff>
--- a/suivi_perso/dylan/PresentationOralBlancAnglais.pptx
+++ b/suivi_perso/dylan/PresentationOralBlancAnglais.pptx
@@ -6,6 +6,15 @@
   </p:sldMasterIdLst>
   <p:sldIdLst>
     <p:sldId id="256" r:id="rId2"/>
+    <p:sldId id="258" r:id="rId3"/>
+    <p:sldId id="257" r:id="rId4"/>
+    <p:sldId id="259" r:id="rId5"/>
+    <p:sldId id="260" r:id="rId6"/>
+    <p:sldId id="264" r:id="rId7"/>
+    <p:sldId id="262" r:id="rId8"/>
+    <p:sldId id="263" r:id="rId9"/>
+    <p:sldId id="265" r:id="rId10"/>
+    <p:sldId id="266" r:id="rId11"/>
   </p:sldIdLst>
   <p:sldSz cx="12192000" cy="6858000"/>
   <p:notesSz cx="6858000" cy="9144000"/>
@@ -104,7 +113,24 @@
       </a:defRPr>
     </a:lvl9pPr>
   </p:defaultTextStyle>
+  <p:extLst>
+    <p:ext uri="{EFAFB233-063F-42B5-8137-9DF3F51BA10A}">
+      <p15:sldGuideLst xmlns:p15="http://schemas.microsoft.com/office/powerpoint/2012/main"/>
+    </p:ext>
+  </p:extLst>
 </p:presentation>
+</file>
+
+<file path=ppt/commentAuthors.xml><?xml version="1.0" encoding="utf-8"?>
+<p:cmAuthorLst xmlns:a="http://schemas.openxmlformats.org/drawingml/2006/main" xmlns:r="http://schemas.openxmlformats.org/officeDocument/2006/relationships" xmlns:p="http://schemas.openxmlformats.org/presentationml/2006/main">
+  <p:cmAuthor id="1" name="Dylan CHESNOUARD" initials="DC" lastIdx="4" clrIdx="0">
+    <p:extLst>
+      <p:ext uri="{19B8F6BF-5375-455C-9EA6-DF929625EA0E}">
+        <p15:presenceInfo xmlns:p15="http://schemas.microsoft.com/office/powerpoint/2012/main" userId="Dylan CHESNOUARD" providerId="None"/>
+      </p:ext>
+    </p:extLst>
+  </p:cmAuthor>
+</p:cmAuthorLst>
 </file>
 
 <file path=ppt/revisionInfo.xml><?xml version="1.0" encoding="utf-8"?>
@@ -258,7 +284,7 @@
           <a:p>
             <a:fld id="{10B85A56-F36F-4DFA-B56B-1C4E0C922ADC}" type="datetimeFigureOut">
               <a:rPr lang="fr-FR" smtClean="0"/>
-              <a:t>03/04/2018</a:t>
+              <a:t>10/04/2018</a:t>
             </a:fld>
             <a:endParaRPr lang="fr-FR"/>
           </a:p>
@@ -456,7 +482,7 @@
           <a:p>
             <a:fld id="{10B85A56-F36F-4DFA-B56B-1C4E0C922ADC}" type="datetimeFigureOut">
               <a:rPr lang="fr-FR" smtClean="0"/>
-              <a:t>03/04/2018</a:t>
+              <a:t>10/04/2018</a:t>
             </a:fld>
             <a:endParaRPr lang="fr-FR"/>
           </a:p>
@@ -664,7 +690,7 @@
           <a:p>
             <a:fld id="{10B85A56-F36F-4DFA-B56B-1C4E0C922ADC}" type="datetimeFigureOut">
               <a:rPr lang="fr-FR" smtClean="0"/>
-              <a:t>03/04/2018</a:t>
+              <a:t>10/04/2018</a:t>
             </a:fld>
             <a:endParaRPr lang="fr-FR"/>
           </a:p>
@@ -862,7 +888,7 @@
           <a:p>
             <a:fld id="{10B85A56-F36F-4DFA-B56B-1C4E0C922ADC}" type="datetimeFigureOut">
               <a:rPr lang="fr-FR" smtClean="0"/>
-              <a:t>03/04/2018</a:t>
+              <a:t>10/04/2018</a:t>
             </a:fld>
             <a:endParaRPr lang="fr-FR"/>
           </a:p>
@@ -1137,7 +1163,7 @@
           <a:p>
             <a:fld id="{10B85A56-F36F-4DFA-B56B-1C4E0C922ADC}" type="datetimeFigureOut">
               <a:rPr lang="fr-FR" smtClean="0"/>
-              <a:t>03/04/2018</a:t>
+              <a:t>10/04/2018</a:t>
             </a:fld>
             <a:endParaRPr lang="fr-FR"/>
           </a:p>
@@ -1402,7 +1428,7 @@
           <a:p>
             <a:fld id="{10B85A56-F36F-4DFA-B56B-1C4E0C922ADC}" type="datetimeFigureOut">
               <a:rPr lang="fr-FR" smtClean="0"/>
-              <a:t>03/04/2018</a:t>
+              <a:t>10/04/2018</a:t>
             </a:fld>
             <a:endParaRPr lang="fr-FR"/>
           </a:p>
@@ -1814,7 +1840,7 @@
           <a:p>
             <a:fld id="{10B85A56-F36F-4DFA-B56B-1C4E0C922ADC}" type="datetimeFigureOut">
               <a:rPr lang="fr-FR" smtClean="0"/>
-              <a:t>03/04/2018</a:t>
+              <a:t>10/04/2018</a:t>
             </a:fld>
             <a:endParaRPr lang="fr-FR"/>
           </a:p>
@@ -1955,7 +1981,7 @@
           <a:p>
             <a:fld id="{10B85A56-F36F-4DFA-B56B-1C4E0C922ADC}" type="datetimeFigureOut">
               <a:rPr lang="fr-FR" smtClean="0"/>
-              <a:t>03/04/2018</a:t>
+              <a:t>10/04/2018</a:t>
             </a:fld>
             <a:endParaRPr lang="fr-FR"/>
           </a:p>
@@ -2068,7 +2094,7 @@
           <a:p>
             <a:fld id="{10B85A56-F36F-4DFA-B56B-1C4E0C922ADC}" type="datetimeFigureOut">
               <a:rPr lang="fr-FR" smtClean="0"/>
-              <a:t>03/04/2018</a:t>
+              <a:t>10/04/2018</a:t>
             </a:fld>
             <a:endParaRPr lang="fr-FR"/>
           </a:p>
@@ -2379,7 +2405,7 @@
           <a:p>
             <a:fld id="{10B85A56-F36F-4DFA-B56B-1C4E0C922ADC}" type="datetimeFigureOut">
               <a:rPr lang="fr-FR" smtClean="0"/>
-              <a:t>03/04/2018</a:t>
+              <a:t>10/04/2018</a:t>
             </a:fld>
             <a:endParaRPr lang="fr-FR"/>
           </a:p>
@@ -2667,7 +2693,7 @@
           <a:p>
             <a:fld id="{10B85A56-F36F-4DFA-B56B-1C4E0C922ADC}" type="datetimeFigureOut">
               <a:rPr lang="fr-FR" smtClean="0"/>
-              <a:t>03/04/2018</a:t>
+              <a:t>10/04/2018</a:t>
             </a:fld>
             <a:endParaRPr lang="fr-FR"/>
           </a:p>
@@ -2908,7 +2934,7 @@
           <a:p>
             <a:fld id="{10B85A56-F36F-4DFA-B56B-1C4E0C922ADC}" type="datetimeFigureOut">
               <a:rPr lang="fr-FR" smtClean="0"/>
-              <a:t>03/04/2018</a:t>
+              <a:t>10/04/2018</a:t>
             </a:fld>
             <a:endParaRPr lang="fr-FR"/>
           </a:p>
@@ -3327,58 +3353,3604 @@
       </p:grpSpPr>
       <p:sp>
         <p:nvSpPr>
-          <p:cNvPr id="2" name="Titre 1">
-            <a:extLst>
-              <a:ext uri="{FF2B5EF4-FFF2-40B4-BE49-F238E27FC236}">
-                <a16:creationId xmlns:a16="http://schemas.microsoft.com/office/drawing/2014/main" id="{1AA9B497-AAEC-45C2-BD5F-8C7CC9E21F65}"/>
-              </a:ext>
-            </a:extLst>
-          </p:cNvPr>
-          <p:cNvSpPr>
-            <a:spLocks noGrp="1"/>
-          </p:cNvSpPr>
-          <p:nvPr>
-            <p:ph type="ctrTitle"/>
-          </p:nvPr>
-        </p:nvSpPr>
-        <p:spPr/>
-        <p:txBody>
-          <a:bodyPr/>
-          <a:lstStyle/>
-          <a:p>
+          <p:cNvPr id="11" name="Rectangle 10">
+            <a:extLst>
+              <a:ext uri="{FF2B5EF4-FFF2-40B4-BE49-F238E27FC236}">
+                <a16:creationId xmlns:a16="http://schemas.microsoft.com/office/drawing/2014/main" id="{B927D553-96A4-4DB1-BDC6-F2F65CC5B8B6}"/>
+              </a:ext>
+            </a:extLst>
+          </p:cNvPr>
+          <p:cNvSpPr/>
+          <p:nvPr/>
+        </p:nvSpPr>
+        <p:spPr>
+          <a:xfrm>
+            <a:off x="0" y="5486400"/>
+            <a:ext cx="12192000" cy="1371600"/>
+          </a:xfrm>
+          <a:prstGeom prst="rect">
+            <a:avLst/>
+          </a:prstGeom>
+          <a:solidFill>
+            <a:srgbClr val="E6E6E6"/>
+          </a:solidFill>
+          <a:ln>
+            <a:noFill/>
+          </a:ln>
+        </p:spPr>
+        <p:style>
+          <a:lnRef idx="2">
+            <a:schemeClr val="accent1">
+              <a:shade val="50000"/>
+            </a:schemeClr>
+          </a:lnRef>
+          <a:fillRef idx="1">
+            <a:schemeClr val="accent1"/>
+          </a:fillRef>
+          <a:effectRef idx="0">
+            <a:schemeClr val="accent1"/>
+          </a:effectRef>
+          <a:fontRef idx="minor">
+            <a:schemeClr val="lt1"/>
+          </a:fontRef>
+        </p:style>
+        <p:txBody>
+          <a:bodyPr rtlCol="0" anchor="ctr"/>
+          <a:lstStyle/>
+          <a:p>
+            <a:pPr algn="ctr"/>
             <a:endParaRPr lang="fr-FR"/>
           </a:p>
         </p:txBody>
       </p:sp>
-      <p:sp>
-        <p:nvSpPr>
-          <p:cNvPr id="3" name="Sous-titre 2">
-            <a:extLst>
-              <a:ext uri="{FF2B5EF4-FFF2-40B4-BE49-F238E27FC236}">
-                <a16:creationId xmlns:a16="http://schemas.microsoft.com/office/drawing/2014/main" id="{64E1472A-AFEC-4491-BC69-64C38197AA05}"/>
-              </a:ext>
-            </a:extLst>
-          </p:cNvPr>
-          <p:cNvSpPr>
-            <a:spLocks noGrp="1"/>
-          </p:cNvSpPr>
-          <p:nvPr>
-            <p:ph type="subTitle" idx="1"/>
-          </p:nvPr>
-        </p:nvSpPr>
-        <p:spPr/>
-        <p:txBody>
-          <a:bodyPr/>
-          <a:lstStyle/>
-          <a:p>
-            <a:endParaRPr lang="fr-FR"/>
-          </a:p>
-        </p:txBody>
-      </p:sp>
+      <p:pic>
+        <p:nvPicPr>
+          <p:cNvPr id="4" name="Image 3">
+            <a:extLst>
+              <a:ext uri="{FF2B5EF4-FFF2-40B4-BE49-F238E27FC236}">
+                <a16:creationId xmlns:a16="http://schemas.microsoft.com/office/drawing/2014/main" id="{5D45E8A9-F632-4159-A665-30C394869018}"/>
+              </a:ext>
+            </a:extLst>
+          </p:cNvPr>
+          <p:cNvPicPr>
+            <a:picLocks noChangeAspect="1"/>
+          </p:cNvPicPr>
+          <p:nvPr/>
+        </p:nvPicPr>
+        <p:blipFill>
+          <a:blip r:embed="rId2"/>
+          <a:stretch>
+            <a:fillRect/>
+          </a:stretch>
+        </p:blipFill>
+        <p:spPr>
+          <a:xfrm>
+            <a:off x="3364983" y="1050084"/>
+            <a:ext cx="5462034" cy="1086627"/>
+          </a:xfrm>
+          <a:prstGeom prst="rect">
+            <a:avLst/>
+          </a:prstGeom>
+        </p:spPr>
+      </p:pic>
+      <p:sp>
+        <p:nvSpPr>
+          <p:cNvPr id="7" name="ZoneTexte 6">
+            <a:extLst>
+              <a:ext uri="{FF2B5EF4-FFF2-40B4-BE49-F238E27FC236}">
+                <a16:creationId xmlns:a16="http://schemas.microsoft.com/office/drawing/2014/main" id="{8A83B0E7-815F-4DE7-A10A-D297AB3A2E64}"/>
+              </a:ext>
+            </a:extLst>
+          </p:cNvPr>
+          <p:cNvSpPr txBox="1"/>
+          <p:nvPr/>
+        </p:nvSpPr>
+        <p:spPr>
+          <a:xfrm>
+            <a:off x="4756883" y="2597497"/>
+            <a:ext cx="2678234" cy="307777"/>
+          </a:xfrm>
+          <a:prstGeom prst="rect">
+            <a:avLst/>
+          </a:prstGeom>
+          <a:noFill/>
+        </p:spPr>
+        <p:txBody>
+          <a:bodyPr wrap="none" rtlCol="0">
+            <a:spAutoFit/>
+          </a:bodyPr>
+          <a:lstStyle/>
+          <a:p>
+            <a:r>
+              <a:rPr lang="fr-FR" sz="1400" dirty="0">
+                <a:latin typeface="Myriad Pro" panose="020B0503030403020204" pitchFamily="34" charset="0"/>
+              </a:rPr>
+              <a:t>Maître de stage : MAJOLET Cédric</a:t>
+            </a:r>
+          </a:p>
+        </p:txBody>
+      </p:sp>
+      <p:sp>
+        <p:nvSpPr>
+          <p:cNvPr id="9" name="ZoneTexte 8">
+            <a:extLst>
+              <a:ext uri="{FF2B5EF4-FFF2-40B4-BE49-F238E27FC236}">
+                <a16:creationId xmlns:a16="http://schemas.microsoft.com/office/drawing/2014/main" id="{14C83C55-624F-4F28-82AF-5759AB3E6CE4}"/>
+              </a:ext>
+            </a:extLst>
+          </p:cNvPr>
+          <p:cNvSpPr txBox="1"/>
+          <p:nvPr/>
+        </p:nvSpPr>
+        <p:spPr>
+          <a:xfrm>
+            <a:off x="4841650" y="4077333"/>
+            <a:ext cx="2508700" cy="400110"/>
+          </a:xfrm>
+          <a:prstGeom prst="rect">
+            <a:avLst/>
+          </a:prstGeom>
+          <a:noFill/>
+        </p:spPr>
+        <p:txBody>
+          <a:bodyPr wrap="none" rtlCol="0">
+            <a:spAutoFit/>
+          </a:bodyPr>
+          <a:lstStyle/>
+          <a:p>
+            <a:r>
+              <a:rPr lang="fr-FR" sz="2000" b="1" dirty="0">
+                <a:latin typeface="Myriad Pro" panose="020B0503030403020204" pitchFamily="34" charset="0"/>
+              </a:rPr>
+              <a:t>CHESNOUARD Dylan</a:t>
+            </a:r>
+          </a:p>
+        </p:txBody>
+      </p:sp>
+      <p:sp>
+        <p:nvSpPr>
+          <p:cNvPr id="10" name="ZoneTexte 9">
+            <a:extLst>
+              <a:ext uri="{FF2B5EF4-FFF2-40B4-BE49-F238E27FC236}">
+                <a16:creationId xmlns:a16="http://schemas.microsoft.com/office/drawing/2014/main" id="{CFB371B6-6FD3-405E-A22A-B3423EFEB93B}"/>
+              </a:ext>
+            </a:extLst>
+          </p:cNvPr>
+          <p:cNvSpPr txBox="1"/>
+          <p:nvPr/>
+        </p:nvSpPr>
+        <p:spPr>
+          <a:xfrm>
+            <a:off x="9951228" y="5987534"/>
+            <a:ext cx="1967013" cy="369332"/>
+          </a:xfrm>
+          <a:prstGeom prst="rect">
+            <a:avLst/>
+          </a:prstGeom>
+          <a:noFill/>
+        </p:spPr>
+        <p:txBody>
+          <a:bodyPr wrap="none" rtlCol="0">
+            <a:spAutoFit/>
+          </a:bodyPr>
+          <a:lstStyle/>
+          <a:p>
+            <a:r>
+              <a:rPr lang="fr-FR" dirty="0">
+                <a:latin typeface="Myriad Pro" panose="020B0503030403020204" pitchFamily="34" charset="0"/>
+              </a:rPr>
+              <a:t>Session</a:t>
+            </a:r>
+            <a:r>
+              <a:rPr lang="fr-FR" dirty="0"/>
+              <a:t> </a:t>
+            </a:r>
+            <a:r>
+              <a:rPr lang="fr-FR" dirty="0">
+                <a:latin typeface="Myriad Pro" panose="020B0503030403020204" pitchFamily="34" charset="0"/>
+              </a:rPr>
+              <a:t>2017-2018</a:t>
+            </a:r>
+          </a:p>
+        </p:txBody>
+      </p:sp>
+      <p:cxnSp>
+        <p:nvCxnSpPr>
+          <p:cNvPr id="8" name="Straight Connector 11">
+            <a:extLst>
+              <a:ext uri="{FF2B5EF4-FFF2-40B4-BE49-F238E27FC236}">
+                <a16:creationId xmlns:a16="http://schemas.microsoft.com/office/drawing/2014/main" id="{D0F78271-AF4A-421B-B2A1-207CD35CD410}"/>
+              </a:ext>
+            </a:extLst>
+          </p:cNvPr>
+          <p:cNvCxnSpPr>
+            <a:cxnSpLocks/>
+          </p:cNvCxnSpPr>
+          <p:nvPr/>
+        </p:nvCxnSpPr>
+        <p:spPr>
+          <a:xfrm flipH="1">
+            <a:off x="5138143" y="2478423"/>
+            <a:ext cx="1915715" cy="0"/>
+          </a:xfrm>
+          <a:prstGeom prst="line">
+            <a:avLst/>
+          </a:prstGeom>
+          <a:ln>
+            <a:solidFill>
+              <a:schemeClr val="tx1"/>
+            </a:solidFill>
+          </a:ln>
+          <a:effectLst/>
+        </p:spPr>
+        <p:style>
+          <a:lnRef idx="2">
+            <a:schemeClr val="accent1"/>
+          </a:lnRef>
+          <a:fillRef idx="0">
+            <a:schemeClr val="accent1"/>
+          </a:fillRef>
+          <a:effectRef idx="1">
+            <a:schemeClr val="accent1"/>
+          </a:effectRef>
+          <a:fontRef idx="minor">
+            <a:schemeClr val="tx1"/>
+          </a:fontRef>
+        </p:style>
+      </p:cxnSp>
     </p:spTree>
     <p:extLst>
       <p:ext uri="{BB962C8B-B14F-4D97-AF65-F5344CB8AC3E}">
         <p14:creationId xmlns:p14="http://schemas.microsoft.com/office/powerpoint/2010/main" val="1126421333"/>
+      </p:ext>
+    </p:extLst>
+  </p:cSld>
+  <p:clrMapOvr>
+    <a:masterClrMapping/>
+  </p:clrMapOvr>
+</p:sld>
+</file>
+
+<file path=ppt/slides/slide10.xml><?xml version="1.0" encoding="utf-8"?>
+<p:sld xmlns:a="http://schemas.openxmlformats.org/drawingml/2006/main" xmlns:r="http://schemas.openxmlformats.org/officeDocument/2006/relationships" xmlns:p="http://schemas.openxmlformats.org/presentationml/2006/main">
+  <p:cSld>
+    <p:spTree>
+      <p:nvGrpSpPr>
+        <p:cNvPr id="1" name=""/>
+        <p:cNvGrpSpPr/>
+        <p:nvPr/>
+      </p:nvGrpSpPr>
+      <p:grpSpPr>
+        <a:xfrm>
+          <a:off x="0" y="0"/>
+          <a:ext cx="0" cy="0"/>
+          <a:chOff x="0" y="0"/>
+          <a:chExt cx="0" cy="0"/>
+        </a:xfrm>
+      </p:grpSpPr>
+      <p:sp>
+        <p:nvSpPr>
+          <p:cNvPr id="4" name="ZoneTexte 3">
+            <a:extLst>
+              <a:ext uri="{FF2B5EF4-FFF2-40B4-BE49-F238E27FC236}">
+                <a16:creationId xmlns:a16="http://schemas.microsoft.com/office/drawing/2014/main" id="{7EFE29B9-D2A3-43FE-9483-0C9186398D0A}"/>
+              </a:ext>
+            </a:extLst>
+          </p:cNvPr>
+          <p:cNvSpPr txBox="1"/>
+          <p:nvPr/>
+        </p:nvSpPr>
+        <p:spPr>
+          <a:xfrm>
+            <a:off x="545284" y="218113"/>
+            <a:ext cx="2211183" cy="523220"/>
+          </a:xfrm>
+          <a:prstGeom prst="rect">
+            <a:avLst/>
+          </a:prstGeom>
+          <a:noFill/>
+        </p:spPr>
+        <p:txBody>
+          <a:bodyPr wrap="none" rtlCol="0">
+            <a:spAutoFit/>
+          </a:bodyPr>
+          <a:lstStyle/>
+          <a:p>
+            <a:r>
+              <a:rPr lang="fr-FR" sz="2800" dirty="0">
+                <a:solidFill>
+                  <a:srgbClr val="DC0014"/>
+                </a:solidFill>
+                <a:latin typeface="Myriad Pro" panose="020B0503030403020204" pitchFamily="34" charset="0"/>
+              </a:rPr>
+              <a:t>CONCLUSION</a:t>
+            </a:r>
+            <a:endParaRPr lang="fr-FR" sz="2800" dirty="0">
+              <a:latin typeface="Myriad Pro" panose="020B0503030403020204" pitchFamily="34" charset="0"/>
+            </a:endParaRPr>
+          </a:p>
+        </p:txBody>
+      </p:sp>
+      <p:cxnSp>
+        <p:nvCxnSpPr>
+          <p:cNvPr id="5" name="Connecteur droit 4">
+            <a:extLst>
+              <a:ext uri="{FF2B5EF4-FFF2-40B4-BE49-F238E27FC236}">
+                <a16:creationId xmlns:a16="http://schemas.microsoft.com/office/drawing/2014/main" id="{11EE7AEE-0C3A-41DB-B6B9-718414399470}"/>
+              </a:ext>
+            </a:extLst>
+          </p:cNvPr>
+          <p:cNvCxnSpPr>
+            <a:cxnSpLocks/>
+          </p:cNvCxnSpPr>
+          <p:nvPr/>
+        </p:nvCxnSpPr>
+        <p:spPr>
+          <a:xfrm>
+            <a:off x="-8389" y="889233"/>
+            <a:ext cx="12200389" cy="0"/>
+          </a:xfrm>
+          <a:prstGeom prst="line">
+            <a:avLst/>
+          </a:prstGeom>
+          <a:ln w="38100">
+            <a:solidFill>
+              <a:srgbClr val="E6E6E6"/>
+            </a:solidFill>
+          </a:ln>
+        </p:spPr>
+        <p:style>
+          <a:lnRef idx="1">
+            <a:schemeClr val="accent1"/>
+          </a:lnRef>
+          <a:fillRef idx="0">
+            <a:schemeClr val="accent1"/>
+          </a:fillRef>
+          <a:effectRef idx="0">
+            <a:schemeClr val="accent1"/>
+          </a:effectRef>
+          <a:fontRef idx="minor">
+            <a:schemeClr val="tx1"/>
+          </a:fontRef>
+        </p:style>
+      </p:cxnSp>
+      <p:sp>
+        <p:nvSpPr>
+          <p:cNvPr id="6" name="ZoneTexte 5">
+            <a:extLst>
+              <a:ext uri="{FF2B5EF4-FFF2-40B4-BE49-F238E27FC236}">
+                <a16:creationId xmlns:a16="http://schemas.microsoft.com/office/drawing/2014/main" id="{0CDBC43D-8EE5-46B9-8D1C-AA7C24AD1AF4}"/>
+              </a:ext>
+            </a:extLst>
+          </p:cNvPr>
+          <p:cNvSpPr txBox="1"/>
+          <p:nvPr/>
+        </p:nvSpPr>
+        <p:spPr>
+          <a:xfrm>
+            <a:off x="5945157" y="6488668"/>
+            <a:ext cx="301686" cy="369332"/>
+          </a:xfrm>
+          <a:prstGeom prst="rect">
+            <a:avLst/>
+          </a:prstGeom>
+          <a:noFill/>
+        </p:spPr>
+        <p:txBody>
+          <a:bodyPr wrap="none" rtlCol="0">
+            <a:spAutoFit/>
+          </a:bodyPr>
+          <a:lstStyle/>
+          <a:p>
+            <a:r>
+              <a:rPr lang="fr-FR" dirty="0"/>
+              <a:t>4</a:t>
+            </a:r>
+          </a:p>
+        </p:txBody>
+      </p:sp>
+      <p:pic>
+        <p:nvPicPr>
+          <p:cNvPr id="7" name="Image 6">
+            <a:extLst>
+              <a:ext uri="{FF2B5EF4-FFF2-40B4-BE49-F238E27FC236}">
+                <a16:creationId xmlns:a16="http://schemas.microsoft.com/office/drawing/2014/main" id="{EE3B6107-4A73-4A4E-B8A8-408396CF5F03}"/>
+              </a:ext>
+            </a:extLst>
+          </p:cNvPr>
+          <p:cNvPicPr>
+            <a:picLocks noChangeAspect="1"/>
+          </p:cNvPicPr>
+          <p:nvPr/>
+        </p:nvPicPr>
+        <p:blipFill>
+          <a:blip r:embed="rId2"/>
+          <a:stretch>
+            <a:fillRect/>
+          </a:stretch>
+        </p:blipFill>
+        <p:spPr>
+          <a:xfrm>
+            <a:off x="10423008" y="6384240"/>
+            <a:ext cx="1626117" cy="323503"/>
+          </a:xfrm>
+          <a:prstGeom prst="rect">
+            <a:avLst/>
+          </a:prstGeom>
+        </p:spPr>
+      </p:pic>
+    </p:spTree>
+    <p:extLst>
+      <p:ext uri="{BB962C8B-B14F-4D97-AF65-F5344CB8AC3E}">
+        <p14:creationId xmlns:p14="http://schemas.microsoft.com/office/powerpoint/2010/main" val="476848265"/>
+      </p:ext>
+    </p:extLst>
+  </p:cSld>
+  <p:clrMapOvr>
+    <a:masterClrMapping/>
+  </p:clrMapOvr>
+</p:sld>
+</file>
+
+<file path=ppt/slides/slide2.xml><?xml version="1.0" encoding="utf-8"?>
+<p:sld xmlns:a="http://schemas.openxmlformats.org/drawingml/2006/main" xmlns:r="http://schemas.openxmlformats.org/officeDocument/2006/relationships" xmlns:p="http://schemas.openxmlformats.org/presentationml/2006/main">
+  <p:cSld>
+    <p:spTree>
+      <p:nvGrpSpPr>
+        <p:cNvPr id="1" name=""/>
+        <p:cNvGrpSpPr/>
+        <p:nvPr/>
+      </p:nvGrpSpPr>
+      <p:grpSpPr>
+        <a:xfrm>
+          <a:off x="0" y="0"/>
+          <a:ext cx="0" cy="0"/>
+          <a:chOff x="0" y="0"/>
+          <a:chExt cx="0" cy="0"/>
+        </a:xfrm>
+      </p:grpSpPr>
+      <p:sp>
+        <p:nvSpPr>
+          <p:cNvPr id="4" name="ZoneTexte 3">
+            <a:extLst>
+              <a:ext uri="{FF2B5EF4-FFF2-40B4-BE49-F238E27FC236}">
+                <a16:creationId xmlns:a16="http://schemas.microsoft.com/office/drawing/2014/main" id="{16469759-0FD9-4233-9744-987388B526F5}"/>
+              </a:ext>
+            </a:extLst>
+          </p:cNvPr>
+          <p:cNvSpPr txBox="1"/>
+          <p:nvPr/>
+        </p:nvSpPr>
+        <p:spPr>
+          <a:xfrm>
+            <a:off x="545284" y="218113"/>
+            <a:ext cx="4042902" cy="523220"/>
+          </a:xfrm>
+          <a:prstGeom prst="rect">
+            <a:avLst/>
+          </a:prstGeom>
+          <a:noFill/>
+        </p:spPr>
+        <p:txBody>
+          <a:bodyPr wrap="none" rtlCol="0">
+            <a:spAutoFit/>
+          </a:bodyPr>
+          <a:lstStyle/>
+          <a:p>
+            <a:r>
+              <a:rPr lang="fr-FR" sz="2800" dirty="0">
+                <a:solidFill>
+                  <a:srgbClr val="DC0014"/>
+                </a:solidFill>
+                <a:latin typeface="Myriad Pro" panose="020B0503030403020204" pitchFamily="34" charset="0"/>
+              </a:rPr>
+              <a:t>COMPANY</a:t>
+            </a:r>
+            <a:r>
+              <a:rPr lang="fr-FR" sz="2800" dirty="0">
+                <a:latin typeface="Myriad Pro" panose="020B0503030403020204" pitchFamily="34" charset="0"/>
+              </a:rPr>
+              <a:t> PRESENTATION</a:t>
+            </a:r>
+          </a:p>
+        </p:txBody>
+      </p:sp>
+      <p:cxnSp>
+        <p:nvCxnSpPr>
+          <p:cNvPr id="5" name="Connecteur droit 4">
+            <a:extLst>
+              <a:ext uri="{FF2B5EF4-FFF2-40B4-BE49-F238E27FC236}">
+                <a16:creationId xmlns:a16="http://schemas.microsoft.com/office/drawing/2014/main" id="{E3BACC72-8907-48DB-9D6C-729C793B7A5F}"/>
+              </a:ext>
+            </a:extLst>
+          </p:cNvPr>
+          <p:cNvCxnSpPr>
+            <a:cxnSpLocks/>
+          </p:cNvCxnSpPr>
+          <p:nvPr/>
+        </p:nvCxnSpPr>
+        <p:spPr>
+          <a:xfrm>
+            <a:off x="-8389" y="889233"/>
+            <a:ext cx="12200389" cy="0"/>
+          </a:xfrm>
+          <a:prstGeom prst="line">
+            <a:avLst/>
+          </a:prstGeom>
+          <a:ln w="38100">
+            <a:solidFill>
+              <a:srgbClr val="E6E6E6"/>
+            </a:solidFill>
+          </a:ln>
+        </p:spPr>
+        <p:style>
+          <a:lnRef idx="1">
+            <a:schemeClr val="accent1"/>
+          </a:lnRef>
+          <a:fillRef idx="0">
+            <a:schemeClr val="accent1"/>
+          </a:fillRef>
+          <a:effectRef idx="0">
+            <a:schemeClr val="accent1"/>
+          </a:effectRef>
+          <a:fontRef idx="minor">
+            <a:schemeClr val="tx1"/>
+          </a:fontRef>
+        </p:style>
+      </p:cxnSp>
+      <p:sp>
+        <p:nvSpPr>
+          <p:cNvPr id="6" name="ZoneTexte 5">
+            <a:extLst>
+              <a:ext uri="{FF2B5EF4-FFF2-40B4-BE49-F238E27FC236}">
+                <a16:creationId xmlns:a16="http://schemas.microsoft.com/office/drawing/2014/main" id="{28342F6F-64D4-4252-BB58-497EA96CCA09}"/>
+              </a:ext>
+            </a:extLst>
+          </p:cNvPr>
+          <p:cNvSpPr txBox="1"/>
+          <p:nvPr/>
+        </p:nvSpPr>
+        <p:spPr>
+          <a:xfrm>
+            <a:off x="5945157" y="6488668"/>
+            <a:ext cx="301686" cy="369332"/>
+          </a:xfrm>
+          <a:prstGeom prst="rect">
+            <a:avLst/>
+          </a:prstGeom>
+          <a:noFill/>
+        </p:spPr>
+        <p:txBody>
+          <a:bodyPr wrap="none" rtlCol="0">
+            <a:spAutoFit/>
+          </a:bodyPr>
+          <a:lstStyle/>
+          <a:p>
+            <a:r>
+              <a:rPr lang="fr-FR" dirty="0"/>
+              <a:t>1</a:t>
+            </a:r>
+          </a:p>
+        </p:txBody>
+      </p:sp>
+      <p:pic>
+        <p:nvPicPr>
+          <p:cNvPr id="7" name="Image 6">
+            <a:extLst>
+              <a:ext uri="{FF2B5EF4-FFF2-40B4-BE49-F238E27FC236}">
+                <a16:creationId xmlns:a16="http://schemas.microsoft.com/office/drawing/2014/main" id="{B95CE87A-3A3E-4F52-90BA-8DAE3F37CCF1}"/>
+              </a:ext>
+            </a:extLst>
+          </p:cNvPr>
+          <p:cNvPicPr>
+            <a:picLocks noChangeAspect="1"/>
+          </p:cNvPicPr>
+          <p:nvPr/>
+        </p:nvPicPr>
+        <p:blipFill>
+          <a:blip r:embed="rId2"/>
+          <a:stretch>
+            <a:fillRect/>
+          </a:stretch>
+        </p:blipFill>
+        <p:spPr>
+          <a:xfrm>
+            <a:off x="10423008" y="6384240"/>
+            <a:ext cx="1626117" cy="323503"/>
+          </a:xfrm>
+          <a:prstGeom prst="rect">
+            <a:avLst/>
+          </a:prstGeom>
+        </p:spPr>
+      </p:pic>
+      <p:grpSp>
+        <p:nvGrpSpPr>
+          <p:cNvPr id="38" name="Groupe 37">
+            <a:extLst>
+              <a:ext uri="{FF2B5EF4-FFF2-40B4-BE49-F238E27FC236}">
+                <a16:creationId xmlns:a16="http://schemas.microsoft.com/office/drawing/2014/main" id="{05B04D5F-07E2-4E33-A369-230B1B723079}"/>
+              </a:ext>
+            </a:extLst>
+          </p:cNvPr>
+          <p:cNvGrpSpPr/>
+          <p:nvPr/>
+        </p:nvGrpSpPr>
+        <p:grpSpPr>
+          <a:xfrm>
+            <a:off x="5376000" y="1283721"/>
+            <a:ext cx="1440000" cy="4624800"/>
+            <a:chOff x="5405210" y="1283721"/>
+            <a:chExt cx="1440000" cy="4624800"/>
+          </a:xfrm>
+        </p:grpSpPr>
+        <p:sp>
+          <p:nvSpPr>
+            <p:cNvPr id="27" name="Ellipse 26">
+              <a:extLst>
+                <a:ext uri="{FF2B5EF4-FFF2-40B4-BE49-F238E27FC236}">
+                  <a16:creationId xmlns:a16="http://schemas.microsoft.com/office/drawing/2014/main" id="{2BA76A75-2593-4084-BB3F-3DFE70689E95}"/>
+                </a:ext>
+              </a:extLst>
+            </p:cNvPr>
+            <p:cNvSpPr/>
+            <p:nvPr/>
+          </p:nvSpPr>
+          <p:spPr>
+            <a:xfrm>
+              <a:off x="5405210" y="1283721"/>
+              <a:ext cx="1440000" cy="1440000"/>
+            </a:xfrm>
+            <a:prstGeom prst="ellipse">
+              <a:avLst/>
+            </a:prstGeom>
+            <a:solidFill>
+              <a:srgbClr val="DC0014"/>
+            </a:solidFill>
+            <a:ln>
+              <a:noFill/>
+            </a:ln>
+          </p:spPr>
+          <p:style>
+            <a:lnRef idx="2">
+              <a:schemeClr val="accent1">
+                <a:shade val="50000"/>
+              </a:schemeClr>
+            </a:lnRef>
+            <a:fillRef idx="1">
+              <a:schemeClr val="accent1"/>
+            </a:fillRef>
+            <a:effectRef idx="0">
+              <a:schemeClr val="accent1"/>
+            </a:effectRef>
+            <a:fontRef idx="minor">
+              <a:schemeClr val="lt1"/>
+            </a:fontRef>
+          </p:style>
+          <p:txBody>
+            <a:bodyPr rtlCol="0" anchor="ctr"/>
+            <a:lstStyle/>
+            <a:p>
+              <a:pPr algn="ctr"/>
+              <a:r>
+                <a:rPr lang="fr-FR" dirty="0"/>
+                <a:t>DESIGN</a:t>
+              </a:r>
+            </a:p>
+          </p:txBody>
+        </p:sp>
+        <p:sp>
+          <p:nvSpPr>
+            <p:cNvPr id="28" name="Ellipse 27">
+              <a:extLst>
+                <a:ext uri="{FF2B5EF4-FFF2-40B4-BE49-F238E27FC236}">
+                  <a16:creationId xmlns:a16="http://schemas.microsoft.com/office/drawing/2014/main" id="{D3CB06CB-34FC-4372-94C3-AA5C2725A690}"/>
+                </a:ext>
+              </a:extLst>
+            </p:cNvPr>
+            <p:cNvSpPr/>
+            <p:nvPr/>
+          </p:nvSpPr>
+          <p:spPr>
+            <a:xfrm>
+              <a:off x="5405210" y="2876121"/>
+              <a:ext cx="1440000" cy="1440000"/>
+            </a:xfrm>
+            <a:prstGeom prst="ellipse">
+              <a:avLst/>
+            </a:prstGeom>
+            <a:solidFill>
+              <a:srgbClr val="DC0014"/>
+            </a:solidFill>
+            <a:ln>
+              <a:noFill/>
+            </a:ln>
+          </p:spPr>
+          <p:style>
+            <a:lnRef idx="2">
+              <a:schemeClr val="accent1">
+                <a:shade val="50000"/>
+              </a:schemeClr>
+            </a:lnRef>
+            <a:fillRef idx="1">
+              <a:schemeClr val="accent1"/>
+            </a:fillRef>
+            <a:effectRef idx="0">
+              <a:schemeClr val="accent1"/>
+            </a:effectRef>
+            <a:fontRef idx="minor">
+              <a:schemeClr val="lt1"/>
+            </a:fontRef>
+          </p:style>
+          <p:txBody>
+            <a:bodyPr rtlCol="0" anchor="ctr"/>
+            <a:lstStyle/>
+            <a:p>
+              <a:pPr algn="ctr"/>
+              <a:r>
+                <a:rPr lang="fr-FR" dirty="0"/>
+                <a:t>BUILD</a:t>
+              </a:r>
+            </a:p>
+          </p:txBody>
+        </p:sp>
+        <p:sp>
+          <p:nvSpPr>
+            <p:cNvPr id="29" name="Ellipse 28">
+              <a:extLst>
+                <a:ext uri="{FF2B5EF4-FFF2-40B4-BE49-F238E27FC236}">
+                  <a16:creationId xmlns:a16="http://schemas.microsoft.com/office/drawing/2014/main" id="{62DECF78-BE30-46D1-9162-01B344F4950D}"/>
+                </a:ext>
+              </a:extLst>
+            </p:cNvPr>
+            <p:cNvSpPr/>
+            <p:nvPr/>
+          </p:nvSpPr>
+          <p:spPr>
+            <a:xfrm>
+              <a:off x="5405210" y="4468521"/>
+              <a:ext cx="1440000" cy="1440000"/>
+            </a:xfrm>
+            <a:prstGeom prst="ellipse">
+              <a:avLst/>
+            </a:prstGeom>
+            <a:solidFill>
+              <a:srgbClr val="DC0014"/>
+            </a:solidFill>
+            <a:ln>
+              <a:noFill/>
+            </a:ln>
+          </p:spPr>
+          <p:style>
+            <a:lnRef idx="2">
+              <a:schemeClr val="accent1">
+                <a:shade val="50000"/>
+              </a:schemeClr>
+            </a:lnRef>
+            <a:fillRef idx="1">
+              <a:schemeClr val="accent1"/>
+            </a:fillRef>
+            <a:effectRef idx="0">
+              <a:schemeClr val="accent1"/>
+            </a:effectRef>
+            <a:fontRef idx="minor">
+              <a:schemeClr val="lt1"/>
+            </a:fontRef>
+          </p:style>
+          <p:txBody>
+            <a:bodyPr rtlCol="0" anchor="ctr"/>
+            <a:lstStyle/>
+            <a:p>
+              <a:pPr algn="ctr"/>
+              <a:r>
+                <a:rPr lang="fr-FR" dirty="0"/>
+                <a:t>SELL</a:t>
+              </a:r>
+            </a:p>
+          </p:txBody>
+        </p:sp>
+      </p:grpSp>
+      <p:pic>
+        <p:nvPicPr>
+          <p:cNvPr id="31" name="Image 30">
+            <a:extLst>
+              <a:ext uri="{FF2B5EF4-FFF2-40B4-BE49-F238E27FC236}">
+                <a16:creationId xmlns:a16="http://schemas.microsoft.com/office/drawing/2014/main" id="{113541B7-E56D-40A0-9707-DCBFD71190F6}"/>
+              </a:ext>
+            </a:extLst>
+          </p:cNvPr>
+          <p:cNvPicPr>
+            <a:picLocks noChangeAspect="1"/>
+          </p:cNvPicPr>
+          <p:nvPr/>
+        </p:nvPicPr>
+        <p:blipFill>
+          <a:blip r:embed="rId3"/>
+          <a:stretch>
+            <a:fillRect/>
+          </a:stretch>
+        </p:blipFill>
+        <p:spPr>
+          <a:xfrm>
+            <a:off x="545284" y="1787025"/>
+            <a:ext cx="4145611" cy="3454676"/>
+          </a:xfrm>
+          <a:prstGeom prst="rect">
+            <a:avLst/>
+          </a:prstGeom>
+          <a:ln>
+            <a:noFill/>
+          </a:ln>
+          <a:effectLst>
+            <a:softEdge rad="112500"/>
+          </a:effectLst>
+        </p:spPr>
+      </p:pic>
+      <p:sp>
+        <p:nvSpPr>
+          <p:cNvPr id="32" name="ZoneTexte 31">
+            <a:extLst>
+              <a:ext uri="{FF2B5EF4-FFF2-40B4-BE49-F238E27FC236}">
+                <a16:creationId xmlns:a16="http://schemas.microsoft.com/office/drawing/2014/main" id="{5DE0FF11-F20D-4200-B6E6-3A9BE81D9DD6}"/>
+              </a:ext>
+            </a:extLst>
+          </p:cNvPr>
+          <p:cNvSpPr txBox="1"/>
+          <p:nvPr/>
+        </p:nvSpPr>
+        <p:spPr>
+          <a:xfrm>
+            <a:off x="596766" y="5241701"/>
+            <a:ext cx="4042645" cy="369332"/>
+          </a:xfrm>
+          <a:prstGeom prst="rect">
+            <a:avLst/>
+          </a:prstGeom>
+          <a:noFill/>
+        </p:spPr>
+        <p:txBody>
+          <a:bodyPr wrap="none" rtlCol="0">
+            <a:spAutoFit/>
+          </a:bodyPr>
+          <a:lstStyle/>
+          <a:p>
+            <a:r>
+              <a:rPr lang="fr-FR" i="1" dirty="0" err="1">
+                <a:latin typeface="Myriad Pro" panose="020B0503030403020204" pitchFamily="34" charset="0"/>
+              </a:rPr>
+              <a:t>Evolis</a:t>
+            </a:r>
+            <a:r>
+              <a:rPr lang="fr-FR" i="1" dirty="0">
+                <a:latin typeface="Myriad Pro" panose="020B0503030403020204" pitchFamily="34" charset="0"/>
+              </a:rPr>
+              <a:t> </a:t>
+            </a:r>
+            <a:r>
+              <a:rPr lang="fr-FR" i="1" dirty="0" err="1">
+                <a:latin typeface="Myriad Pro" panose="020B0503030403020204" pitchFamily="34" charset="0"/>
+              </a:rPr>
+              <a:t>headquarter</a:t>
+            </a:r>
+            <a:r>
+              <a:rPr lang="fr-FR" i="1" dirty="0">
+                <a:latin typeface="Myriad Pro" panose="020B0503030403020204" pitchFamily="34" charset="0"/>
+              </a:rPr>
+              <a:t> in Beaucouzé, France</a:t>
+            </a:r>
+          </a:p>
+        </p:txBody>
+      </p:sp>
+      <p:pic>
+        <p:nvPicPr>
+          <p:cNvPr id="33" name="Image 32">
+            <a:extLst>
+              <a:ext uri="{FF2B5EF4-FFF2-40B4-BE49-F238E27FC236}">
+                <a16:creationId xmlns:a16="http://schemas.microsoft.com/office/drawing/2014/main" id="{D809614F-F95B-42AE-9283-F00B81B21B5A}"/>
+              </a:ext>
+            </a:extLst>
+          </p:cNvPr>
+          <p:cNvPicPr>
+            <a:picLocks noChangeAspect="1"/>
+          </p:cNvPicPr>
+          <p:nvPr/>
+        </p:nvPicPr>
+        <p:blipFill rotWithShape="1">
+          <a:blip r:embed="rId4">
+            <a:extLst>
+              <a:ext uri="{28A0092B-C50C-407E-A947-70E740481C1C}">
+                <a14:useLocalDpi xmlns:a14="http://schemas.microsoft.com/office/drawing/2010/main" val="0"/>
+              </a:ext>
+            </a:extLst>
+          </a:blip>
+          <a:srcRect l="17150" t="9774" r="16248" b="9403"/>
+          <a:stretch/>
+        </p:blipFill>
+        <p:spPr>
+          <a:xfrm>
+            <a:off x="8294223" y="1721840"/>
+            <a:ext cx="2665618" cy="2426099"/>
+          </a:xfrm>
+          <a:prstGeom prst="rect">
+            <a:avLst/>
+          </a:prstGeom>
+        </p:spPr>
+      </p:pic>
+      <p:sp>
+        <p:nvSpPr>
+          <p:cNvPr id="34" name="ZoneTexte 33">
+            <a:extLst>
+              <a:ext uri="{FF2B5EF4-FFF2-40B4-BE49-F238E27FC236}">
+                <a16:creationId xmlns:a16="http://schemas.microsoft.com/office/drawing/2014/main" id="{FF237AA6-8F4A-4454-8A4F-50E09A839124}"/>
+              </a:ext>
+            </a:extLst>
+          </p:cNvPr>
+          <p:cNvSpPr txBox="1"/>
+          <p:nvPr/>
+        </p:nvSpPr>
+        <p:spPr>
+          <a:xfrm>
+            <a:off x="8672476" y="4107595"/>
+            <a:ext cx="1909112" cy="338554"/>
+          </a:xfrm>
+          <a:prstGeom prst="rect">
+            <a:avLst/>
+          </a:prstGeom>
+          <a:noFill/>
+        </p:spPr>
+        <p:txBody>
+          <a:bodyPr wrap="none" rtlCol="0">
+            <a:spAutoFit/>
+          </a:bodyPr>
+          <a:lstStyle/>
+          <a:p>
+            <a:r>
+              <a:rPr lang="fr-FR" sz="1600" i="1" dirty="0">
+                <a:latin typeface="Myriad Pro" panose="020B0503030403020204" pitchFamily="34" charset="0"/>
+              </a:rPr>
+              <a:t>Primacy </a:t>
+            </a:r>
+            <a:r>
+              <a:rPr lang="fr-FR" sz="1600" i="1" dirty="0" err="1">
+                <a:latin typeface="Myriad Pro" panose="020B0503030403020204" pitchFamily="34" charset="0"/>
+              </a:rPr>
+              <a:t>card</a:t>
+            </a:r>
+            <a:r>
+              <a:rPr lang="fr-FR" sz="1600" i="1" dirty="0">
+                <a:latin typeface="Myriad Pro" panose="020B0503030403020204" pitchFamily="34" charset="0"/>
+              </a:rPr>
+              <a:t> printer</a:t>
+            </a:r>
+          </a:p>
+        </p:txBody>
+      </p:sp>
+      <p:pic>
+        <p:nvPicPr>
+          <p:cNvPr id="35" name="Image 34">
+            <a:extLst>
+              <a:ext uri="{FF2B5EF4-FFF2-40B4-BE49-F238E27FC236}">
+                <a16:creationId xmlns:a16="http://schemas.microsoft.com/office/drawing/2014/main" id="{818BEF70-E6E6-4EB8-B706-FB5832DAD238}"/>
+              </a:ext>
+            </a:extLst>
+          </p:cNvPr>
+          <p:cNvPicPr>
+            <a:picLocks noChangeAspect="1"/>
+          </p:cNvPicPr>
+          <p:nvPr/>
+        </p:nvPicPr>
+        <p:blipFill>
+          <a:blip r:embed="rId5"/>
+          <a:stretch>
+            <a:fillRect/>
+          </a:stretch>
+        </p:blipFill>
+        <p:spPr>
+          <a:xfrm>
+            <a:off x="7281826" y="4637561"/>
+            <a:ext cx="1390650" cy="910545"/>
+          </a:xfrm>
+          <a:prstGeom prst="rect">
+            <a:avLst/>
+          </a:prstGeom>
+        </p:spPr>
+      </p:pic>
+      <p:pic>
+        <p:nvPicPr>
+          <p:cNvPr id="36" name="Image 35">
+            <a:extLst>
+              <a:ext uri="{FF2B5EF4-FFF2-40B4-BE49-F238E27FC236}">
+                <a16:creationId xmlns:a16="http://schemas.microsoft.com/office/drawing/2014/main" id="{1AD7D7DC-BD22-4DA8-A46F-0998811602AE}"/>
+              </a:ext>
+            </a:extLst>
+          </p:cNvPr>
+          <p:cNvPicPr>
+            <a:picLocks noChangeAspect="1"/>
+          </p:cNvPicPr>
+          <p:nvPr/>
+        </p:nvPicPr>
+        <p:blipFill>
+          <a:blip r:embed="rId6"/>
+          <a:stretch>
+            <a:fillRect/>
+          </a:stretch>
+        </p:blipFill>
+        <p:spPr>
+          <a:xfrm>
+            <a:off x="8794162" y="4637562"/>
+            <a:ext cx="1384629" cy="914072"/>
+          </a:xfrm>
+          <a:prstGeom prst="rect">
+            <a:avLst/>
+          </a:prstGeom>
+        </p:spPr>
+      </p:pic>
+      <p:pic>
+        <p:nvPicPr>
+          <p:cNvPr id="37" name="Image 36">
+            <a:extLst>
+              <a:ext uri="{FF2B5EF4-FFF2-40B4-BE49-F238E27FC236}">
+                <a16:creationId xmlns:a16="http://schemas.microsoft.com/office/drawing/2014/main" id="{705091C7-A5AD-4EB6-95FC-716B6D3FC875}"/>
+              </a:ext>
+            </a:extLst>
+          </p:cNvPr>
+          <p:cNvPicPr>
+            <a:picLocks noChangeAspect="1"/>
+          </p:cNvPicPr>
+          <p:nvPr/>
+        </p:nvPicPr>
+        <p:blipFill>
+          <a:blip r:embed="rId7"/>
+          <a:stretch>
+            <a:fillRect/>
+          </a:stretch>
+        </p:blipFill>
+        <p:spPr>
+          <a:xfrm>
+            <a:off x="10300477" y="4637561"/>
+            <a:ext cx="1423761" cy="910545"/>
+          </a:xfrm>
+          <a:prstGeom prst="rect">
+            <a:avLst/>
+          </a:prstGeom>
+        </p:spPr>
+      </p:pic>
+    </p:spTree>
+    <p:extLst>
+      <p:ext uri="{BB962C8B-B14F-4D97-AF65-F5344CB8AC3E}">
+        <p14:creationId xmlns:p14="http://schemas.microsoft.com/office/powerpoint/2010/main" val="1323542580"/>
+      </p:ext>
+    </p:extLst>
+  </p:cSld>
+  <p:clrMapOvr>
+    <a:masterClrMapping/>
+  </p:clrMapOvr>
+</p:sld>
+</file>
+
+<file path=ppt/slides/slide3.xml><?xml version="1.0" encoding="utf-8"?>
+<p:sld xmlns:a="http://schemas.openxmlformats.org/drawingml/2006/main" xmlns:r="http://schemas.openxmlformats.org/officeDocument/2006/relationships" xmlns:p="http://schemas.openxmlformats.org/presentationml/2006/main">
+  <p:cSld>
+    <p:spTree>
+      <p:nvGrpSpPr>
+        <p:cNvPr id="1" name=""/>
+        <p:cNvGrpSpPr/>
+        <p:nvPr/>
+      </p:nvGrpSpPr>
+      <p:grpSpPr>
+        <a:xfrm>
+          <a:off x="0" y="0"/>
+          <a:ext cx="0" cy="0"/>
+          <a:chOff x="0" y="0"/>
+          <a:chExt cx="0" cy="0"/>
+        </a:xfrm>
+      </p:grpSpPr>
+      <p:sp>
+        <p:nvSpPr>
+          <p:cNvPr id="4" name="ZoneTexte 3">
+            <a:extLst>
+              <a:ext uri="{FF2B5EF4-FFF2-40B4-BE49-F238E27FC236}">
+                <a16:creationId xmlns:a16="http://schemas.microsoft.com/office/drawing/2014/main" id="{35EDD45E-8608-408B-809A-23C9DDDA5656}"/>
+              </a:ext>
+            </a:extLst>
+          </p:cNvPr>
+          <p:cNvSpPr txBox="1"/>
+          <p:nvPr/>
+        </p:nvSpPr>
+        <p:spPr>
+          <a:xfrm>
+            <a:off x="545284" y="218113"/>
+            <a:ext cx="4032258" cy="523220"/>
+          </a:xfrm>
+          <a:prstGeom prst="rect">
+            <a:avLst/>
+          </a:prstGeom>
+          <a:noFill/>
+        </p:spPr>
+        <p:txBody>
+          <a:bodyPr wrap="none" rtlCol="0">
+            <a:spAutoFit/>
+          </a:bodyPr>
+          <a:lstStyle/>
+          <a:p>
+            <a:r>
+              <a:rPr lang="fr-FR" sz="2800" dirty="0">
+                <a:solidFill>
+                  <a:srgbClr val="DC0014"/>
+                </a:solidFill>
+                <a:latin typeface="Myriad Pro" panose="020B0503030403020204" pitchFamily="34" charset="0"/>
+              </a:rPr>
+              <a:t>PLASTICS CARDS</a:t>
+            </a:r>
+            <a:r>
+              <a:rPr lang="fr-FR" sz="2800" dirty="0">
+                <a:latin typeface="Myriad Pro" panose="020B0503030403020204" pitchFamily="34" charset="0"/>
+              </a:rPr>
+              <a:t> MARKET</a:t>
+            </a:r>
+          </a:p>
+        </p:txBody>
+      </p:sp>
+      <p:cxnSp>
+        <p:nvCxnSpPr>
+          <p:cNvPr id="6" name="Connecteur droit 5">
+            <a:extLst>
+              <a:ext uri="{FF2B5EF4-FFF2-40B4-BE49-F238E27FC236}">
+                <a16:creationId xmlns:a16="http://schemas.microsoft.com/office/drawing/2014/main" id="{FAB1E8EA-BBF2-45B2-8FBF-13EC96389D6A}"/>
+              </a:ext>
+            </a:extLst>
+          </p:cNvPr>
+          <p:cNvCxnSpPr>
+            <a:cxnSpLocks/>
+          </p:cNvCxnSpPr>
+          <p:nvPr/>
+        </p:nvCxnSpPr>
+        <p:spPr>
+          <a:xfrm>
+            <a:off x="-8389" y="889233"/>
+            <a:ext cx="12200389" cy="0"/>
+          </a:xfrm>
+          <a:prstGeom prst="line">
+            <a:avLst/>
+          </a:prstGeom>
+          <a:ln w="38100">
+            <a:solidFill>
+              <a:srgbClr val="E6E6E6"/>
+            </a:solidFill>
+          </a:ln>
+        </p:spPr>
+        <p:style>
+          <a:lnRef idx="1">
+            <a:schemeClr val="accent1"/>
+          </a:lnRef>
+          <a:fillRef idx="0">
+            <a:schemeClr val="accent1"/>
+          </a:fillRef>
+          <a:effectRef idx="0">
+            <a:schemeClr val="accent1"/>
+          </a:effectRef>
+          <a:fontRef idx="minor">
+            <a:schemeClr val="tx1"/>
+          </a:fontRef>
+        </p:style>
+      </p:cxnSp>
+      <p:sp>
+        <p:nvSpPr>
+          <p:cNvPr id="26" name="ZoneTexte 25">
+            <a:extLst>
+              <a:ext uri="{FF2B5EF4-FFF2-40B4-BE49-F238E27FC236}">
+                <a16:creationId xmlns:a16="http://schemas.microsoft.com/office/drawing/2014/main" id="{7649163B-8DC1-46E4-A04B-244DA631F1AC}"/>
+              </a:ext>
+            </a:extLst>
+          </p:cNvPr>
+          <p:cNvSpPr txBox="1"/>
+          <p:nvPr/>
+        </p:nvSpPr>
+        <p:spPr>
+          <a:xfrm>
+            <a:off x="5945157" y="6488668"/>
+            <a:ext cx="301686" cy="369332"/>
+          </a:xfrm>
+          <a:prstGeom prst="rect">
+            <a:avLst/>
+          </a:prstGeom>
+          <a:noFill/>
+        </p:spPr>
+        <p:txBody>
+          <a:bodyPr wrap="none" rtlCol="0">
+            <a:spAutoFit/>
+          </a:bodyPr>
+          <a:lstStyle/>
+          <a:p>
+            <a:r>
+              <a:rPr lang="fr-FR" dirty="0"/>
+              <a:t>2</a:t>
+            </a:r>
+          </a:p>
+        </p:txBody>
+      </p:sp>
+      <p:pic>
+        <p:nvPicPr>
+          <p:cNvPr id="27" name="Image 26">
+            <a:extLst>
+              <a:ext uri="{FF2B5EF4-FFF2-40B4-BE49-F238E27FC236}">
+                <a16:creationId xmlns:a16="http://schemas.microsoft.com/office/drawing/2014/main" id="{0A098142-9C43-411F-8089-851673AC28A6}"/>
+              </a:ext>
+            </a:extLst>
+          </p:cNvPr>
+          <p:cNvPicPr>
+            <a:picLocks noChangeAspect="1"/>
+          </p:cNvPicPr>
+          <p:nvPr/>
+        </p:nvPicPr>
+        <p:blipFill>
+          <a:blip r:embed="rId2"/>
+          <a:stretch>
+            <a:fillRect/>
+          </a:stretch>
+        </p:blipFill>
+        <p:spPr>
+          <a:xfrm>
+            <a:off x="10423008" y="6384240"/>
+            <a:ext cx="1626117" cy="323503"/>
+          </a:xfrm>
+          <a:prstGeom prst="rect">
+            <a:avLst/>
+          </a:prstGeom>
+        </p:spPr>
+      </p:pic>
+      <p:pic>
+        <p:nvPicPr>
+          <p:cNvPr id="28" name="Image 27">
+            <a:extLst>
+              <a:ext uri="{FF2B5EF4-FFF2-40B4-BE49-F238E27FC236}">
+                <a16:creationId xmlns:a16="http://schemas.microsoft.com/office/drawing/2014/main" id="{F05E1B47-F14F-469B-ACA0-7692810BB55D}"/>
+              </a:ext>
+            </a:extLst>
+          </p:cNvPr>
+          <p:cNvPicPr>
+            <a:picLocks noChangeAspect="1"/>
+          </p:cNvPicPr>
+          <p:nvPr/>
+        </p:nvPicPr>
+        <p:blipFill>
+          <a:blip r:embed="rId3"/>
+          <a:stretch>
+            <a:fillRect/>
+          </a:stretch>
+        </p:blipFill>
+        <p:spPr>
+          <a:xfrm>
+            <a:off x="956296" y="1050526"/>
+            <a:ext cx="2286000" cy="2638425"/>
+          </a:xfrm>
+          <a:prstGeom prst="rect">
+            <a:avLst/>
+          </a:prstGeom>
+        </p:spPr>
+      </p:pic>
+      <p:pic>
+        <p:nvPicPr>
+          <p:cNvPr id="29" name="Image 28">
+            <a:extLst>
+              <a:ext uri="{FF2B5EF4-FFF2-40B4-BE49-F238E27FC236}">
+                <a16:creationId xmlns:a16="http://schemas.microsoft.com/office/drawing/2014/main" id="{CC446FAF-722B-450E-A3CE-8F007A035656}"/>
+              </a:ext>
+            </a:extLst>
+          </p:cNvPr>
+          <p:cNvPicPr>
+            <a:picLocks noChangeAspect="1"/>
+          </p:cNvPicPr>
+          <p:nvPr/>
+        </p:nvPicPr>
+        <p:blipFill>
+          <a:blip r:embed="rId4"/>
+          <a:stretch>
+            <a:fillRect/>
+          </a:stretch>
+        </p:blipFill>
+        <p:spPr>
+          <a:xfrm>
+            <a:off x="3242296" y="3697842"/>
+            <a:ext cx="2286000" cy="2638425"/>
+          </a:xfrm>
+          <a:prstGeom prst="rect">
+            <a:avLst/>
+          </a:prstGeom>
+        </p:spPr>
+      </p:pic>
+      <p:pic>
+        <p:nvPicPr>
+          <p:cNvPr id="30" name="Image 29">
+            <a:extLst>
+              <a:ext uri="{FF2B5EF4-FFF2-40B4-BE49-F238E27FC236}">
+                <a16:creationId xmlns:a16="http://schemas.microsoft.com/office/drawing/2014/main" id="{972107D1-B9D4-4C3B-AC9E-500CF4049AC7}"/>
+              </a:ext>
+            </a:extLst>
+          </p:cNvPr>
+          <p:cNvPicPr>
+            <a:picLocks noChangeAspect="1"/>
+          </p:cNvPicPr>
+          <p:nvPr/>
+        </p:nvPicPr>
+        <p:blipFill>
+          <a:blip r:embed="rId5"/>
+          <a:stretch>
+            <a:fillRect/>
+          </a:stretch>
+        </p:blipFill>
+        <p:spPr>
+          <a:xfrm>
+            <a:off x="5528296" y="1131171"/>
+            <a:ext cx="2286000" cy="2638425"/>
+          </a:xfrm>
+          <a:prstGeom prst="rect">
+            <a:avLst/>
+          </a:prstGeom>
+        </p:spPr>
+      </p:pic>
+      <p:pic>
+        <p:nvPicPr>
+          <p:cNvPr id="31" name="Image 30">
+            <a:extLst>
+              <a:ext uri="{FF2B5EF4-FFF2-40B4-BE49-F238E27FC236}">
+                <a16:creationId xmlns:a16="http://schemas.microsoft.com/office/drawing/2014/main" id="{2EA96D1D-C4FB-4F0F-85AC-9DB14214DCCA}"/>
+              </a:ext>
+            </a:extLst>
+          </p:cNvPr>
+          <p:cNvPicPr>
+            <a:picLocks noChangeAspect="1"/>
+          </p:cNvPicPr>
+          <p:nvPr/>
+        </p:nvPicPr>
+        <p:blipFill>
+          <a:blip r:embed="rId6"/>
+          <a:stretch>
+            <a:fillRect/>
+          </a:stretch>
+        </p:blipFill>
+        <p:spPr>
+          <a:xfrm>
+            <a:off x="7814296" y="3697842"/>
+            <a:ext cx="2286000" cy="2638425"/>
+          </a:xfrm>
+          <a:prstGeom prst="rect">
+            <a:avLst/>
+          </a:prstGeom>
+        </p:spPr>
+      </p:pic>
+      <p:sp>
+        <p:nvSpPr>
+          <p:cNvPr id="32" name="ZoneTexte 31">
+            <a:extLst>
+              <a:ext uri="{FF2B5EF4-FFF2-40B4-BE49-F238E27FC236}">
+                <a16:creationId xmlns:a16="http://schemas.microsoft.com/office/drawing/2014/main" id="{E1FA98CF-841F-4BDF-BD18-B978460672FD}"/>
+              </a:ext>
+            </a:extLst>
+          </p:cNvPr>
+          <p:cNvSpPr txBox="1"/>
+          <p:nvPr/>
+        </p:nvSpPr>
+        <p:spPr>
+          <a:xfrm>
+            <a:off x="2569963" y="3215599"/>
+            <a:ext cx="1400192" cy="369332"/>
+          </a:xfrm>
+          <a:prstGeom prst="rect">
+            <a:avLst/>
+          </a:prstGeom>
+          <a:noFill/>
+        </p:spPr>
+        <p:txBody>
+          <a:bodyPr wrap="none" rtlCol="0">
+            <a:spAutoFit/>
+          </a:bodyPr>
+          <a:lstStyle/>
+          <a:p>
+            <a:r>
+              <a:rPr lang="fr-FR" dirty="0">
+                <a:solidFill>
+                  <a:srgbClr val="DC0014"/>
+                </a:solidFill>
+                <a:latin typeface="Myriad Pro" panose="020B0503030403020204" pitchFamily="34" charset="0"/>
+              </a:rPr>
+              <a:t>Government</a:t>
+            </a:r>
+          </a:p>
+        </p:txBody>
+      </p:sp>
+      <p:sp>
+        <p:nvSpPr>
+          <p:cNvPr id="33" name="ZoneTexte 32">
+            <a:extLst>
+              <a:ext uri="{FF2B5EF4-FFF2-40B4-BE49-F238E27FC236}">
+                <a16:creationId xmlns:a16="http://schemas.microsoft.com/office/drawing/2014/main" id="{955AF44D-C8FE-4253-8B19-EB84001BDBDE}"/>
+              </a:ext>
+            </a:extLst>
+          </p:cNvPr>
+          <p:cNvSpPr txBox="1"/>
+          <p:nvPr/>
+        </p:nvSpPr>
+        <p:spPr>
+          <a:xfrm>
+            <a:off x="7114200" y="3215599"/>
+            <a:ext cx="821059" cy="369332"/>
+          </a:xfrm>
+          <a:prstGeom prst="rect">
+            <a:avLst/>
+          </a:prstGeom>
+          <a:noFill/>
+        </p:spPr>
+        <p:txBody>
+          <a:bodyPr wrap="none" rtlCol="0">
+            <a:spAutoFit/>
+          </a:bodyPr>
+          <a:lstStyle/>
+          <a:p>
+            <a:r>
+              <a:rPr lang="fr-FR" dirty="0" err="1">
+                <a:solidFill>
+                  <a:srgbClr val="DC0014"/>
+                </a:solidFill>
+                <a:latin typeface="Myriad Pro" panose="020B0503030403020204" pitchFamily="34" charset="0"/>
+              </a:rPr>
+              <a:t>Health</a:t>
+            </a:r>
+            <a:endParaRPr lang="fr-FR" dirty="0">
+              <a:solidFill>
+                <a:srgbClr val="DC0014"/>
+              </a:solidFill>
+              <a:latin typeface="Myriad Pro" panose="020B0503030403020204" pitchFamily="34" charset="0"/>
+            </a:endParaRPr>
+          </a:p>
+        </p:txBody>
+      </p:sp>
+      <p:sp>
+        <p:nvSpPr>
+          <p:cNvPr id="34" name="ZoneTexte 33">
+            <a:extLst>
+              <a:ext uri="{FF2B5EF4-FFF2-40B4-BE49-F238E27FC236}">
+                <a16:creationId xmlns:a16="http://schemas.microsoft.com/office/drawing/2014/main" id="{D2149C91-1F86-4387-AF1A-B8730FC019B5}"/>
+              </a:ext>
+            </a:extLst>
+          </p:cNvPr>
+          <p:cNvSpPr txBox="1"/>
+          <p:nvPr/>
+        </p:nvSpPr>
+        <p:spPr>
+          <a:xfrm>
+            <a:off x="4868593" y="5846294"/>
+            <a:ext cx="821059" cy="369332"/>
+          </a:xfrm>
+          <a:prstGeom prst="rect">
+            <a:avLst/>
+          </a:prstGeom>
+          <a:noFill/>
+        </p:spPr>
+        <p:txBody>
+          <a:bodyPr wrap="none" rtlCol="0">
+            <a:spAutoFit/>
+          </a:bodyPr>
+          <a:lstStyle/>
+          <a:p>
+            <a:r>
+              <a:rPr lang="fr-FR" dirty="0" err="1">
+                <a:solidFill>
+                  <a:srgbClr val="DC0014"/>
+                </a:solidFill>
+                <a:latin typeface="Myriad Pro" panose="020B0503030403020204" pitchFamily="34" charset="0"/>
+              </a:rPr>
+              <a:t>Health</a:t>
+            </a:r>
+            <a:endParaRPr lang="fr-FR" dirty="0">
+              <a:solidFill>
+                <a:srgbClr val="DC0014"/>
+              </a:solidFill>
+              <a:latin typeface="Myriad Pro" panose="020B0503030403020204" pitchFamily="34" charset="0"/>
+            </a:endParaRPr>
+          </a:p>
+        </p:txBody>
+      </p:sp>
+      <p:sp>
+        <p:nvSpPr>
+          <p:cNvPr id="35" name="ZoneTexte 34">
+            <a:extLst>
+              <a:ext uri="{FF2B5EF4-FFF2-40B4-BE49-F238E27FC236}">
+                <a16:creationId xmlns:a16="http://schemas.microsoft.com/office/drawing/2014/main" id="{6B50D7A3-9BD1-4C04-BDBB-DA9DA9473F38}"/>
+              </a:ext>
+            </a:extLst>
+          </p:cNvPr>
+          <p:cNvSpPr txBox="1"/>
+          <p:nvPr/>
+        </p:nvSpPr>
+        <p:spPr>
+          <a:xfrm>
+            <a:off x="9440593" y="5846294"/>
+            <a:ext cx="866840" cy="369332"/>
+          </a:xfrm>
+          <a:prstGeom prst="rect">
+            <a:avLst/>
+          </a:prstGeom>
+          <a:noFill/>
+        </p:spPr>
+        <p:txBody>
+          <a:bodyPr wrap="none" rtlCol="0">
+            <a:spAutoFit/>
+          </a:bodyPr>
+          <a:lstStyle/>
+          <a:p>
+            <a:r>
+              <a:rPr lang="fr-FR" dirty="0">
+                <a:solidFill>
+                  <a:srgbClr val="DC0014"/>
+                </a:solidFill>
+                <a:latin typeface="Myriad Pro" panose="020B0503030403020204" pitchFamily="34" charset="0"/>
+              </a:rPr>
+              <a:t>Leisure</a:t>
+            </a:r>
+          </a:p>
+        </p:txBody>
+      </p:sp>
+    </p:spTree>
+    <p:extLst>
+      <p:ext uri="{BB962C8B-B14F-4D97-AF65-F5344CB8AC3E}">
+        <p14:creationId xmlns:p14="http://schemas.microsoft.com/office/powerpoint/2010/main" val="1255290484"/>
+      </p:ext>
+    </p:extLst>
+  </p:cSld>
+  <p:clrMapOvr>
+    <a:masterClrMapping/>
+  </p:clrMapOvr>
+</p:sld>
+</file>
+
+<file path=ppt/slides/slide4.xml><?xml version="1.0" encoding="utf-8"?>
+<p:sld xmlns:a="http://schemas.openxmlformats.org/drawingml/2006/main" xmlns:r="http://schemas.openxmlformats.org/officeDocument/2006/relationships" xmlns:p="http://schemas.openxmlformats.org/presentationml/2006/main">
+  <p:cSld>
+    <p:spTree>
+      <p:nvGrpSpPr>
+        <p:cNvPr id="1" name=""/>
+        <p:cNvGrpSpPr/>
+        <p:nvPr/>
+      </p:nvGrpSpPr>
+      <p:grpSpPr>
+        <a:xfrm>
+          <a:off x="0" y="0"/>
+          <a:ext cx="0" cy="0"/>
+          <a:chOff x="0" y="0"/>
+          <a:chExt cx="0" cy="0"/>
+        </a:xfrm>
+      </p:grpSpPr>
+      <p:sp>
+        <p:nvSpPr>
+          <p:cNvPr id="4" name="ZoneTexte 3">
+            <a:extLst>
+              <a:ext uri="{FF2B5EF4-FFF2-40B4-BE49-F238E27FC236}">
+                <a16:creationId xmlns:a16="http://schemas.microsoft.com/office/drawing/2014/main" id="{368709CE-ECB6-4DC7-93FF-D0156A80BEE8}"/>
+              </a:ext>
+            </a:extLst>
+          </p:cNvPr>
+          <p:cNvSpPr txBox="1"/>
+          <p:nvPr/>
+        </p:nvSpPr>
+        <p:spPr>
+          <a:xfrm>
+            <a:off x="545284" y="218113"/>
+            <a:ext cx="2383345" cy="523220"/>
+          </a:xfrm>
+          <a:prstGeom prst="rect">
+            <a:avLst/>
+          </a:prstGeom>
+          <a:noFill/>
+        </p:spPr>
+        <p:txBody>
+          <a:bodyPr wrap="none" rtlCol="0">
+            <a:spAutoFit/>
+          </a:bodyPr>
+          <a:lstStyle/>
+          <a:p>
+            <a:r>
+              <a:rPr lang="fr-FR" sz="2800" dirty="0">
+                <a:solidFill>
+                  <a:srgbClr val="DC0014"/>
+                </a:solidFill>
+                <a:latin typeface="Myriad Pro" panose="020B0503030403020204" pitchFamily="34" charset="0"/>
+              </a:rPr>
+              <a:t>FAST</a:t>
+            </a:r>
+            <a:r>
+              <a:rPr lang="fr-FR" sz="2800" dirty="0">
+                <a:latin typeface="Myriad Pro" panose="020B0503030403020204" pitchFamily="34" charset="0"/>
+              </a:rPr>
+              <a:t> GROWTH</a:t>
+            </a:r>
+          </a:p>
+        </p:txBody>
+      </p:sp>
+      <p:cxnSp>
+        <p:nvCxnSpPr>
+          <p:cNvPr id="5" name="Connecteur droit 4">
+            <a:extLst>
+              <a:ext uri="{FF2B5EF4-FFF2-40B4-BE49-F238E27FC236}">
+                <a16:creationId xmlns:a16="http://schemas.microsoft.com/office/drawing/2014/main" id="{9E5645B6-E200-4EB4-A0D6-FF14BA9FAE47}"/>
+              </a:ext>
+            </a:extLst>
+          </p:cNvPr>
+          <p:cNvCxnSpPr>
+            <a:cxnSpLocks/>
+          </p:cNvCxnSpPr>
+          <p:nvPr/>
+        </p:nvCxnSpPr>
+        <p:spPr>
+          <a:xfrm>
+            <a:off x="-8389" y="889233"/>
+            <a:ext cx="12200389" cy="0"/>
+          </a:xfrm>
+          <a:prstGeom prst="line">
+            <a:avLst/>
+          </a:prstGeom>
+          <a:ln w="38100">
+            <a:solidFill>
+              <a:srgbClr val="E6E6E6"/>
+            </a:solidFill>
+          </a:ln>
+        </p:spPr>
+        <p:style>
+          <a:lnRef idx="1">
+            <a:schemeClr val="accent1"/>
+          </a:lnRef>
+          <a:fillRef idx="0">
+            <a:schemeClr val="accent1"/>
+          </a:fillRef>
+          <a:effectRef idx="0">
+            <a:schemeClr val="accent1"/>
+          </a:effectRef>
+          <a:fontRef idx="minor">
+            <a:schemeClr val="tx1"/>
+          </a:fontRef>
+        </p:style>
+      </p:cxnSp>
+      <p:sp>
+        <p:nvSpPr>
+          <p:cNvPr id="6" name="ZoneTexte 5">
+            <a:extLst>
+              <a:ext uri="{FF2B5EF4-FFF2-40B4-BE49-F238E27FC236}">
+                <a16:creationId xmlns:a16="http://schemas.microsoft.com/office/drawing/2014/main" id="{0E7E6FAD-E7C1-485E-9AA2-B36B66BCA8FD}"/>
+              </a:ext>
+            </a:extLst>
+          </p:cNvPr>
+          <p:cNvSpPr txBox="1"/>
+          <p:nvPr/>
+        </p:nvSpPr>
+        <p:spPr>
+          <a:xfrm>
+            <a:off x="5945157" y="6488668"/>
+            <a:ext cx="301686" cy="369332"/>
+          </a:xfrm>
+          <a:prstGeom prst="rect">
+            <a:avLst/>
+          </a:prstGeom>
+          <a:noFill/>
+        </p:spPr>
+        <p:txBody>
+          <a:bodyPr wrap="none" rtlCol="0">
+            <a:spAutoFit/>
+          </a:bodyPr>
+          <a:lstStyle/>
+          <a:p>
+            <a:r>
+              <a:rPr lang="fr-FR" dirty="0"/>
+              <a:t>3</a:t>
+            </a:r>
+          </a:p>
+        </p:txBody>
+      </p:sp>
+      <p:pic>
+        <p:nvPicPr>
+          <p:cNvPr id="7" name="Image 6">
+            <a:extLst>
+              <a:ext uri="{FF2B5EF4-FFF2-40B4-BE49-F238E27FC236}">
+                <a16:creationId xmlns:a16="http://schemas.microsoft.com/office/drawing/2014/main" id="{31259367-3DA9-451C-8906-C1CB76648024}"/>
+              </a:ext>
+            </a:extLst>
+          </p:cNvPr>
+          <p:cNvPicPr>
+            <a:picLocks noChangeAspect="1"/>
+          </p:cNvPicPr>
+          <p:nvPr/>
+        </p:nvPicPr>
+        <p:blipFill>
+          <a:blip r:embed="rId2"/>
+          <a:stretch>
+            <a:fillRect/>
+          </a:stretch>
+        </p:blipFill>
+        <p:spPr>
+          <a:xfrm>
+            <a:off x="10423008" y="6384240"/>
+            <a:ext cx="1626117" cy="323503"/>
+          </a:xfrm>
+          <a:prstGeom prst="rect">
+            <a:avLst/>
+          </a:prstGeom>
+        </p:spPr>
+      </p:pic>
+      <p:pic>
+        <p:nvPicPr>
+          <p:cNvPr id="8" name="Image 7">
+            <a:extLst>
+              <a:ext uri="{FF2B5EF4-FFF2-40B4-BE49-F238E27FC236}">
+                <a16:creationId xmlns:a16="http://schemas.microsoft.com/office/drawing/2014/main" id="{203A1333-E908-4AD8-92ED-18F896139C41}"/>
+              </a:ext>
+            </a:extLst>
+          </p:cNvPr>
+          <p:cNvPicPr>
+            <a:picLocks noChangeAspect="1"/>
+          </p:cNvPicPr>
+          <p:nvPr/>
+        </p:nvPicPr>
+        <p:blipFill rotWithShape="1">
+          <a:blip r:embed="rId3"/>
+          <a:srcRect l="10742" t="3334" r="11195" b="2666"/>
+          <a:stretch/>
+        </p:blipFill>
+        <p:spPr>
+          <a:xfrm>
+            <a:off x="8467725" y="1889542"/>
+            <a:ext cx="3192446" cy="3367593"/>
+          </a:xfrm>
+          <a:prstGeom prst="rect">
+            <a:avLst/>
+          </a:prstGeom>
+        </p:spPr>
+      </p:pic>
+      <p:cxnSp>
+        <p:nvCxnSpPr>
+          <p:cNvPr id="9" name="Connecteur droit 8">
+            <a:extLst>
+              <a:ext uri="{FF2B5EF4-FFF2-40B4-BE49-F238E27FC236}">
+                <a16:creationId xmlns:a16="http://schemas.microsoft.com/office/drawing/2014/main" id="{C1B85427-3686-40BD-A35C-3FB925ED3E44}"/>
+              </a:ext>
+            </a:extLst>
+          </p:cNvPr>
+          <p:cNvCxnSpPr>
+            <a:cxnSpLocks/>
+          </p:cNvCxnSpPr>
+          <p:nvPr/>
+        </p:nvCxnSpPr>
+        <p:spPr>
+          <a:xfrm>
+            <a:off x="3911911" y="1293893"/>
+            <a:ext cx="0" cy="4271019"/>
+          </a:xfrm>
+          <a:prstGeom prst="line">
+            <a:avLst/>
+          </a:prstGeom>
+          <a:ln w="50800">
+            <a:solidFill>
+              <a:srgbClr val="E6E6E6"/>
+            </a:solidFill>
+            <a:prstDash val="sysDot"/>
+            <a:tailEnd type="none"/>
+          </a:ln>
+        </p:spPr>
+        <p:style>
+          <a:lnRef idx="1">
+            <a:schemeClr val="accent1"/>
+          </a:lnRef>
+          <a:fillRef idx="0">
+            <a:schemeClr val="accent1"/>
+          </a:fillRef>
+          <a:effectRef idx="0">
+            <a:schemeClr val="accent1"/>
+          </a:effectRef>
+          <a:fontRef idx="minor">
+            <a:schemeClr val="tx1"/>
+          </a:fontRef>
+        </p:style>
+      </p:cxnSp>
+      <p:sp>
+        <p:nvSpPr>
+          <p:cNvPr id="10" name="Ellipse 9">
+            <a:extLst>
+              <a:ext uri="{FF2B5EF4-FFF2-40B4-BE49-F238E27FC236}">
+                <a16:creationId xmlns:a16="http://schemas.microsoft.com/office/drawing/2014/main" id="{9A7F52B2-CFCD-46E2-AEDB-BF4AB3C78F2A}"/>
+              </a:ext>
+            </a:extLst>
+          </p:cNvPr>
+          <p:cNvSpPr/>
+          <p:nvPr/>
+        </p:nvSpPr>
+        <p:spPr>
+          <a:xfrm>
+            <a:off x="3831436" y="5474424"/>
+            <a:ext cx="180000" cy="180975"/>
+          </a:xfrm>
+          <a:prstGeom prst="ellipse">
+            <a:avLst/>
+          </a:prstGeom>
+          <a:solidFill>
+            <a:srgbClr val="DC0014"/>
+          </a:solidFill>
+          <a:ln>
+            <a:noFill/>
+          </a:ln>
+        </p:spPr>
+        <p:style>
+          <a:lnRef idx="2">
+            <a:schemeClr val="accent1">
+              <a:shade val="50000"/>
+            </a:schemeClr>
+          </a:lnRef>
+          <a:fillRef idx="1">
+            <a:schemeClr val="accent1"/>
+          </a:fillRef>
+          <a:effectRef idx="0">
+            <a:schemeClr val="accent1"/>
+          </a:effectRef>
+          <a:fontRef idx="minor">
+            <a:schemeClr val="lt1"/>
+          </a:fontRef>
+        </p:style>
+        <p:txBody>
+          <a:bodyPr rtlCol="0" anchor="ctr"/>
+          <a:lstStyle/>
+          <a:p>
+            <a:pPr algn="ctr"/>
+            <a:endParaRPr lang="fr-FR"/>
+          </a:p>
+        </p:txBody>
+      </p:sp>
+      <p:sp>
+        <p:nvSpPr>
+          <p:cNvPr id="11" name="Ellipse 10">
+            <a:extLst>
+              <a:ext uri="{FF2B5EF4-FFF2-40B4-BE49-F238E27FC236}">
+                <a16:creationId xmlns:a16="http://schemas.microsoft.com/office/drawing/2014/main" id="{DB33CC34-47B2-47AB-89C1-2CE05A273EC1}"/>
+              </a:ext>
+            </a:extLst>
+          </p:cNvPr>
+          <p:cNvSpPr/>
+          <p:nvPr/>
+        </p:nvSpPr>
+        <p:spPr>
+          <a:xfrm>
+            <a:off x="3831436" y="4512399"/>
+            <a:ext cx="180000" cy="180975"/>
+          </a:xfrm>
+          <a:prstGeom prst="ellipse">
+            <a:avLst/>
+          </a:prstGeom>
+          <a:solidFill>
+            <a:srgbClr val="DC0014"/>
+          </a:solidFill>
+          <a:ln>
+            <a:noFill/>
+          </a:ln>
+        </p:spPr>
+        <p:style>
+          <a:lnRef idx="2">
+            <a:schemeClr val="accent1">
+              <a:shade val="50000"/>
+            </a:schemeClr>
+          </a:lnRef>
+          <a:fillRef idx="1">
+            <a:schemeClr val="accent1"/>
+          </a:fillRef>
+          <a:effectRef idx="0">
+            <a:schemeClr val="accent1"/>
+          </a:effectRef>
+          <a:fontRef idx="minor">
+            <a:schemeClr val="lt1"/>
+          </a:fontRef>
+        </p:style>
+        <p:txBody>
+          <a:bodyPr rtlCol="0" anchor="ctr"/>
+          <a:lstStyle/>
+          <a:p>
+            <a:pPr algn="ctr"/>
+            <a:endParaRPr lang="fr-FR"/>
+          </a:p>
+        </p:txBody>
+      </p:sp>
+      <p:sp>
+        <p:nvSpPr>
+          <p:cNvPr id="12" name="ZoneTexte 11">
+            <a:extLst>
+              <a:ext uri="{FF2B5EF4-FFF2-40B4-BE49-F238E27FC236}">
+                <a16:creationId xmlns:a16="http://schemas.microsoft.com/office/drawing/2014/main" id="{F5329A0B-9A3A-4097-9EC0-01C34D3DA038}"/>
+              </a:ext>
+            </a:extLst>
+          </p:cNvPr>
+          <p:cNvSpPr txBox="1"/>
+          <p:nvPr/>
+        </p:nvSpPr>
+        <p:spPr>
+          <a:xfrm>
+            <a:off x="4011436" y="5411022"/>
+            <a:ext cx="569387" cy="307777"/>
+          </a:xfrm>
+          <a:prstGeom prst="rect">
+            <a:avLst/>
+          </a:prstGeom>
+          <a:noFill/>
+        </p:spPr>
+        <p:txBody>
+          <a:bodyPr wrap="none" rtlCol="0">
+            <a:spAutoFit/>
+          </a:bodyPr>
+          <a:lstStyle/>
+          <a:p>
+            <a:r>
+              <a:rPr lang="fr-FR" sz="1400" b="1" dirty="0">
+                <a:solidFill>
+                  <a:srgbClr val="DC0014"/>
+                </a:solidFill>
+                <a:latin typeface="Myriad Pro" panose="020B0503030403020204" pitchFamily="34" charset="0"/>
+              </a:rPr>
+              <a:t>2000</a:t>
+            </a:r>
+          </a:p>
+        </p:txBody>
+      </p:sp>
+      <p:sp>
+        <p:nvSpPr>
+          <p:cNvPr id="13" name="ZoneTexte 12">
+            <a:extLst>
+              <a:ext uri="{FF2B5EF4-FFF2-40B4-BE49-F238E27FC236}">
+                <a16:creationId xmlns:a16="http://schemas.microsoft.com/office/drawing/2014/main" id="{9A94D6CD-1CF6-464A-A3BE-04A89DA24645}"/>
+              </a:ext>
+            </a:extLst>
+          </p:cNvPr>
+          <p:cNvSpPr txBox="1"/>
+          <p:nvPr/>
+        </p:nvSpPr>
+        <p:spPr>
+          <a:xfrm>
+            <a:off x="3262049" y="4448997"/>
+            <a:ext cx="569387" cy="307777"/>
+          </a:xfrm>
+          <a:prstGeom prst="rect">
+            <a:avLst/>
+          </a:prstGeom>
+          <a:noFill/>
+        </p:spPr>
+        <p:txBody>
+          <a:bodyPr wrap="none" rtlCol="0">
+            <a:spAutoFit/>
+          </a:bodyPr>
+          <a:lstStyle/>
+          <a:p>
+            <a:r>
+              <a:rPr lang="fr-FR" sz="1400" b="1" dirty="0">
+                <a:solidFill>
+                  <a:srgbClr val="DC0014"/>
+                </a:solidFill>
+                <a:latin typeface="Myriad Pro" panose="020B0503030403020204" pitchFamily="34" charset="0"/>
+              </a:rPr>
+              <a:t>2005</a:t>
+            </a:r>
+          </a:p>
+        </p:txBody>
+      </p:sp>
+      <p:sp>
+        <p:nvSpPr>
+          <p:cNvPr id="14" name="Ellipse 13">
+            <a:extLst>
+              <a:ext uri="{FF2B5EF4-FFF2-40B4-BE49-F238E27FC236}">
+                <a16:creationId xmlns:a16="http://schemas.microsoft.com/office/drawing/2014/main" id="{E9369B53-E86F-4491-9DCF-B2B08553BD65}"/>
+              </a:ext>
+            </a:extLst>
+          </p:cNvPr>
+          <p:cNvSpPr/>
+          <p:nvPr/>
+        </p:nvSpPr>
+        <p:spPr>
+          <a:xfrm>
+            <a:off x="3831436" y="4236321"/>
+            <a:ext cx="180000" cy="180975"/>
+          </a:xfrm>
+          <a:prstGeom prst="ellipse">
+            <a:avLst/>
+          </a:prstGeom>
+          <a:solidFill>
+            <a:srgbClr val="DC0014"/>
+          </a:solidFill>
+          <a:ln>
+            <a:noFill/>
+          </a:ln>
+        </p:spPr>
+        <p:style>
+          <a:lnRef idx="2">
+            <a:schemeClr val="accent1">
+              <a:shade val="50000"/>
+            </a:schemeClr>
+          </a:lnRef>
+          <a:fillRef idx="1">
+            <a:schemeClr val="accent1"/>
+          </a:fillRef>
+          <a:effectRef idx="0">
+            <a:schemeClr val="accent1"/>
+          </a:effectRef>
+          <a:fontRef idx="minor">
+            <a:schemeClr val="lt1"/>
+          </a:fontRef>
+        </p:style>
+        <p:txBody>
+          <a:bodyPr rtlCol="0" anchor="ctr"/>
+          <a:lstStyle/>
+          <a:p>
+            <a:pPr algn="ctr"/>
+            <a:endParaRPr lang="fr-FR"/>
+          </a:p>
+        </p:txBody>
+      </p:sp>
+      <p:sp>
+        <p:nvSpPr>
+          <p:cNvPr id="15" name="ZoneTexte 14">
+            <a:extLst>
+              <a:ext uri="{FF2B5EF4-FFF2-40B4-BE49-F238E27FC236}">
+                <a16:creationId xmlns:a16="http://schemas.microsoft.com/office/drawing/2014/main" id="{55F5061A-E414-41F7-AB6A-5FBAA5C7D722}"/>
+              </a:ext>
+            </a:extLst>
+          </p:cNvPr>
+          <p:cNvSpPr txBox="1"/>
+          <p:nvPr/>
+        </p:nvSpPr>
+        <p:spPr>
+          <a:xfrm>
+            <a:off x="4011436" y="4174284"/>
+            <a:ext cx="569387" cy="307777"/>
+          </a:xfrm>
+          <a:prstGeom prst="rect">
+            <a:avLst/>
+          </a:prstGeom>
+          <a:noFill/>
+        </p:spPr>
+        <p:txBody>
+          <a:bodyPr wrap="none" rtlCol="0">
+            <a:spAutoFit/>
+          </a:bodyPr>
+          <a:lstStyle/>
+          <a:p>
+            <a:r>
+              <a:rPr lang="fr-FR" sz="1400" b="1" dirty="0">
+                <a:solidFill>
+                  <a:srgbClr val="DC0014"/>
+                </a:solidFill>
+                <a:latin typeface="Myriad Pro" panose="020B0503030403020204" pitchFamily="34" charset="0"/>
+              </a:rPr>
+              <a:t>2006</a:t>
+            </a:r>
+          </a:p>
+        </p:txBody>
+      </p:sp>
+      <p:sp>
+        <p:nvSpPr>
+          <p:cNvPr id="16" name="Ellipse 15">
+            <a:extLst>
+              <a:ext uri="{FF2B5EF4-FFF2-40B4-BE49-F238E27FC236}">
+                <a16:creationId xmlns:a16="http://schemas.microsoft.com/office/drawing/2014/main" id="{8E85C636-1468-4DAC-B76F-B549BFAA7148}"/>
+              </a:ext>
+            </a:extLst>
+          </p:cNvPr>
+          <p:cNvSpPr/>
+          <p:nvPr/>
+        </p:nvSpPr>
+        <p:spPr>
+          <a:xfrm>
+            <a:off x="3831436" y="3518671"/>
+            <a:ext cx="180000" cy="180975"/>
+          </a:xfrm>
+          <a:prstGeom prst="ellipse">
+            <a:avLst/>
+          </a:prstGeom>
+          <a:solidFill>
+            <a:srgbClr val="DC0014"/>
+          </a:solidFill>
+          <a:ln>
+            <a:noFill/>
+          </a:ln>
+        </p:spPr>
+        <p:style>
+          <a:lnRef idx="2">
+            <a:schemeClr val="accent1">
+              <a:shade val="50000"/>
+            </a:schemeClr>
+          </a:lnRef>
+          <a:fillRef idx="1">
+            <a:schemeClr val="accent1"/>
+          </a:fillRef>
+          <a:effectRef idx="0">
+            <a:schemeClr val="accent1"/>
+          </a:effectRef>
+          <a:fontRef idx="minor">
+            <a:schemeClr val="lt1"/>
+          </a:fontRef>
+        </p:style>
+        <p:txBody>
+          <a:bodyPr rtlCol="0" anchor="ctr"/>
+          <a:lstStyle/>
+          <a:p>
+            <a:pPr algn="ctr"/>
+            <a:endParaRPr lang="fr-FR"/>
+          </a:p>
+        </p:txBody>
+      </p:sp>
+      <p:sp>
+        <p:nvSpPr>
+          <p:cNvPr id="17" name="ZoneTexte 16">
+            <a:extLst>
+              <a:ext uri="{FF2B5EF4-FFF2-40B4-BE49-F238E27FC236}">
+                <a16:creationId xmlns:a16="http://schemas.microsoft.com/office/drawing/2014/main" id="{14FF3D03-6C5B-46C8-B9AF-1354ACE2FD9A}"/>
+              </a:ext>
+            </a:extLst>
+          </p:cNvPr>
+          <p:cNvSpPr txBox="1"/>
+          <p:nvPr/>
+        </p:nvSpPr>
+        <p:spPr>
+          <a:xfrm>
+            <a:off x="3262049" y="3460975"/>
+            <a:ext cx="569387" cy="307777"/>
+          </a:xfrm>
+          <a:prstGeom prst="rect">
+            <a:avLst/>
+          </a:prstGeom>
+          <a:noFill/>
+        </p:spPr>
+        <p:txBody>
+          <a:bodyPr wrap="none" rtlCol="0">
+            <a:spAutoFit/>
+          </a:bodyPr>
+          <a:lstStyle/>
+          <a:p>
+            <a:r>
+              <a:rPr lang="fr-FR" sz="1400" b="1" dirty="0">
+                <a:solidFill>
+                  <a:srgbClr val="DC0014"/>
+                </a:solidFill>
+                <a:latin typeface="Myriad Pro" panose="020B0503030403020204" pitchFamily="34" charset="0"/>
+              </a:rPr>
+              <a:t>2009</a:t>
+            </a:r>
+          </a:p>
+        </p:txBody>
+      </p:sp>
+      <p:sp>
+        <p:nvSpPr>
+          <p:cNvPr id="18" name="Ellipse 17">
+            <a:extLst>
+              <a:ext uri="{FF2B5EF4-FFF2-40B4-BE49-F238E27FC236}">
+                <a16:creationId xmlns:a16="http://schemas.microsoft.com/office/drawing/2014/main" id="{1D0DC362-9DD6-40C9-BED0-191FE49C9D4F}"/>
+              </a:ext>
+            </a:extLst>
+          </p:cNvPr>
+          <p:cNvSpPr/>
+          <p:nvPr/>
+        </p:nvSpPr>
+        <p:spPr>
+          <a:xfrm>
+            <a:off x="3831436" y="2921175"/>
+            <a:ext cx="180000" cy="180975"/>
+          </a:xfrm>
+          <a:prstGeom prst="ellipse">
+            <a:avLst/>
+          </a:prstGeom>
+          <a:solidFill>
+            <a:srgbClr val="DC0014"/>
+          </a:solidFill>
+          <a:ln>
+            <a:noFill/>
+          </a:ln>
+        </p:spPr>
+        <p:style>
+          <a:lnRef idx="2">
+            <a:schemeClr val="accent1">
+              <a:shade val="50000"/>
+            </a:schemeClr>
+          </a:lnRef>
+          <a:fillRef idx="1">
+            <a:schemeClr val="accent1"/>
+          </a:fillRef>
+          <a:effectRef idx="0">
+            <a:schemeClr val="accent1"/>
+          </a:effectRef>
+          <a:fontRef idx="minor">
+            <a:schemeClr val="lt1"/>
+          </a:fontRef>
+        </p:style>
+        <p:txBody>
+          <a:bodyPr rtlCol="0" anchor="ctr"/>
+          <a:lstStyle/>
+          <a:p>
+            <a:pPr algn="ctr"/>
+            <a:endParaRPr lang="fr-FR"/>
+          </a:p>
+        </p:txBody>
+      </p:sp>
+      <p:sp>
+        <p:nvSpPr>
+          <p:cNvPr id="19" name="ZoneTexte 18">
+            <a:extLst>
+              <a:ext uri="{FF2B5EF4-FFF2-40B4-BE49-F238E27FC236}">
+                <a16:creationId xmlns:a16="http://schemas.microsoft.com/office/drawing/2014/main" id="{8CBAAFD5-8705-4A0F-8605-65C3558AB66A}"/>
+              </a:ext>
+            </a:extLst>
+          </p:cNvPr>
+          <p:cNvSpPr txBox="1"/>
+          <p:nvPr/>
+        </p:nvSpPr>
+        <p:spPr>
+          <a:xfrm>
+            <a:off x="4011435" y="2861268"/>
+            <a:ext cx="569387" cy="307777"/>
+          </a:xfrm>
+          <a:prstGeom prst="rect">
+            <a:avLst/>
+          </a:prstGeom>
+          <a:noFill/>
+        </p:spPr>
+        <p:txBody>
+          <a:bodyPr wrap="none" rtlCol="0">
+            <a:spAutoFit/>
+          </a:bodyPr>
+          <a:lstStyle/>
+          <a:p>
+            <a:r>
+              <a:rPr lang="fr-FR" sz="1400" b="1" dirty="0">
+                <a:solidFill>
+                  <a:srgbClr val="DC0014"/>
+                </a:solidFill>
+                <a:latin typeface="Myriad Pro" panose="020B0503030403020204" pitchFamily="34" charset="0"/>
+              </a:rPr>
+              <a:t>2011</a:t>
+            </a:r>
+          </a:p>
+        </p:txBody>
+      </p:sp>
+      <p:sp>
+        <p:nvSpPr>
+          <p:cNvPr id="20" name="Ellipse 19">
+            <a:extLst>
+              <a:ext uri="{FF2B5EF4-FFF2-40B4-BE49-F238E27FC236}">
+                <a16:creationId xmlns:a16="http://schemas.microsoft.com/office/drawing/2014/main" id="{8A2ECADF-55BD-4E31-BED9-45A7BA7ED864}"/>
+              </a:ext>
+            </a:extLst>
+          </p:cNvPr>
+          <p:cNvSpPr/>
+          <p:nvPr/>
+        </p:nvSpPr>
+        <p:spPr>
+          <a:xfrm>
+            <a:off x="3831436" y="2437588"/>
+            <a:ext cx="180000" cy="180975"/>
+          </a:xfrm>
+          <a:prstGeom prst="ellipse">
+            <a:avLst/>
+          </a:prstGeom>
+          <a:solidFill>
+            <a:srgbClr val="DC0014"/>
+          </a:solidFill>
+          <a:ln>
+            <a:noFill/>
+          </a:ln>
+        </p:spPr>
+        <p:style>
+          <a:lnRef idx="2">
+            <a:schemeClr val="accent1">
+              <a:shade val="50000"/>
+            </a:schemeClr>
+          </a:lnRef>
+          <a:fillRef idx="1">
+            <a:schemeClr val="accent1"/>
+          </a:fillRef>
+          <a:effectRef idx="0">
+            <a:schemeClr val="accent1"/>
+          </a:effectRef>
+          <a:fontRef idx="minor">
+            <a:schemeClr val="lt1"/>
+          </a:fontRef>
+        </p:style>
+        <p:txBody>
+          <a:bodyPr rtlCol="0" anchor="ctr"/>
+          <a:lstStyle/>
+          <a:p>
+            <a:pPr algn="ctr"/>
+            <a:endParaRPr lang="fr-FR"/>
+          </a:p>
+        </p:txBody>
+      </p:sp>
+      <p:sp>
+        <p:nvSpPr>
+          <p:cNvPr id="21" name="ZoneTexte 20">
+            <a:extLst>
+              <a:ext uri="{FF2B5EF4-FFF2-40B4-BE49-F238E27FC236}">
+                <a16:creationId xmlns:a16="http://schemas.microsoft.com/office/drawing/2014/main" id="{3BC96C21-B59A-4A85-A45F-77C80F2D0E60}"/>
+              </a:ext>
+            </a:extLst>
+          </p:cNvPr>
+          <p:cNvSpPr txBox="1"/>
+          <p:nvPr/>
+        </p:nvSpPr>
+        <p:spPr>
+          <a:xfrm>
+            <a:off x="3262049" y="2376762"/>
+            <a:ext cx="569387" cy="307777"/>
+          </a:xfrm>
+          <a:prstGeom prst="rect">
+            <a:avLst/>
+          </a:prstGeom>
+          <a:noFill/>
+        </p:spPr>
+        <p:txBody>
+          <a:bodyPr wrap="none" rtlCol="0">
+            <a:spAutoFit/>
+          </a:bodyPr>
+          <a:lstStyle/>
+          <a:p>
+            <a:r>
+              <a:rPr lang="fr-FR" sz="1400" b="1" dirty="0">
+                <a:solidFill>
+                  <a:srgbClr val="DC0014"/>
+                </a:solidFill>
+                <a:latin typeface="Myriad Pro" panose="020B0503030403020204" pitchFamily="34" charset="0"/>
+              </a:rPr>
+              <a:t>2013</a:t>
+            </a:r>
+          </a:p>
+        </p:txBody>
+      </p:sp>
+      <p:sp>
+        <p:nvSpPr>
+          <p:cNvPr id="22" name="Ellipse 21">
+            <a:extLst>
+              <a:ext uri="{FF2B5EF4-FFF2-40B4-BE49-F238E27FC236}">
+                <a16:creationId xmlns:a16="http://schemas.microsoft.com/office/drawing/2014/main" id="{F04FB4A2-5F28-490D-9B19-7B12F2AC065C}"/>
+              </a:ext>
+            </a:extLst>
+          </p:cNvPr>
+          <p:cNvSpPr/>
+          <p:nvPr/>
+        </p:nvSpPr>
+        <p:spPr>
+          <a:xfrm>
+            <a:off x="3831436" y="2068556"/>
+            <a:ext cx="180000" cy="180975"/>
+          </a:xfrm>
+          <a:prstGeom prst="ellipse">
+            <a:avLst/>
+          </a:prstGeom>
+          <a:solidFill>
+            <a:srgbClr val="DC0014"/>
+          </a:solidFill>
+          <a:ln>
+            <a:noFill/>
+          </a:ln>
+        </p:spPr>
+        <p:style>
+          <a:lnRef idx="2">
+            <a:schemeClr val="accent1">
+              <a:shade val="50000"/>
+            </a:schemeClr>
+          </a:lnRef>
+          <a:fillRef idx="1">
+            <a:schemeClr val="accent1"/>
+          </a:fillRef>
+          <a:effectRef idx="0">
+            <a:schemeClr val="accent1"/>
+          </a:effectRef>
+          <a:fontRef idx="minor">
+            <a:schemeClr val="lt1"/>
+          </a:fontRef>
+        </p:style>
+        <p:txBody>
+          <a:bodyPr rtlCol="0" anchor="ctr"/>
+          <a:lstStyle/>
+          <a:p>
+            <a:pPr algn="ctr"/>
+            <a:endParaRPr lang="fr-FR"/>
+          </a:p>
+        </p:txBody>
+      </p:sp>
+      <p:sp>
+        <p:nvSpPr>
+          <p:cNvPr id="23" name="ZoneTexte 22">
+            <a:extLst>
+              <a:ext uri="{FF2B5EF4-FFF2-40B4-BE49-F238E27FC236}">
+                <a16:creationId xmlns:a16="http://schemas.microsoft.com/office/drawing/2014/main" id="{0BBF051E-39F2-4371-A0D0-71E1B80EBF5F}"/>
+              </a:ext>
+            </a:extLst>
+          </p:cNvPr>
+          <p:cNvSpPr txBox="1"/>
+          <p:nvPr/>
+        </p:nvSpPr>
+        <p:spPr>
+          <a:xfrm>
+            <a:off x="4011435" y="2005154"/>
+            <a:ext cx="569387" cy="307777"/>
+          </a:xfrm>
+          <a:prstGeom prst="rect">
+            <a:avLst/>
+          </a:prstGeom>
+          <a:noFill/>
+        </p:spPr>
+        <p:txBody>
+          <a:bodyPr wrap="none" rtlCol="0">
+            <a:spAutoFit/>
+          </a:bodyPr>
+          <a:lstStyle/>
+          <a:p>
+            <a:r>
+              <a:rPr lang="fr-FR" sz="1400" b="1" dirty="0">
+                <a:solidFill>
+                  <a:srgbClr val="DC0014"/>
+                </a:solidFill>
+                <a:latin typeface="Myriad Pro" panose="020B0503030403020204" pitchFamily="34" charset="0"/>
+              </a:rPr>
+              <a:t>2014</a:t>
+            </a:r>
+          </a:p>
+        </p:txBody>
+      </p:sp>
+      <p:sp>
+        <p:nvSpPr>
+          <p:cNvPr id="24" name="ZoneTexte 23">
+            <a:extLst>
+              <a:ext uri="{FF2B5EF4-FFF2-40B4-BE49-F238E27FC236}">
+                <a16:creationId xmlns:a16="http://schemas.microsoft.com/office/drawing/2014/main" id="{35B23754-4474-49DB-9760-EE499E85989A}"/>
+              </a:ext>
+            </a:extLst>
+          </p:cNvPr>
+          <p:cNvSpPr txBox="1"/>
+          <p:nvPr/>
+        </p:nvSpPr>
+        <p:spPr>
+          <a:xfrm>
+            <a:off x="9173448" y="5257135"/>
+            <a:ext cx="1781000" cy="307777"/>
+          </a:xfrm>
+          <a:prstGeom prst="rect">
+            <a:avLst/>
+          </a:prstGeom>
+          <a:noFill/>
+        </p:spPr>
+        <p:txBody>
+          <a:bodyPr wrap="none" rtlCol="0">
+            <a:spAutoFit/>
+          </a:bodyPr>
+          <a:lstStyle/>
+          <a:p>
+            <a:r>
+              <a:rPr lang="fr-FR" sz="1400" i="1" dirty="0" err="1">
+                <a:latin typeface="Myriad Pro" panose="020B0503030403020204" pitchFamily="34" charset="0"/>
+              </a:rPr>
+              <a:t>Evolis</a:t>
+            </a:r>
+            <a:r>
+              <a:rPr lang="fr-FR" sz="1400" i="1" dirty="0">
+                <a:latin typeface="Myriad Pro" panose="020B0503030403020204" pitchFamily="34" charset="0"/>
+              </a:rPr>
+              <a:t> revenues in M€</a:t>
+            </a:r>
+          </a:p>
+        </p:txBody>
+      </p:sp>
+      <p:cxnSp>
+        <p:nvCxnSpPr>
+          <p:cNvPr id="25" name="Connecteur droit 24">
+            <a:extLst>
+              <a:ext uri="{FF2B5EF4-FFF2-40B4-BE49-F238E27FC236}">
+                <a16:creationId xmlns:a16="http://schemas.microsoft.com/office/drawing/2014/main" id="{E061A21F-BB6F-421B-99A1-F3B70ED06812}"/>
+              </a:ext>
+            </a:extLst>
+          </p:cNvPr>
+          <p:cNvCxnSpPr>
+            <a:cxnSpLocks/>
+          </p:cNvCxnSpPr>
+          <p:nvPr/>
+        </p:nvCxnSpPr>
+        <p:spPr>
+          <a:xfrm flipH="1">
+            <a:off x="3714750" y="1304259"/>
+            <a:ext cx="209073" cy="227622"/>
+          </a:xfrm>
+          <a:prstGeom prst="line">
+            <a:avLst/>
+          </a:prstGeom>
+          <a:ln w="50800">
+            <a:solidFill>
+              <a:srgbClr val="E6E6E6"/>
+            </a:solidFill>
+            <a:prstDash val="sysDot"/>
+            <a:tailEnd type="none"/>
+          </a:ln>
+        </p:spPr>
+        <p:style>
+          <a:lnRef idx="1">
+            <a:schemeClr val="accent1"/>
+          </a:lnRef>
+          <a:fillRef idx="0">
+            <a:schemeClr val="accent1"/>
+          </a:fillRef>
+          <a:effectRef idx="0">
+            <a:schemeClr val="accent1"/>
+          </a:effectRef>
+          <a:fontRef idx="minor">
+            <a:schemeClr val="tx1"/>
+          </a:fontRef>
+        </p:style>
+      </p:cxnSp>
+      <p:cxnSp>
+        <p:nvCxnSpPr>
+          <p:cNvPr id="28" name="Connecteur droit 27">
+            <a:extLst>
+              <a:ext uri="{FF2B5EF4-FFF2-40B4-BE49-F238E27FC236}">
+                <a16:creationId xmlns:a16="http://schemas.microsoft.com/office/drawing/2014/main" id="{9F4603A4-49D9-46B6-A6B8-864D527ED298}"/>
+              </a:ext>
+            </a:extLst>
+          </p:cNvPr>
+          <p:cNvCxnSpPr>
+            <a:cxnSpLocks/>
+          </p:cNvCxnSpPr>
+          <p:nvPr/>
+        </p:nvCxnSpPr>
+        <p:spPr>
+          <a:xfrm>
+            <a:off x="3914219" y="1314117"/>
+            <a:ext cx="194854" cy="248102"/>
+          </a:xfrm>
+          <a:prstGeom prst="line">
+            <a:avLst/>
+          </a:prstGeom>
+          <a:ln w="50800">
+            <a:solidFill>
+              <a:srgbClr val="E6E6E6"/>
+            </a:solidFill>
+            <a:prstDash val="sysDot"/>
+            <a:tailEnd type="none"/>
+          </a:ln>
+        </p:spPr>
+        <p:style>
+          <a:lnRef idx="1">
+            <a:schemeClr val="accent1"/>
+          </a:lnRef>
+          <a:fillRef idx="0">
+            <a:schemeClr val="accent1"/>
+          </a:fillRef>
+          <a:effectRef idx="0">
+            <a:schemeClr val="accent1"/>
+          </a:effectRef>
+          <a:fontRef idx="minor">
+            <a:schemeClr val="tx1"/>
+          </a:fontRef>
+        </p:style>
+      </p:cxnSp>
+    </p:spTree>
+    <p:extLst>
+      <p:ext uri="{BB962C8B-B14F-4D97-AF65-F5344CB8AC3E}">
+        <p14:creationId xmlns:p14="http://schemas.microsoft.com/office/powerpoint/2010/main" val="82178631"/>
+      </p:ext>
+    </p:extLst>
+  </p:cSld>
+  <p:clrMapOvr>
+    <a:masterClrMapping/>
+  </p:clrMapOvr>
+</p:sld>
+</file>
+
+<file path=ppt/slides/slide5.xml><?xml version="1.0" encoding="utf-8"?>
+<p:sld xmlns:a="http://schemas.openxmlformats.org/drawingml/2006/main" xmlns:r="http://schemas.openxmlformats.org/officeDocument/2006/relationships" xmlns:p="http://schemas.openxmlformats.org/presentationml/2006/main">
+  <p:cSld>
+    <p:spTree>
+      <p:nvGrpSpPr>
+        <p:cNvPr id="1" name=""/>
+        <p:cNvGrpSpPr/>
+        <p:nvPr/>
+      </p:nvGrpSpPr>
+      <p:grpSpPr>
+        <a:xfrm>
+          <a:off x="0" y="0"/>
+          <a:ext cx="0" cy="0"/>
+          <a:chOff x="0" y="0"/>
+          <a:chExt cx="0" cy="0"/>
+        </a:xfrm>
+      </p:grpSpPr>
+      <p:sp>
+        <p:nvSpPr>
+          <p:cNvPr id="4" name="ZoneTexte 3">
+            <a:extLst>
+              <a:ext uri="{FF2B5EF4-FFF2-40B4-BE49-F238E27FC236}">
+                <a16:creationId xmlns:a16="http://schemas.microsoft.com/office/drawing/2014/main" id="{7EFE29B9-D2A3-43FE-9483-0C9186398D0A}"/>
+              </a:ext>
+            </a:extLst>
+          </p:cNvPr>
+          <p:cNvSpPr txBox="1"/>
+          <p:nvPr/>
+        </p:nvSpPr>
+        <p:spPr>
+          <a:xfrm>
+            <a:off x="545284" y="218113"/>
+            <a:ext cx="1795684" cy="523220"/>
+          </a:xfrm>
+          <a:prstGeom prst="rect">
+            <a:avLst/>
+          </a:prstGeom>
+          <a:noFill/>
+        </p:spPr>
+        <p:txBody>
+          <a:bodyPr wrap="none" rtlCol="0">
+            <a:spAutoFit/>
+          </a:bodyPr>
+          <a:lstStyle/>
+          <a:p>
+            <a:r>
+              <a:rPr lang="fr-FR" sz="2800" dirty="0">
+                <a:solidFill>
+                  <a:srgbClr val="DC0014"/>
+                </a:solidFill>
+                <a:latin typeface="Myriad Pro" panose="020B0503030403020204" pitchFamily="34" charset="0"/>
+              </a:rPr>
+              <a:t>FIRST TASK</a:t>
+            </a:r>
+            <a:endParaRPr lang="fr-FR" sz="2800" dirty="0">
+              <a:latin typeface="Myriad Pro" panose="020B0503030403020204" pitchFamily="34" charset="0"/>
+            </a:endParaRPr>
+          </a:p>
+        </p:txBody>
+      </p:sp>
+      <p:cxnSp>
+        <p:nvCxnSpPr>
+          <p:cNvPr id="5" name="Connecteur droit 4">
+            <a:extLst>
+              <a:ext uri="{FF2B5EF4-FFF2-40B4-BE49-F238E27FC236}">
+                <a16:creationId xmlns:a16="http://schemas.microsoft.com/office/drawing/2014/main" id="{11EE7AEE-0C3A-41DB-B6B9-718414399470}"/>
+              </a:ext>
+            </a:extLst>
+          </p:cNvPr>
+          <p:cNvCxnSpPr>
+            <a:cxnSpLocks/>
+          </p:cNvCxnSpPr>
+          <p:nvPr/>
+        </p:nvCxnSpPr>
+        <p:spPr>
+          <a:xfrm>
+            <a:off x="-8389" y="889233"/>
+            <a:ext cx="12200389" cy="0"/>
+          </a:xfrm>
+          <a:prstGeom prst="line">
+            <a:avLst/>
+          </a:prstGeom>
+          <a:ln w="38100">
+            <a:solidFill>
+              <a:srgbClr val="E6E6E6"/>
+            </a:solidFill>
+          </a:ln>
+        </p:spPr>
+        <p:style>
+          <a:lnRef idx="1">
+            <a:schemeClr val="accent1"/>
+          </a:lnRef>
+          <a:fillRef idx="0">
+            <a:schemeClr val="accent1"/>
+          </a:fillRef>
+          <a:effectRef idx="0">
+            <a:schemeClr val="accent1"/>
+          </a:effectRef>
+          <a:fontRef idx="minor">
+            <a:schemeClr val="tx1"/>
+          </a:fontRef>
+        </p:style>
+      </p:cxnSp>
+      <p:sp>
+        <p:nvSpPr>
+          <p:cNvPr id="6" name="ZoneTexte 5">
+            <a:extLst>
+              <a:ext uri="{FF2B5EF4-FFF2-40B4-BE49-F238E27FC236}">
+                <a16:creationId xmlns:a16="http://schemas.microsoft.com/office/drawing/2014/main" id="{0CDBC43D-8EE5-46B9-8D1C-AA7C24AD1AF4}"/>
+              </a:ext>
+            </a:extLst>
+          </p:cNvPr>
+          <p:cNvSpPr txBox="1"/>
+          <p:nvPr/>
+        </p:nvSpPr>
+        <p:spPr>
+          <a:xfrm>
+            <a:off x="5945157" y="6488668"/>
+            <a:ext cx="301686" cy="369332"/>
+          </a:xfrm>
+          <a:prstGeom prst="rect">
+            <a:avLst/>
+          </a:prstGeom>
+          <a:noFill/>
+        </p:spPr>
+        <p:txBody>
+          <a:bodyPr wrap="none" rtlCol="0">
+            <a:spAutoFit/>
+          </a:bodyPr>
+          <a:lstStyle/>
+          <a:p>
+            <a:r>
+              <a:rPr lang="fr-FR" dirty="0"/>
+              <a:t>4</a:t>
+            </a:r>
+          </a:p>
+        </p:txBody>
+      </p:sp>
+      <p:pic>
+        <p:nvPicPr>
+          <p:cNvPr id="7" name="Image 6">
+            <a:extLst>
+              <a:ext uri="{FF2B5EF4-FFF2-40B4-BE49-F238E27FC236}">
+                <a16:creationId xmlns:a16="http://schemas.microsoft.com/office/drawing/2014/main" id="{EE3B6107-4A73-4A4E-B8A8-408396CF5F03}"/>
+              </a:ext>
+            </a:extLst>
+          </p:cNvPr>
+          <p:cNvPicPr>
+            <a:picLocks noChangeAspect="1"/>
+          </p:cNvPicPr>
+          <p:nvPr/>
+        </p:nvPicPr>
+        <p:blipFill>
+          <a:blip r:embed="rId2"/>
+          <a:stretch>
+            <a:fillRect/>
+          </a:stretch>
+        </p:blipFill>
+        <p:spPr>
+          <a:xfrm>
+            <a:off x="10423008" y="6384240"/>
+            <a:ext cx="1626117" cy="323503"/>
+          </a:xfrm>
+          <a:prstGeom prst="rect">
+            <a:avLst/>
+          </a:prstGeom>
+        </p:spPr>
+      </p:pic>
+    </p:spTree>
+    <p:extLst>
+      <p:ext uri="{BB962C8B-B14F-4D97-AF65-F5344CB8AC3E}">
+        <p14:creationId xmlns:p14="http://schemas.microsoft.com/office/powerpoint/2010/main" val="2130716136"/>
+      </p:ext>
+    </p:extLst>
+  </p:cSld>
+  <p:clrMapOvr>
+    <a:masterClrMapping/>
+  </p:clrMapOvr>
+</p:sld>
+</file>
+
+<file path=ppt/slides/slide6.xml><?xml version="1.0" encoding="utf-8"?>
+<p:sld xmlns:a="http://schemas.openxmlformats.org/drawingml/2006/main" xmlns:r="http://schemas.openxmlformats.org/officeDocument/2006/relationships" xmlns:p="http://schemas.openxmlformats.org/presentationml/2006/main">
+  <p:cSld>
+    <p:spTree>
+      <p:nvGrpSpPr>
+        <p:cNvPr id="1" name=""/>
+        <p:cNvGrpSpPr/>
+        <p:nvPr/>
+      </p:nvGrpSpPr>
+      <p:grpSpPr>
+        <a:xfrm>
+          <a:off x="0" y="0"/>
+          <a:ext cx="0" cy="0"/>
+          <a:chOff x="0" y="0"/>
+          <a:chExt cx="0" cy="0"/>
+        </a:xfrm>
+      </p:grpSpPr>
+      <p:sp>
+        <p:nvSpPr>
+          <p:cNvPr id="4" name="ZoneTexte 3">
+            <a:extLst>
+              <a:ext uri="{FF2B5EF4-FFF2-40B4-BE49-F238E27FC236}">
+                <a16:creationId xmlns:a16="http://schemas.microsoft.com/office/drawing/2014/main" id="{7EFE29B9-D2A3-43FE-9483-0C9186398D0A}"/>
+              </a:ext>
+            </a:extLst>
+          </p:cNvPr>
+          <p:cNvSpPr txBox="1"/>
+          <p:nvPr/>
+        </p:nvSpPr>
+        <p:spPr>
+          <a:xfrm>
+            <a:off x="545284" y="218113"/>
+            <a:ext cx="1795684" cy="523220"/>
+          </a:xfrm>
+          <a:prstGeom prst="rect">
+            <a:avLst/>
+          </a:prstGeom>
+          <a:noFill/>
+        </p:spPr>
+        <p:txBody>
+          <a:bodyPr wrap="none" rtlCol="0">
+            <a:spAutoFit/>
+          </a:bodyPr>
+          <a:lstStyle/>
+          <a:p>
+            <a:r>
+              <a:rPr lang="fr-FR" sz="2800" dirty="0">
+                <a:solidFill>
+                  <a:srgbClr val="DC0014"/>
+                </a:solidFill>
+                <a:latin typeface="Myriad Pro" panose="020B0503030403020204" pitchFamily="34" charset="0"/>
+              </a:rPr>
+              <a:t>FIRST TASK</a:t>
+            </a:r>
+            <a:endParaRPr lang="fr-FR" sz="2800" dirty="0">
+              <a:latin typeface="Myriad Pro" panose="020B0503030403020204" pitchFamily="34" charset="0"/>
+            </a:endParaRPr>
+          </a:p>
+        </p:txBody>
+      </p:sp>
+      <p:cxnSp>
+        <p:nvCxnSpPr>
+          <p:cNvPr id="5" name="Connecteur droit 4">
+            <a:extLst>
+              <a:ext uri="{FF2B5EF4-FFF2-40B4-BE49-F238E27FC236}">
+                <a16:creationId xmlns:a16="http://schemas.microsoft.com/office/drawing/2014/main" id="{11EE7AEE-0C3A-41DB-B6B9-718414399470}"/>
+              </a:ext>
+            </a:extLst>
+          </p:cNvPr>
+          <p:cNvCxnSpPr>
+            <a:cxnSpLocks/>
+          </p:cNvCxnSpPr>
+          <p:nvPr/>
+        </p:nvCxnSpPr>
+        <p:spPr>
+          <a:xfrm>
+            <a:off x="-8389" y="889233"/>
+            <a:ext cx="12200389" cy="0"/>
+          </a:xfrm>
+          <a:prstGeom prst="line">
+            <a:avLst/>
+          </a:prstGeom>
+          <a:ln w="38100">
+            <a:solidFill>
+              <a:srgbClr val="E6E6E6"/>
+            </a:solidFill>
+          </a:ln>
+        </p:spPr>
+        <p:style>
+          <a:lnRef idx="1">
+            <a:schemeClr val="accent1"/>
+          </a:lnRef>
+          <a:fillRef idx="0">
+            <a:schemeClr val="accent1"/>
+          </a:fillRef>
+          <a:effectRef idx="0">
+            <a:schemeClr val="accent1"/>
+          </a:effectRef>
+          <a:fontRef idx="minor">
+            <a:schemeClr val="tx1"/>
+          </a:fontRef>
+        </p:style>
+      </p:cxnSp>
+      <p:sp>
+        <p:nvSpPr>
+          <p:cNvPr id="6" name="ZoneTexte 5">
+            <a:extLst>
+              <a:ext uri="{FF2B5EF4-FFF2-40B4-BE49-F238E27FC236}">
+                <a16:creationId xmlns:a16="http://schemas.microsoft.com/office/drawing/2014/main" id="{0CDBC43D-8EE5-46B9-8D1C-AA7C24AD1AF4}"/>
+              </a:ext>
+            </a:extLst>
+          </p:cNvPr>
+          <p:cNvSpPr txBox="1"/>
+          <p:nvPr/>
+        </p:nvSpPr>
+        <p:spPr>
+          <a:xfrm>
+            <a:off x="5945157" y="6488668"/>
+            <a:ext cx="301686" cy="369332"/>
+          </a:xfrm>
+          <a:prstGeom prst="rect">
+            <a:avLst/>
+          </a:prstGeom>
+          <a:noFill/>
+        </p:spPr>
+        <p:txBody>
+          <a:bodyPr wrap="none" rtlCol="0">
+            <a:spAutoFit/>
+          </a:bodyPr>
+          <a:lstStyle/>
+          <a:p>
+            <a:r>
+              <a:rPr lang="fr-FR" dirty="0"/>
+              <a:t>4</a:t>
+            </a:r>
+          </a:p>
+        </p:txBody>
+      </p:sp>
+      <p:pic>
+        <p:nvPicPr>
+          <p:cNvPr id="7" name="Image 6">
+            <a:extLst>
+              <a:ext uri="{FF2B5EF4-FFF2-40B4-BE49-F238E27FC236}">
+                <a16:creationId xmlns:a16="http://schemas.microsoft.com/office/drawing/2014/main" id="{EE3B6107-4A73-4A4E-B8A8-408396CF5F03}"/>
+              </a:ext>
+            </a:extLst>
+          </p:cNvPr>
+          <p:cNvPicPr>
+            <a:picLocks noChangeAspect="1"/>
+          </p:cNvPicPr>
+          <p:nvPr/>
+        </p:nvPicPr>
+        <p:blipFill>
+          <a:blip r:embed="rId2"/>
+          <a:stretch>
+            <a:fillRect/>
+          </a:stretch>
+        </p:blipFill>
+        <p:spPr>
+          <a:xfrm>
+            <a:off x="10423008" y="6384240"/>
+            <a:ext cx="1626117" cy="323503"/>
+          </a:xfrm>
+          <a:prstGeom prst="rect">
+            <a:avLst/>
+          </a:prstGeom>
+        </p:spPr>
+      </p:pic>
+    </p:spTree>
+    <p:extLst>
+      <p:ext uri="{BB962C8B-B14F-4D97-AF65-F5344CB8AC3E}">
+        <p14:creationId xmlns:p14="http://schemas.microsoft.com/office/powerpoint/2010/main" val="3409510597"/>
+      </p:ext>
+    </p:extLst>
+  </p:cSld>
+  <p:clrMapOvr>
+    <a:masterClrMapping/>
+  </p:clrMapOvr>
+</p:sld>
+</file>
+
+<file path=ppt/slides/slide7.xml><?xml version="1.0" encoding="utf-8"?>
+<p:sld xmlns:a="http://schemas.openxmlformats.org/drawingml/2006/main" xmlns:r="http://schemas.openxmlformats.org/officeDocument/2006/relationships" xmlns:p="http://schemas.openxmlformats.org/presentationml/2006/main">
+  <p:cSld>
+    <p:spTree>
+      <p:nvGrpSpPr>
+        <p:cNvPr id="1" name=""/>
+        <p:cNvGrpSpPr/>
+        <p:nvPr/>
+      </p:nvGrpSpPr>
+      <p:grpSpPr>
+        <a:xfrm>
+          <a:off x="0" y="0"/>
+          <a:ext cx="0" cy="0"/>
+          <a:chOff x="0" y="0"/>
+          <a:chExt cx="0" cy="0"/>
+        </a:xfrm>
+      </p:grpSpPr>
+      <p:sp>
+        <p:nvSpPr>
+          <p:cNvPr id="4" name="ZoneTexte 3">
+            <a:extLst>
+              <a:ext uri="{FF2B5EF4-FFF2-40B4-BE49-F238E27FC236}">
+                <a16:creationId xmlns:a16="http://schemas.microsoft.com/office/drawing/2014/main" id="{7EFE29B9-D2A3-43FE-9483-0C9186398D0A}"/>
+              </a:ext>
+            </a:extLst>
+          </p:cNvPr>
+          <p:cNvSpPr txBox="1"/>
+          <p:nvPr/>
+        </p:nvSpPr>
+        <p:spPr>
+          <a:xfrm>
+            <a:off x="545284" y="218113"/>
+            <a:ext cx="2261004" cy="523220"/>
+          </a:xfrm>
+          <a:prstGeom prst="rect">
+            <a:avLst/>
+          </a:prstGeom>
+          <a:noFill/>
+        </p:spPr>
+        <p:txBody>
+          <a:bodyPr wrap="none" rtlCol="0">
+            <a:spAutoFit/>
+          </a:bodyPr>
+          <a:lstStyle/>
+          <a:p>
+            <a:r>
+              <a:rPr lang="fr-FR" sz="2800" dirty="0">
+                <a:solidFill>
+                  <a:srgbClr val="DC0014"/>
+                </a:solidFill>
+                <a:latin typeface="Myriad Pro" panose="020B0503030403020204" pitchFamily="34" charset="0"/>
+              </a:rPr>
+              <a:t>SECOND TASK</a:t>
+            </a:r>
+            <a:endParaRPr lang="fr-FR" sz="2800" dirty="0">
+              <a:latin typeface="Myriad Pro" panose="020B0503030403020204" pitchFamily="34" charset="0"/>
+            </a:endParaRPr>
+          </a:p>
+        </p:txBody>
+      </p:sp>
+      <p:cxnSp>
+        <p:nvCxnSpPr>
+          <p:cNvPr id="5" name="Connecteur droit 4">
+            <a:extLst>
+              <a:ext uri="{FF2B5EF4-FFF2-40B4-BE49-F238E27FC236}">
+                <a16:creationId xmlns:a16="http://schemas.microsoft.com/office/drawing/2014/main" id="{11EE7AEE-0C3A-41DB-B6B9-718414399470}"/>
+              </a:ext>
+            </a:extLst>
+          </p:cNvPr>
+          <p:cNvCxnSpPr>
+            <a:cxnSpLocks/>
+          </p:cNvCxnSpPr>
+          <p:nvPr/>
+        </p:nvCxnSpPr>
+        <p:spPr>
+          <a:xfrm>
+            <a:off x="-8389" y="889233"/>
+            <a:ext cx="12200389" cy="0"/>
+          </a:xfrm>
+          <a:prstGeom prst="line">
+            <a:avLst/>
+          </a:prstGeom>
+          <a:ln w="38100">
+            <a:solidFill>
+              <a:srgbClr val="E6E6E6"/>
+            </a:solidFill>
+          </a:ln>
+        </p:spPr>
+        <p:style>
+          <a:lnRef idx="1">
+            <a:schemeClr val="accent1"/>
+          </a:lnRef>
+          <a:fillRef idx="0">
+            <a:schemeClr val="accent1"/>
+          </a:fillRef>
+          <a:effectRef idx="0">
+            <a:schemeClr val="accent1"/>
+          </a:effectRef>
+          <a:fontRef idx="minor">
+            <a:schemeClr val="tx1"/>
+          </a:fontRef>
+        </p:style>
+      </p:cxnSp>
+      <p:sp>
+        <p:nvSpPr>
+          <p:cNvPr id="6" name="ZoneTexte 5">
+            <a:extLst>
+              <a:ext uri="{FF2B5EF4-FFF2-40B4-BE49-F238E27FC236}">
+                <a16:creationId xmlns:a16="http://schemas.microsoft.com/office/drawing/2014/main" id="{0CDBC43D-8EE5-46B9-8D1C-AA7C24AD1AF4}"/>
+              </a:ext>
+            </a:extLst>
+          </p:cNvPr>
+          <p:cNvSpPr txBox="1"/>
+          <p:nvPr/>
+        </p:nvSpPr>
+        <p:spPr>
+          <a:xfrm>
+            <a:off x="5945157" y="6488668"/>
+            <a:ext cx="301686" cy="369332"/>
+          </a:xfrm>
+          <a:prstGeom prst="rect">
+            <a:avLst/>
+          </a:prstGeom>
+          <a:noFill/>
+        </p:spPr>
+        <p:txBody>
+          <a:bodyPr wrap="none" rtlCol="0">
+            <a:spAutoFit/>
+          </a:bodyPr>
+          <a:lstStyle/>
+          <a:p>
+            <a:r>
+              <a:rPr lang="fr-FR" dirty="0"/>
+              <a:t>4</a:t>
+            </a:r>
+          </a:p>
+        </p:txBody>
+      </p:sp>
+      <p:pic>
+        <p:nvPicPr>
+          <p:cNvPr id="7" name="Image 6">
+            <a:extLst>
+              <a:ext uri="{FF2B5EF4-FFF2-40B4-BE49-F238E27FC236}">
+                <a16:creationId xmlns:a16="http://schemas.microsoft.com/office/drawing/2014/main" id="{EE3B6107-4A73-4A4E-B8A8-408396CF5F03}"/>
+              </a:ext>
+            </a:extLst>
+          </p:cNvPr>
+          <p:cNvPicPr>
+            <a:picLocks noChangeAspect="1"/>
+          </p:cNvPicPr>
+          <p:nvPr/>
+        </p:nvPicPr>
+        <p:blipFill>
+          <a:blip r:embed="rId2"/>
+          <a:stretch>
+            <a:fillRect/>
+          </a:stretch>
+        </p:blipFill>
+        <p:spPr>
+          <a:xfrm>
+            <a:off x="10423008" y="6384240"/>
+            <a:ext cx="1626117" cy="323503"/>
+          </a:xfrm>
+          <a:prstGeom prst="rect">
+            <a:avLst/>
+          </a:prstGeom>
+        </p:spPr>
+      </p:pic>
+    </p:spTree>
+    <p:extLst>
+      <p:ext uri="{BB962C8B-B14F-4D97-AF65-F5344CB8AC3E}">
+        <p14:creationId xmlns:p14="http://schemas.microsoft.com/office/powerpoint/2010/main" val="4223300681"/>
+      </p:ext>
+    </p:extLst>
+  </p:cSld>
+  <p:clrMapOvr>
+    <a:masterClrMapping/>
+  </p:clrMapOvr>
+</p:sld>
+</file>
+
+<file path=ppt/slides/slide8.xml><?xml version="1.0" encoding="utf-8"?>
+<p:sld xmlns:a="http://schemas.openxmlformats.org/drawingml/2006/main" xmlns:r="http://schemas.openxmlformats.org/officeDocument/2006/relationships" xmlns:p="http://schemas.openxmlformats.org/presentationml/2006/main">
+  <p:cSld>
+    <p:spTree>
+      <p:nvGrpSpPr>
+        <p:cNvPr id="1" name=""/>
+        <p:cNvGrpSpPr/>
+        <p:nvPr/>
+      </p:nvGrpSpPr>
+      <p:grpSpPr>
+        <a:xfrm>
+          <a:off x="0" y="0"/>
+          <a:ext cx="0" cy="0"/>
+          <a:chOff x="0" y="0"/>
+          <a:chExt cx="0" cy="0"/>
+        </a:xfrm>
+      </p:grpSpPr>
+      <p:sp>
+        <p:nvSpPr>
+          <p:cNvPr id="4" name="ZoneTexte 3">
+            <a:extLst>
+              <a:ext uri="{FF2B5EF4-FFF2-40B4-BE49-F238E27FC236}">
+                <a16:creationId xmlns:a16="http://schemas.microsoft.com/office/drawing/2014/main" id="{7EFE29B9-D2A3-43FE-9483-0C9186398D0A}"/>
+              </a:ext>
+            </a:extLst>
+          </p:cNvPr>
+          <p:cNvSpPr txBox="1"/>
+          <p:nvPr/>
+        </p:nvSpPr>
+        <p:spPr>
+          <a:xfrm>
+            <a:off x="545284" y="218113"/>
+            <a:ext cx="2261004" cy="523220"/>
+          </a:xfrm>
+          <a:prstGeom prst="rect">
+            <a:avLst/>
+          </a:prstGeom>
+          <a:noFill/>
+        </p:spPr>
+        <p:txBody>
+          <a:bodyPr wrap="none" rtlCol="0">
+            <a:spAutoFit/>
+          </a:bodyPr>
+          <a:lstStyle/>
+          <a:p>
+            <a:r>
+              <a:rPr lang="fr-FR" sz="2800" dirty="0">
+                <a:solidFill>
+                  <a:srgbClr val="DC0014"/>
+                </a:solidFill>
+                <a:latin typeface="Myriad Pro" panose="020B0503030403020204" pitchFamily="34" charset="0"/>
+              </a:rPr>
+              <a:t>SECOND TASK</a:t>
+            </a:r>
+            <a:endParaRPr lang="fr-FR" sz="2800" dirty="0">
+              <a:latin typeface="Myriad Pro" panose="020B0503030403020204" pitchFamily="34" charset="0"/>
+            </a:endParaRPr>
+          </a:p>
+        </p:txBody>
+      </p:sp>
+      <p:cxnSp>
+        <p:nvCxnSpPr>
+          <p:cNvPr id="5" name="Connecteur droit 4">
+            <a:extLst>
+              <a:ext uri="{FF2B5EF4-FFF2-40B4-BE49-F238E27FC236}">
+                <a16:creationId xmlns:a16="http://schemas.microsoft.com/office/drawing/2014/main" id="{11EE7AEE-0C3A-41DB-B6B9-718414399470}"/>
+              </a:ext>
+            </a:extLst>
+          </p:cNvPr>
+          <p:cNvCxnSpPr>
+            <a:cxnSpLocks/>
+          </p:cNvCxnSpPr>
+          <p:nvPr/>
+        </p:nvCxnSpPr>
+        <p:spPr>
+          <a:xfrm>
+            <a:off x="-8389" y="889233"/>
+            <a:ext cx="12200389" cy="0"/>
+          </a:xfrm>
+          <a:prstGeom prst="line">
+            <a:avLst/>
+          </a:prstGeom>
+          <a:ln w="38100">
+            <a:solidFill>
+              <a:srgbClr val="E6E6E6"/>
+            </a:solidFill>
+          </a:ln>
+        </p:spPr>
+        <p:style>
+          <a:lnRef idx="1">
+            <a:schemeClr val="accent1"/>
+          </a:lnRef>
+          <a:fillRef idx="0">
+            <a:schemeClr val="accent1"/>
+          </a:fillRef>
+          <a:effectRef idx="0">
+            <a:schemeClr val="accent1"/>
+          </a:effectRef>
+          <a:fontRef idx="minor">
+            <a:schemeClr val="tx1"/>
+          </a:fontRef>
+        </p:style>
+      </p:cxnSp>
+      <p:sp>
+        <p:nvSpPr>
+          <p:cNvPr id="6" name="ZoneTexte 5">
+            <a:extLst>
+              <a:ext uri="{FF2B5EF4-FFF2-40B4-BE49-F238E27FC236}">
+                <a16:creationId xmlns:a16="http://schemas.microsoft.com/office/drawing/2014/main" id="{0CDBC43D-8EE5-46B9-8D1C-AA7C24AD1AF4}"/>
+              </a:ext>
+            </a:extLst>
+          </p:cNvPr>
+          <p:cNvSpPr txBox="1"/>
+          <p:nvPr/>
+        </p:nvSpPr>
+        <p:spPr>
+          <a:xfrm>
+            <a:off x="5945157" y="6488668"/>
+            <a:ext cx="301686" cy="369332"/>
+          </a:xfrm>
+          <a:prstGeom prst="rect">
+            <a:avLst/>
+          </a:prstGeom>
+          <a:noFill/>
+        </p:spPr>
+        <p:txBody>
+          <a:bodyPr wrap="none" rtlCol="0">
+            <a:spAutoFit/>
+          </a:bodyPr>
+          <a:lstStyle/>
+          <a:p>
+            <a:r>
+              <a:rPr lang="fr-FR" dirty="0"/>
+              <a:t>4</a:t>
+            </a:r>
+          </a:p>
+        </p:txBody>
+      </p:sp>
+      <p:pic>
+        <p:nvPicPr>
+          <p:cNvPr id="7" name="Image 6">
+            <a:extLst>
+              <a:ext uri="{FF2B5EF4-FFF2-40B4-BE49-F238E27FC236}">
+                <a16:creationId xmlns:a16="http://schemas.microsoft.com/office/drawing/2014/main" id="{EE3B6107-4A73-4A4E-B8A8-408396CF5F03}"/>
+              </a:ext>
+            </a:extLst>
+          </p:cNvPr>
+          <p:cNvPicPr>
+            <a:picLocks noChangeAspect="1"/>
+          </p:cNvPicPr>
+          <p:nvPr/>
+        </p:nvPicPr>
+        <p:blipFill>
+          <a:blip r:embed="rId2"/>
+          <a:stretch>
+            <a:fillRect/>
+          </a:stretch>
+        </p:blipFill>
+        <p:spPr>
+          <a:xfrm>
+            <a:off x="10423008" y="6384240"/>
+            <a:ext cx="1626117" cy="323503"/>
+          </a:xfrm>
+          <a:prstGeom prst="rect">
+            <a:avLst/>
+          </a:prstGeom>
+        </p:spPr>
+      </p:pic>
+    </p:spTree>
+    <p:extLst>
+      <p:ext uri="{BB962C8B-B14F-4D97-AF65-F5344CB8AC3E}">
+        <p14:creationId xmlns:p14="http://schemas.microsoft.com/office/powerpoint/2010/main" val="955753488"/>
+      </p:ext>
+    </p:extLst>
+  </p:cSld>
+  <p:clrMapOvr>
+    <a:masterClrMapping/>
+  </p:clrMapOvr>
+</p:sld>
+</file>
+
+<file path=ppt/slides/slide9.xml><?xml version="1.0" encoding="utf-8"?>
+<p:sld xmlns:a="http://schemas.openxmlformats.org/drawingml/2006/main" xmlns:r="http://schemas.openxmlformats.org/officeDocument/2006/relationships" xmlns:p="http://schemas.openxmlformats.org/presentationml/2006/main">
+  <p:cSld>
+    <p:spTree>
+      <p:nvGrpSpPr>
+        <p:cNvPr id="1" name=""/>
+        <p:cNvGrpSpPr/>
+        <p:nvPr/>
+      </p:nvGrpSpPr>
+      <p:grpSpPr>
+        <a:xfrm>
+          <a:off x="0" y="0"/>
+          <a:ext cx="0" cy="0"/>
+          <a:chOff x="0" y="0"/>
+          <a:chExt cx="0" cy="0"/>
+        </a:xfrm>
+      </p:grpSpPr>
+      <p:sp>
+        <p:nvSpPr>
+          <p:cNvPr id="4" name="ZoneTexte 3">
+            <a:extLst>
+              <a:ext uri="{FF2B5EF4-FFF2-40B4-BE49-F238E27FC236}">
+                <a16:creationId xmlns:a16="http://schemas.microsoft.com/office/drawing/2014/main" id="{7EFE29B9-D2A3-43FE-9483-0C9186398D0A}"/>
+              </a:ext>
+            </a:extLst>
+          </p:cNvPr>
+          <p:cNvSpPr txBox="1"/>
+          <p:nvPr/>
+        </p:nvSpPr>
+        <p:spPr>
+          <a:xfrm>
+            <a:off x="545284" y="218113"/>
+            <a:ext cx="2142381" cy="523220"/>
+          </a:xfrm>
+          <a:prstGeom prst="rect">
+            <a:avLst/>
+          </a:prstGeom>
+          <a:noFill/>
+        </p:spPr>
+        <p:txBody>
+          <a:bodyPr wrap="none" rtlCol="0">
+            <a:spAutoFit/>
+          </a:bodyPr>
+          <a:lstStyle/>
+          <a:p>
+            <a:r>
+              <a:rPr lang="fr-FR" sz="2800" dirty="0">
+                <a:solidFill>
+                  <a:srgbClr val="DC0014"/>
+                </a:solidFill>
+                <a:latin typeface="Myriad Pro" panose="020B0503030403020204" pitchFamily="34" charset="0"/>
+              </a:rPr>
+              <a:t>DIFFICULTIES</a:t>
+            </a:r>
+            <a:endParaRPr lang="fr-FR" sz="2800" dirty="0">
+              <a:latin typeface="Myriad Pro" panose="020B0503030403020204" pitchFamily="34" charset="0"/>
+            </a:endParaRPr>
+          </a:p>
+        </p:txBody>
+      </p:sp>
+      <p:cxnSp>
+        <p:nvCxnSpPr>
+          <p:cNvPr id="5" name="Connecteur droit 4">
+            <a:extLst>
+              <a:ext uri="{FF2B5EF4-FFF2-40B4-BE49-F238E27FC236}">
+                <a16:creationId xmlns:a16="http://schemas.microsoft.com/office/drawing/2014/main" id="{11EE7AEE-0C3A-41DB-B6B9-718414399470}"/>
+              </a:ext>
+            </a:extLst>
+          </p:cNvPr>
+          <p:cNvCxnSpPr>
+            <a:cxnSpLocks/>
+          </p:cNvCxnSpPr>
+          <p:nvPr/>
+        </p:nvCxnSpPr>
+        <p:spPr>
+          <a:xfrm>
+            <a:off x="-8389" y="889233"/>
+            <a:ext cx="12200389" cy="0"/>
+          </a:xfrm>
+          <a:prstGeom prst="line">
+            <a:avLst/>
+          </a:prstGeom>
+          <a:ln w="38100">
+            <a:solidFill>
+              <a:srgbClr val="E6E6E6"/>
+            </a:solidFill>
+          </a:ln>
+        </p:spPr>
+        <p:style>
+          <a:lnRef idx="1">
+            <a:schemeClr val="accent1"/>
+          </a:lnRef>
+          <a:fillRef idx="0">
+            <a:schemeClr val="accent1"/>
+          </a:fillRef>
+          <a:effectRef idx="0">
+            <a:schemeClr val="accent1"/>
+          </a:effectRef>
+          <a:fontRef idx="minor">
+            <a:schemeClr val="tx1"/>
+          </a:fontRef>
+        </p:style>
+      </p:cxnSp>
+      <p:sp>
+        <p:nvSpPr>
+          <p:cNvPr id="6" name="ZoneTexte 5">
+            <a:extLst>
+              <a:ext uri="{FF2B5EF4-FFF2-40B4-BE49-F238E27FC236}">
+                <a16:creationId xmlns:a16="http://schemas.microsoft.com/office/drawing/2014/main" id="{0CDBC43D-8EE5-46B9-8D1C-AA7C24AD1AF4}"/>
+              </a:ext>
+            </a:extLst>
+          </p:cNvPr>
+          <p:cNvSpPr txBox="1"/>
+          <p:nvPr/>
+        </p:nvSpPr>
+        <p:spPr>
+          <a:xfrm>
+            <a:off x="5945157" y="6488668"/>
+            <a:ext cx="301686" cy="369332"/>
+          </a:xfrm>
+          <a:prstGeom prst="rect">
+            <a:avLst/>
+          </a:prstGeom>
+          <a:noFill/>
+        </p:spPr>
+        <p:txBody>
+          <a:bodyPr wrap="none" rtlCol="0">
+            <a:spAutoFit/>
+          </a:bodyPr>
+          <a:lstStyle/>
+          <a:p>
+            <a:r>
+              <a:rPr lang="fr-FR" dirty="0"/>
+              <a:t>4</a:t>
+            </a:r>
+          </a:p>
+        </p:txBody>
+      </p:sp>
+      <p:pic>
+        <p:nvPicPr>
+          <p:cNvPr id="7" name="Image 6">
+            <a:extLst>
+              <a:ext uri="{FF2B5EF4-FFF2-40B4-BE49-F238E27FC236}">
+                <a16:creationId xmlns:a16="http://schemas.microsoft.com/office/drawing/2014/main" id="{EE3B6107-4A73-4A4E-B8A8-408396CF5F03}"/>
+              </a:ext>
+            </a:extLst>
+          </p:cNvPr>
+          <p:cNvPicPr>
+            <a:picLocks noChangeAspect="1"/>
+          </p:cNvPicPr>
+          <p:nvPr/>
+        </p:nvPicPr>
+        <p:blipFill>
+          <a:blip r:embed="rId2"/>
+          <a:stretch>
+            <a:fillRect/>
+          </a:stretch>
+        </p:blipFill>
+        <p:spPr>
+          <a:xfrm>
+            <a:off x="10423008" y="6384240"/>
+            <a:ext cx="1626117" cy="323503"/>
+          </a:xfrm>
+          <a:prstGeom prst="rect">
+            <a:avLst/>
+          </a:prstGeom>
+        </p:spPr>
+      </p:pic>
+      <p:sp>
+        <p:nvSpPr>
+          <p:cNvPr id="2" name="ZoneTexte 1">
+            <a:extLst>
+              <a:ext uri="{FF2B5EF4-FFF2-40B4-BE49-F238E27FC236}">
+                <a16:creationId xmlns:a16="http://schemas.microsoft.com/office/drawing/2014/main" id="{303922B1-5BAF-46ED-B5BD-F26859080A50}"/>
+              </a:ext>
+            </a:extLst>
+          </p:cNvPr>
+          <p:cNvSpPr txBox="1"/>
+          <p:nvPr/>
+        </p:nvSpPr>
+        <p:spPr>
+          <a:xfrm>
+            <a:off x="1249390" y="4648198"/>
+            <a:ext cx="2074158" cy="461665"/>
+          </a:xfrm>
+          <a:prstGeom prst="rect">
+            <a:avLst/>
+          </a:prstGeom>
+          <a:noFill/>
+        </p:spPr>
+        <p:txBody>
+          <a:bodyPr wrap="none" rtlCol="0">
+            <a:spAutoFit/>
+          </a:bodyPr>
+          <a:lstStyle/>
+          <a:p>
+            <a:r>
+              <a:rPr lang="fr-FR" sz="2400" dirty="0" err="1">
+                <a:latin typeface="Myriad Pro" panose="020B0503030403020204" pitchFamily="34" charset="0"/>
+              </a:rPr>
+              <a:t>Organizational</a:t>
+            </a:r>
+            <a:endParaRPr lang="fr-FR" sz="2400" dirty="0">
+              <a:latin typeface="Myriad Pro" panose="020B0503030403020204" pitchFamily="34" charset="0"/>
+            </a:endParaRPr>
+          </a:p>
+        </p:txBody>
+      </p:sp>
+      <p:sp>
+        <p:nvSpPr>
+          <p:cNvPr id="8" name="ZoneTexte 7">
+            <a:extLst>
+              <a:ext uri="{FF2B5EF4-FFF2-40B4-BE49-F238E27FC236}">
+                <a16:creationId xmlns:a16="http://schemas.microsoft.com/office/drawing/2014/main" id="{20132CDC-53E9-41AB-96CE-A0440655AFBA}"/>
+              </a:ext>
+            </a:extLst>
+          </p:cNvPr>
+          <p:cNvSpPr txBox="1"/>
+          <p:nvPr/>
+        </p:nvSpPr>
+        <p:spPr>
+          <a:xfrm>
+            <a:off x="5401263" y="4648200"/>
+            <a:ext cx="1381084" cy="461665"/>
+          </a:xfrm>
+          <a:prstGeom prst="rect">
+            <a:avLst/>
+          </a:prstGeom>
+          <a:noFill/>
+        </p:spPr>
+        <p:txBody>
+          <a:bodyPr wrap="none" rtlCol="0">
+            <a:spAutoFit/>
+          </a:bodyPr>
+          <a:lstStyle/>
+          <a:p>
+            <a:r>
+              <a:rPr lang="fr-FR" sz="2400" dirty="0" err="1">
+                <a:latin typeface="Myriad Pro" panose="020B0503030403020204" pitchFamily="34" charset="0"/>
+              </a:rPr>
+              <a:t>Technical</a:t>
+            </a:r>
+            <a:endParaRPr lang="fr-FR" sz="2400" dirty="0">
+              <a:latin typeface="Myriad Pro" panose="020B0503030403020204" pitchFamily="34" charset="0"/>
+            </a:endParaRPr>
+          </a:p>
+        </p:txBody>
+      </p:sp>
+      <p:sp>
+        <p:nvSpPr>
+          <p:cNvPr id="9" name="ZoneTexte 8">
+            <a:extLst>
+              <a:ext uri="{FF2B5EF4-FFF2-40B4-BE49-F238E27FC236}">
+                <a16:creationId xmlns:a16="http://schemas.microsoft.com/office/drawing/2014/main" id="{149B63AD-9B3F-4EBF-964E-EBB65F3B0B5C}"/>
+              </a:ext>
+            </a:extLst>
+          </p:cNvPr>
+          <p:cNvSpPr txBox="1"/>
+          <p:nvPr/>
+        </p:nvSpPr>
+        <p:spPr>
+          <a:xfrm>
+            <a:off x="7926415" y="4648199"/>
+            <a:ext cx="2883675" cy="461665"/>
+          </a:xfrm>
+          <a:prstGeom prst="rect">
+            <a:avLst/>
+          </a:prstGeom>
+          <a:noFill/>
+        </p:spPr>
+        <p:txBody>
+          <a:bodyPr wrap="none" rtlCol="0">
+            <a:spAutoFit/>
+          </a:bodyPr>
+          <a:lstStyle/>
+          <a:p>
+            <a:r>
+              <a:rPr lang="fr-FR" sz="2400" dirty="0">
+                <a:latin typeface="Myriad Pro" panose="020B0503030403020204" pitchFamily="34" charset="0"/>
+              </a:rPr>
+              <a:t>Project management</a:t>
+            </a:r>
+          </a:p>
+        </p:txBody>
+      </p:sp>
+    </p:spTree>
+    <p:extLst>
+      <p:ext uri="{BB962C8B-B14F-4D97-AF65-F5344CB8AC3E}">
+        <p14:creationId xmlns:p14="http://schemas.microsoft.com/office/powerpoint/2010/main" val="1257021797"/>
       </p:ext>
     </p:extLst>
   </p:cSld>

</xml_diff>

<commit_message>
MAJ Diapo Anglais Eco
</commit_message>
<xml_diff>
--- a/suivi_perso/dylan/PresentationOralBlancAnglais.pptx
+++ b/suivi_perso/dylan/PresentationOralBlancAnglais.pptx
@@ -9,12 +9,11 @@
     <p:sldId id="258" r:id="rId3"/>
     <p:sldId id="257" r:id="rId4"/>
     <p:sldId id="259" r:id="rId5"/>
-    <p:sldId id="260" r:id="rId6"/>
-    <p:sldId id="264" r:id="rId7"/>
-    <p:sldId id="262" r:id="rId8"/>
-    <p:sldId id="263" r:id="rId9"/>
-    <p:sldId id="265" r:id="rId10"/>
-    <p:sldId id="266" r:id="rId11"/>
+    <p:sldId id="262" r:id="rId6"/>
+    <p:sldId id="260" r:id="rId7"/>
+    <p:sldId id="264" r:id="rId8"/>
+    <p:sldId id="265" r:id="rId9"/>
+    <p:sldId id="266" r:id="rId10"/>
   </p:sldIdLst>
   <p:sldSz cx="12192000" cy="6858000"/>
   <p:notesSz cx="6858000" cy="9144000"/>
@@ -133,10 +132,6 @@
 </p:cmAuthorLst>
 </file>
 
-<file path=ppt/revisionInfo.xml><?xml version="1.0" encoding="utf-8"?>
-<p1510:revInfo xmlns:a="http://schemas.openxmlformats.org/drawingml/2006/main" xmlns:r="http://schemas.openxmlformats.org/officeDocument/2006/relationships" xmlns:p1510="http://schemas.microsoft.com/office/powerpoint/2015/10/main"/>
-</file>
-
 <file path=ppt/slideLayouts/slideLayout1.xml><?xml version="1.0" encoding="utf-8"?>
 <p:sldLayout xmlns:a="http://schemas.openxmlformats.org/drawingml/2006/main" xmlns:r="http://schemas.openxmlformats.org/officeDocument/2006/relationships" xmlns:p="http://schemas.openxmlformats.org/presentationml/2006/main" type="title" preserve="1">
   <p:cSld name="Diapositive de titre">
@@ -286,7 +281,7 @@
               <a:rPr lang="fr-FR" smtClean="0"/>
               <a:t>10/04/2018</a:t>
             </a:fld>
-            <a:endParaRPr lang="fr-FR"/>
+            <a:endParaRPr lang="fr-FR" dirty="0"/>
           </a:p>
         </p:txBody>
       </p:sp>
@@ -311,7 +306,7 @@
           <a:bodyPr/>
           <a:lstStyle/>
           <a:p>
-            <a:endParaRPr lang="fr-FR"/>
+            <a:endParaRPr lang="fr-FR" dirty="0"/>
           </a:p>
         </p:txBody>
       </p:sp>
@@ -340,7 +335,7 @@
               <a:rPr lang="fr-FR" smtClean="0"/>
               <a:t>‹N°›</a:t>
             </a:fld>
-            <a:endParaRPr lang="fr-FR"/>
+            <a:endParaRPr lang="fr-FR" dirty="0"/>
           </a:p>
         </p:txBody>
       </p:sp>
@@ -484,7 +479,7 @@
               <a:rPr lang="fr-FR" smtClean="0"/>
               <a:t>10/04/2018</a:t>
             </a:fld>
-            <a:endParaRPr lang="fr-FR"/>
+            <a:endParaRPr lang="fr-FR" dirty="0"/>
           </a:p>
         </p:txBody>
       </p:sp>
@@ -509,7 +504,7 @@
           <a:bodyPr/>
           <a:lstStyle/>
           <a:p>
-            <a:endParaRPr lang="fr-FR"/>
+            <a:endParaRPr lang="fr-FR" dirty="0"/>
           </a:p>
         </p:txBody>
       </p:sp>
@@ -538,7 +533,7 @@
               <a:rPr lang="fr-FR" smtClean="0"/>
               <a:t>‹N°›</a:t>
             </a:fld>
-            <a:endParaRPr lang="fr-FR"/>
+            <a:endParaRPr lang="fr-FR" dirty="0"/>
           </a:p>
         </p:txBody>
       </p:sp>
@@ -692,7 +687,7 @@
               <a:rPr lang="fr-FR" smtClean="0"/>
               <a:t>10/04/2018</a:t>
             </a:fld>
-            <a:endParaRPr lang="fr-FR"/>
+            <a:endParaRPr lang="fr-FR" dirty="0"/>
           </a:p>
         </p:txBody>
       </p:sp>
@@ -717,7 +712,7 @@
           <a:bodyPr/>
           <a:lstStyle/>
           <a:p>
-            <a:endParaRPr lang="fr-FR"/>
+            <a:endParaRPr lang="fr-FR" dirty="0"/>
           </a:p>
         </p:txBody>
       </p:sp>
@@ -746,7 +741,7 @@
               <a:rPr lang="fr-FR" smtClean="0"/>
               <a:t>‹N°›</a:t>
             </a:fld>
-            <a:endParaRPr lang="fr-FR"/>
+            <a:endParaRPr lang="fr-FR" dirty="0"/>
           </a:p>
         </p:txBody>
       </p:sp>
@@ -890,7 +885,7 @@
               <a:rPr lang="fr-FR" smtClean="0"/>
               <a:t>10/04/2018</a:t>
             </a:fld>
-            <a:endParaRPr lang="fr-FR"/>
+            <a:endParaRPr lang="fr-FR" dirty="0"/>
           </a:p>
         </p:txBody>
       </p:sp>
@@ -915,7 +910,7 @@
           <a:bodyPr/>
           <a:lstStyle/>
           <a:p>
-            <a:endParaRPr lang="fr-FR"/>
+            <a:endParaRPr lang="fr-FR" dirty="0"/>
           </a:p>
         </p:txBody>
       </p:sp>
@@ -944,7 +939,7 @@
               <a:rPr lang="fr-FR" smtClean="0"/>
               <a:t>‹N°›</a:t>
             </a:fld>
-            <a:endParaRPr lang="fr-FR"/>
+            <a:endParaRPr lang="fr-FR" dirty="0"/>
           </a:p>
         </p:txBody>
       </p:sp>
@@ -1165,7 +1160,7 @@
               <a:rPr lang="fr-FR" smtClean="0"/>
               <a:t>10/04/2018</a:t>
             </a:fld>
-            <a:endParaRPr lang="fr-FR"/>
+            <a:endParaRPr lang="fr-FR" dirty="0"/>
           </a:p>
         </p:txBody>
       </p:sp>
@@ -1190,7 +1185,7 @@
           <a:bodyPr/>
           <a:lstStyle/>
           <a:p>
-            <a:endParaRPr lang="fr-FR"/>
+            <a:endParaRPr lang="fr-FR" dirty="0"/>
           </a:p>
         </p:txBody>
       </p:sp>
@@ -1219,7 +1214,7 @@
               <a:rPr lang="fr-FR" smtClean="0"/>
               <a:t>‹N°›</a:t>
             </a:fld>
-            <a:endParaRPr lang="fr-FR"/>
+            <a:endParaRPr lang="fr-FR" dirty="0"/>
           </a:p>
         </p:txBody>
       </p:sp>
@@ -1430,7 +1425,7 @@
               <a:rPr lang="fr-FR" smtClean="0"/>
               <a:t>10/04/2018</a:t>
             </a:fld>
-            <a:endParaRPr lang="fr-FR"/>
+            <a:endParaRPr lang="fr-FR" dirty="0"/>
           </a:p>
         </p:txBody>
       </p:sp>
@@ -1455,7 +1450,7 @@
           <a:bodyPr/>
           <a:lstStyle/>
           <a:p>
-            <a:endParaRPr lang="fr-FR"/>
+            <a:endParaRPr lang="fr-FR" dirty="0"/>
           </a:p>
         </p:txBody>
       </p:sp>
@@ -1484,7 +1479,7 @@
               <a:rPr lang="fr-FR" smtClean="0"/>
               <a:t>‹N°›</a:t>
             </a:fld>
-            <a:endParaRPr lang="fr-FR"/>
+            <a:endParaRPr lang="fr-FR" dirty="0"/>
           </a:p>
         </p:txBody>
       </p:sp>
@@ -1842,7 +1837,7 @@
               <a:rPr lang="fr-FR" smtClean="0"/>
               <a:t>10/04/2018</a:t>
             </a:fld>
-            <a:endParaRPr lang="fr-FR"/>
+            <a:endParaRPr lang="fr-FR" dirty="0"/>
           </a:p>
         </p:txBody>
       </p:sp>
@@ -1867,7 +1862,7 @@
           <a:bodyPr/>
           <a:lstStyle/>
           <a:p>
-            <a:endParaRPr lang="fr-FR"/>
+            <a:endParaRPr lang="fr-FR" dirty="0"/>
           </a:p>
         </p:txBody>
       </p:sp>
@@ -1896,7 +1891,7 @@
               <a:rPr lang="fr-FR" smtClean="0"/>
               <a:t>‹N°›</a:t>
             </a:fld>
-            <a:endParaRPr lang="fr-FR"/>
+            <a:endParaRPr lang="fr-FR" dirty="0"/>
           </a:p>
         </p:txBody>
       </p:sp>
@@ -1983,7 +1978,7 @@
               <a:rPr lang="fr-FR" smtClean="0"/>
               <a:t>10/04/2018</a:t>
             </a:fld>
-            <a:endParaRPr lang="fr-FR"/>
+            <a:endParaRPr lang="fr-FR" dirty="0"/>
           </a:p>
         </p:txBody>
       </p:sp>
@@ -2008,7 +2003,7 @@
           <a:bodyPr/>
           <a:lstStyle/>
           <a:p>
-            <a:endParaRPr lang="fr-FR"/>
+            <a:endParaRPr lang="fr-FR" dirty="0"/>
           </a:p>
         </p:txBody>
       </p:sp>
@@ -2037,7 +2032,7 @@
               <a:rPr lang="fr-FR" smtClean="0"/>
               <a:t>‹N°›</a:t>
             </a:fld>
-            <a:endParaRPr lang="fr-FR"/>
+            <a:endParaRPr lang="fr-FR" dirty="0"/>
           </a:p>
         </p:txBody>
       </p:sp>
@@ -2096,7 +2091,7 @@
               <a:rPr lang="fr-FR" smtClean="0"/>
               <a:t>10/04/2018</a:t>
             </a:fld>
-            <a:endParaRPr lang="fr-FR"/>
+            <a:endParaRPr lang="fr-FR" dirty="0"/>
           </a:p>
         </p:txBody>
       </p:sp>
@@ -2121,7 +2116,7 @@
           <a:bodyPr/>
           <a:lstStyle/>
           <a:p>
-            <a:endParaRPr lang="fr-FR"/>
+            <a:endParaRPr lang="fr-FR" dirty="0"/>
           </a:p>
         </p:txBody>
       </p:sp>
@@ -2150,7 +2145,7 @@
               <a:rPr lang="fr-FR" smtClean="0"/>
               <a:t>‹N°›</a:t>
             </a:fld>
-            <a:endParaRPr lang="fr-FR"/>
+            <a:endParaRPr lang="fr-FR" dirty="0"/>
           </a:p>
         </p:txBody>
       </p:sp>
@@ -2407,7 +2402,7 @@
               <a:rPr lang="fr-FR" smtClean="0"/>
               <a:t>10/04/2018</a:t>
             </a:fld>
-            <a:endParaRPr lang="fr-FR"/>
+            <a:endParaRPr lang="fr-FR" dirty="0"/>
           </a:p>
         </p:txBody>
       </p:sp>
@@ -2432,7 +2427,7 @@
           <a:bodyPr/>
           <a:lstStyle/>
           <a:p>
-            <a:endParaRPr lang="fr-FR"/>
+            <a:endParaRPr lang="fr-FR" dirty="0"/>
           </a:p>
         </p:txBody>
       </p:sp>
@@ -2461,7 +2456,7 @@
               <a:rPr lang="fr-FR" smtClean="0"/>
               <a:t>‹N°›</a:t>
             </a:fld>
-            <a:endParaRPr lang="fr-FR"/>
+            <a:endParaRPr lang="fr-FR" dirty="0"/>
           </a:p>
         </p:txBody>
       </p:sp>
@@ -2595,7 +2590,7 @@
             </a:lvl9pPr>
           </a:lstStyle>
           <a:p>
-            <a:endParaRPr lang="fr-FR"/>
+            <a:endParaRPr lang="fr-FR" dirty="0"/>
           </a:p>
         </p:txBody>
       </p:sp>
@@ -2695,7 +2690,7 @@
               <a:rPr lang="fr-FR" smtClean="0"/>
               <a:t>10/04/2018</a:t>
             </a:fld>
-            <a:endParaRPr lang="fr-FR"/>
+            <a:endParaRPr lang="fr-FR" dirty="0"/>
           </a:p>
         </p:txBody>
       </p:sp>
@@ -2720,7 +2715,7 @@
           <a:bodyPr/>
           <a:lstStyle/>
           <a:p>
-            <a:endParaRPr lang="fr-FR"/>
+            <a:endParaRPr lang="fr-FR" dirty="0"/>
           </a:p>
         </p:txBody>
       </p:sp>
@@ -2749,7 +2744,7 @@
               <a:rPr lang="fr-FR" smtClean="0"/>
               <a:t>‹N°›</a:t>
             </a:fld>
-            <a:endParaRPr lang="fr-FR"/>
+            <a:endParaRPr lang="fr-FR" dirty="0"/>
           </a:p>
         </p:txBody>
       </p:sp>
@@ -2936,7 +2931,7 @@
               <a:rPr lang="fr-FR" smtClean="0"/>
               <a:t>10/04/2018</a:t>
             </a:fld>
-            <a:endParaRPr lang="fr-FR"/>
+            <a:endParaRPr lang="fr-FR" dirty="0"/>
           </a:p>
         </p:txBody>
       </p:sp>
@@ -2979,7 +2974,7 @@
             </a:lvl1pPr>
           </a:lstStyle>
           <a:p>
-            <a:endParaRPr lang="fr-FR"/>
+            <a:endParaRPr lang="fr-FR" dirty="0"/>
           </a:p>
         </p:txBody>
       </p:sp>
@@ -3026,7 +3021,7 @@
               <a:rPr lang="fr-FR" smtClean="0"/>
               <a:t>‹N°›</a:t>
             </a:fld>
-            <a:endParaRPr lang="fr-FR"/>
+            <a:endParaRPr lang="fr-FR" dirty="0"/>
           </a:p>
         </p:txBody>
       </p:sp>
@@ -3399,7 +3394,7 @@
           <a:lstStyle/>
           <a:p>
             <a:pPr algn="ctr"/>
-            <a:endParaRPr lang="fr-FR"/>
+            <a:endParaRPr lang="fr-FR" dirty="0"/>
           </a:p>
         </p:txBody>
       </p:sp>
@@ -3602,187 +3597,6 @@
     <p:extLst>
       <p:ext uri="{BB962C8B-B14F-4D97-AF65-F5344CB8AC3E}">
         <p14:creationId xmlns:p14="http://schemas.microsoft.com/office/powerpoint/2010/main" val="1126421333"/>
-      </p:ext>
-    </p:extLst>
-  </p:cSld>
-  <p:clrMapOvr>
-    <a:masterClrMapping/>
-  </p:clrMapOvr>
-</p:sld>
-</file>
-
-<file path=ppt/slides/slide10.xml><?xml version="1.0" encoding="utf-8"?>
-<p:sld xmlns:a="http://schemas.openxmlformats.org/drawingml/2006/main" xmlns:r="http://schemas.openxmlformats.org/officeDocument/2006/relationships" xmlns:p="http://schemas.openxmlformats.org/presentationml/2006/main">
-  <p:cSld>
-    <p:spTree>
-      <p:nvGrpSpPr>
-        <p:cNvPr id="1" name=""/>
-        <p:cNvGrpSpPr/>
-        <p:nvPr/>
-      </p:nvGrpSpPr>
-      <p:grpSpPr>
-        <a:xfrm>
-          <a:off x="0" y="0"/>
-          <a:ext cx="0" cy="0"/>
-          <a:chOff x="0" y="0"/>
-          <a:chExt cx="0" cy="0"/>
-        </a:xfrm>
-      </p:grpSpPr>
-      <p:sp>
-        <p:nvSpPr>
-          <p:cNvPr id="4" name="ZoneTexte 3">
-            <a:extLst>
-              <a:ext uri="{FF2B5EF4-FFF2-40B4-BE49-F238E27FC236}">
-                <a16:creationId xmlns:a16="http://schemas.microsoft.com/office/drawing/2014/main" id="{7EFE29B9-D2A3-43FE-9483-0C9186398D0A}"/>
-              </a:ext>
-            </a:extLst>
-          </p:cNvPr>
-          <p:cNvSpPr txBox="1"/>
-          <p:nvPr/>
-        </p:nvSpPr>
-        <p:spPr>
-          <a:xfrm>
-            <a:off x="545284" y="218113"/>
-            <a:ext cx="2211183" cy="523220"/>
-          </a:xfrm>
-          <a:prstGeom prst="rect">
-            <a:avLst/>
-          </a:prstGeom>
-          <a:noFill/>
-        </p:spPr>
-        <p:txBody>
-          <a:bodyPr wrap="none" rtlCol="0">
-            <a:spAutoFit/>
-          </a:bodyPr>
-          <a:lstStyle/>
-          <a:p>
-            <a:r>
-              <a:rPr lang="fr-FR" sz="2800" dirty="0">
-                <a:solidFill>
-                  <a:srgbClr val="DC0014"/>
-                </a:solidFill>
-                <a:latin typeface="Myriad Pro" panose="020B0503030403020204" pitchFamily="34" charset="0"/>
-              </a:rPr>
-              <a:t>CONCLUSION</a:t>
-            </a:r>
-            <a:endParaRPr lang="fr-FR" sz="2800" dirty="0">
-              <a:latin typeface="Myriad Pro" panose="020B0503030403020204" pitchFamily="34" charset="0"/>
-            </a:endParaRPr>
-          </a:p>
-        </p:txBody>
-      </p:sp>
-      <p:cxnSp>
-        <p:nvCxnSpPr>
-          <p:cNvPr id="5" name="Connecteur droit 4">
-            <a:extLst>
-              <a:ext uri="{FF2B5EF4-FFF2-40B4-BE49-F238E27FC236}">
-                <a16:creationId xmlns:a16="http://schemas.microsoft.com/office/drawing/2014/main" id="{11EE7AEE-0C3A-41DB-B6B9-718414399470}"/>
-              </a:ext>
-            </a:extLst>
-          </p:cNvPr>
-          <p:cNvCxnSpPr>
-            <a:cxnSpLocks/>
-          </p:cNvCxnSpPr>
-          <p:nvPr/>
-        </p:nvCxnSpPr>
-        <p:spPr>
-          <a:xfrm>
-            <a:off x="-8389" y="889233"/>
-            <a:ext cx="12200389" cy="0"/>
-          </a:xfrm>
-          <a:prstGeom prst="line">
-            <a:avLst/>
-          </a:prstGeom>
-          <a:ln w="38100">
-            <a:solidFill>
-              <a:srgbClr val="E6E6E6"/>
-            </a:solidFill>
-          </a:ln>
-        </p:spPr>
-        <p:style>
-          <a:lnRef idx="1">
-            <a:schemeClr val="accent1"/>
-          </a:lnRef>
-          <a:fillRef idx="0">
-            <a:schemeClr val="accent1"/>
-          </a:fillRef>
-          <a:effectRef idx="0">
-            <a:schemeClr val="accent1"/>
-          </a:effectRef>
-          <a:fontRef idx="minor">
-            <a:schemeClr val="tx1"/>
-          </a:fontRef>
-        </p:style>
-      </p:cxnSp>
-      <p:sp>
-        <p:nvSpPr>
-          <p:cNvPr id="6" name="ZoneTexte 5">
-            <a:extLst>
-              <a:ext uri="{FF2B5EF4-FFF2-40B4-BE49-F238E27FC236}">
-                <a16:creationId xmlns:a16="http://schemas.microsoft.com/office/drawing/2014/main" id="{0CDBC43D-8EE5-46B9-8D1C-AA7C24AD1AF4}"/>
-              </a:ext>
-            </a:extLst>
-          </p:cNvPr>
-          <p:cNvSpPr txBox="1"/>
-          <p:nvPr/>
-        </p:nvSpPr>
-        <p:spPr>
-          <a:xfrm>
-            <a:off x="5945157" y="6488668"/>
-            <a:ext cx="301686" cy="369332"/>
-          </a:xfrm>
-          <a:prstGeom prst="rect">
-            <a:avLst/>
-          </a:prstGeom>
-          <a:noFill/>
-        </p:spPr>
-        <p:txBody>
-          <a:bodyPr wrap="none" rtlCol="0">
-            <a:spAutoFit/>
-          </a:bodyPr>
-          <a:lstStyle/>
-          <a:p>
-            <a:r>
-              <a:rPr lang="fr-FR" dirty="0"/>
-              <a:t>4</a:t>
-            </a:r>
-          </a:p>
-        </p:txBody>
-      </p:sp>
-      <p:pic>
-        <p:nvPicPr>
-          <p:cNvPr id="7" name="Image 6">
-            <a:extLst>
-              <a:ext uri="{FF2B5EF4-FFF2-40B4-BE49-F238E27FC236}">
-                <a16:creationId xmlns:a16="http://schemas.microsoft.com/office/drawing/2014/main" id="{EE3B6107-4A73-4A4E-B8A8-408396CF5F03}"/>
-              </a:ext>
-            </a:extLst>
-          </p:cNvPr>
-          <p:cNvPicPr>
-            <a:picLocks noChangeAspect="1"/>
-          </p:cNvPicPr>
-          <p:nvPr/>
-        </p:nvPicPr>
-        <p:blipFill>
-          <a:blip r:embed="rId2"/>
-          <a:stretch>
-            <a:fillRect/>
-          </a:stretch>
-        </p:blipFill>
-        <p:spPr>
-          <a:xfrm>
-            <a:off x="10423008" y="6384240"/>
-            <a:ext cx="1626117" cy="323503"/>
-          </a:xfrm>
-          <a:prstGeom prst="rect">
-            <a:avLst/>
-          </a:prstGeom>
-        </p:spPr>
-      </p:pic>
-    </p:spTree>
-    <p:extLst>
-      <p:ext uri="{BB962C8B-B14F-4D97-AF65-F5344CB8AC3E}">
-        <p14:creationId xmlns:p14="http://schemas.microsoft.com/office/powerpoint/2010/main" val="476848265"/>
       </p:ext>
     </p:extLst>
   </p:cSld>
@@ -4199,8 +4013,8 @@
         </p:nvSpPr>
         <p:spPr>
           <a:xfrm>
-            <a:off x="596766" y="5241701"/>
-            <a:ext cx="4042645" cy="369332"/>
+            <a:off x="699717" y="5241701"/>
+            <a:ext cx="3734036" cy="338554"/>
           </a:xfrm>
           <a:prstGeom prst="rect">
             <a:avLst/>
@@ -4214,25 +4028,19 @@
           <a:lstStyle/>
           <a:p>
             <a:r>
-              <a:rPr lang="fr-FR" i="1" dirty="0" err="1">
+              <a:rPr lang="fr-FR" sz="1600" i="1" dirty="0">
                 <a:latin typeface="Myriad Pro" panose="020B0503030403020204" pitchFamily="34" charset="0"/>
               </a:rPr>
-              <a:t>Evolis</a:t>
-            </a:r>
-            <a:r>
-              <a:rPr lang="fr-FR" i="1" dirty="0">
-                <a:latin typeface="Myriad Pro" panose="020B0503030403020204" pitchFamily="34" charset="0"/>
-              </a:rPr>
-              <a:t> </a:t>
-            </a:r>
-            <a:r>
-              <a:rPr lang="fr-FR" i="1" dirty="0" err="1">
+              <a:t>Evolis </a:t>
+            </a:r>
+            <a:r>
+              <a:rPr lang="fr-FR" sz="1600" i="1" dirty="0" err="1">
                 <a:latin typeface="Myriad Pro" panose="020B0503030403020204" pitchFamily="34" charset="0"/>
               </a:rPr>
               <a:t>headquarter</a:t>
             </a:r>
             <a:r>
-              <a:rPr lang="fr-FR" i="1" dirty="0">
+              <a:rPr lang="fr-FR" sz="1600" i="1" dirty="0">
                 <a:latin typeface="Myriad Pro" panose="020B0503030403020204" pitchFamily="34" charset="0"/>
               </a:rPr>
               <a:t> in Beaucouzé, France</a:t>
@@ -4819,7 +4627,7 @@
         <p:spPr>
           <a:xfrm>
             <a:off x="4868593" y="5846294"/>
-            <a:ext cx="821059" cy="369332"/>
+            <a:ext cx="957313" cy="369332"/>
           </a:xfrm>
           <a:prstGeom prst="rect">
             <a:avLst/>
@@ -4833,20 +4641,14 @@
           <a:lstStyle/>
           <a:p>
             <a:r>
-              <a:rPr lang="fr-FR" dirty="0" err="1">
+              <a:rPr lang="fr-FR" dirty="0">
                 <a:solidFill>
                   <a:srgbClr val="DC0014"/>
                 </a:solidFill>
                 <a:latin typeface="Myriad Pro" panose="020B0503030403020204" pitchFamily="34" charset="0"/>
               </a:rPr>
-              <a:t>Health</a:t>
-            </a:r>
-            <a:endParaRPr lang="fr-FR" dirty="0">
-              <a:solidFill>
-                <a:srgbClr val="DC0014"/>
-              </a:solidFill>
-              <a:latin typeface="Myriad Pro" panose="020B0503030403020204" pitchFamily="34" charset="0"/>
-            </a:endParaRPr>
+              <a:t>Finance</a:t>
+            </a:r>
           </a:p>
         </p:txBody>
       </p:sp>
@@ -5821,16 +5623,10 @@
           <a:lstStyle/>
           <a:p>
             <a:r>
-              <a:rPr lang="fr-FR" sz="1400" i="1" dirty="0" err="1">
-                <a:latin typeface="Myriad Pro" panose="020B0503030403020204" pitchFamily="34" charset="0"/>
-              </a:rPr>
-              <a:t>Evolis</a:t>
-            </a:r>
-            <a:r>
               <a:rPr lang="fr-FR" sz="1400" i="1" dirty="0">
                 <a:latin typeface="Myriad Pro" panose="020B0503030403020204" pitchFamily="34" charset="0"/>
               </a:rPr>
-              <a:t> revenues in M€</a:t>
+              <a:t>Evolis revenues in M€</a:t>
             </a:r>
           </a:p>
         </p:txBody>
@@ -5908,6 +5704,637 @@
             </a:solidFill>
             <a:prstDash val="sysDot"/>
             <a:tailEnd type="none"/>
+          </a:ln>
+        </p:spPr>
+        <p:style>
+          <a:lnRef idx="1">
+            <a:schemeClr val="accent1"/>
+          </a:lnRef>
+          <a:fillRef idx="0">
+            <a:schemeClr val="accent1"/>
+          </a:fillRef>
+          <a:effectRef idx="0">
+            <a:schemeClr val="accent1"/>
+          </a:effectRef>
+          <a:fontRef idx="minor">
+            <a:schemeClr val="tx1"/>
+          </a:fontRef>
+        </p:style>
+      </p:cxnSp>
+      <p:sp>
+        <p:nvSpPr>
+          <p:cNvPr id="2" name="ZoneTexte 1">
+            <a:extLst>
+              <a:ext uri="{FF2B5EF4-FFF2-40B4-BE49-F238E27FC236}">
+                <a16:creationId xmlns:a16="http://schemas.microsoft.com/office/drawing/2014/main" id="{66621B71-4417-4E35-8747-40188C94DD7F}"/>
+              </a:ext>
+            </a:extLst>
+          </p:cNvPr>
+          <p:cNvSpPr txBox="1"/>
+          <p:nvPr/>
+        </p:nvSpPr>
+        <p:spPr>
+          <a:xfrm>
+            <a:off x="755887" y="5380244"/>
+            <a:ext cx="1984646" cy="369332"/>
+          </a:xfrm>
+          <a:prstGeom prst="rect">
+            <a:avLst/>
+          </a:prstGeom>
+          <a:noFill/>
+        </p:spPr>
+        <p:txBody>
+          <a:bodyPr wrap="none" rtlCol="0">
+            <a:spAutoFit/>
+          </a:bodyPr>
+          <a:lstStyle/>
+          <a:p>
+            <a:r>
+              <a:rPr lang="fr-FR" dirty="0"/>
+              <a:t>Commercial launch</a:t>
+            </a:r>
+          </a:p>
+        </p:txBody>
+      </p:sp>
+      <p:cxnSp>
+        <p:nvCxnSpPr>
+          <p:cNvPr id="26" name="Connecteur droit 25">
+            <a:extLst>
+              <a:ext uri="{FF2B5EF4-FFF2-40B4-BE49-F238E27FC236}">
+                <a16:creationId xmlns:a16="http://schemas.microsoft.com/office/drawing/2014/main" id="{BE6BD21E-7191-4C8C-889C-43226BB29AE8}"/>
+              </a:ext>
+            </a:extLst>
+          </p:cNvPr>
+          <p:cNvCxnSpPr>
+            <a:cxnSpLocks/>
+            <a:stCxn id="2" idx="3"/>
+            <a:endCxn id="10" idx="2"/>
+          </p:cNvCxnSpPr>
+          <p:nvPr/>
+        </p:nvCxnSpPr>
+        <p:spPr>
+          <a:xfrm>
+            <a:off x="2740533" y="5564910"/>
+            <a:ext cx="1090903" cy="2"/>
+          </a:xfrm>
+          <a:prstGeom prst="line">
+            <a:avLst/>
+          </a:prstGeom>
+          <a:ln w="12700">
+            <a:solidFill>
+              <a:schemeClr val="tx1"/>
+            </a:solidFill>
+          </a:ln>
+        </p:spPr>
+        <p:style>
+          <a:lnRef idx="1">
+            <a:schemeClr val="accent1"/>
+          </a:lnRef>
+          <a:fillRef idx="0">
+            <a:schemeClr val="accent1"/>
+          </a:fillRef>
+          <a:effectRef idx="0">
+            <a:schemeClr val="accent1"/>
+          </a:effectRef>
+          <a:fontRef idx="minor">
+            <a:schemeClr val="tx1"/>
+          </a:fontRef>
+        </p:style>
+      </p:cxnSp>
+      <p:sp>
+        <p:nvSpPr>
+          <p:cNvPr id="30" name="ZoneTexte 29">
+            <a:extLst>
+              <a:ext uri="{FF2B5EF4-FFF2-40B4-BE49-F238E27FC236}">
+                <a16:creationId xmlns:a16="http://schemas.microsoft.com/office/drawing/2014/main" id="{81DE5F8D-C501-422E-9184-675EE994E355}"/>
+              </a:ext>
+            </a:extLst>
+          </p:cNvPr>
+          <p:cNvSpPr txBox="1"/>
+          <p:nvPr/>
+        </p:nvSpPr>
+        <p:spPr>
+          <a:xfrm>
+            <a:off x="5168952" y="4279719"/>
+            <a:ext cx="1781257" cy="646331"/>
+          </a:xfrm>
+          <a:prstGeom prst="rect">
+            <a:avLst/>
+          </a:prstGeom>
+          <a:noFill/>
+        </p:spPr>
+        <p:txBody>
+          <a:bodyPr wrap="none" rtlCol="0">
+            <a:spAutoFit/>
+          </a:bodyPr>
+          <a:lstStyle/>
+          <a:p>
+            <a:r>
+              <a:rPr lang="fr-FR" dirty="0"/>
+              <a:t>U.S. </a:t>
+            </a:r>
+            <a:r>
+              <a:rPr lang="fr-FR" dirty="0" err="1"/>
+              <a:t>subsidiary</a:t>
+            </a:r>
+            <a:endParaRPr lang="fr-FR" dirty="0"/>
+          </a:p>
+          <a:p>
+            <a:r>
+              <a:rPr lang="fr-FR" dirty="0" err="1"/>
+              <a:t>opened</a:t>
+            </a:r>
+            <a:r>
+              <a:rPr lang="fr-FR" dirty="0"/>
+              <a:t> in Miami</a:t>
+            </a:r>
+          </a:p>
+        </p:txBody>
+      </p:sp>
+      <p:cxnSp>
+        <p:nvCxnSpPr>
+          <p:cNvPr id="32" name="Connecteur droit 31">
+            <a:extLst>
+              <a:ext uri="{FF2B5EF4-FFF2-40B4-BE49-F238E27FC236}">
+                <a16:creationId xmlns:a16="http://schemas.microsoft.com/office/drawing/2014/main" id="{0F5B23A8-7E51-4779-A523-4117B6E2CD1B}"/>
+              </a:ext>
+            </a:extLst>
+          </p:cNvPr>
+          <p:cNvCxnSpPr>
+            <a:stCxn id="30" idx="1"/>
+            <a:endCxn id="11" idx="6"/>
+          </p:cNvCxnSpPr>
+          <p:nvPr/>
+        </p:nvCxnSpPr>
+        <p:spPr>
+          <a:xfrm flipH="1">
+            <a:off x="4011436" y="4602885"/>
+            <a:ext cx="1157516" cy="2"/>
+          </a:xfrm>
+          <a:prstGeom prst="line">
+            <a:avLst/>
+          </a:prstGeom>
+          <a:ln w="12700">
+            <a:solidFill>
+              <a:schemeClr val="tx1"/>
+            </a:solidFill>
+          </a:ln>
+        </p:spPr>
+        <p:style>
+          <a:lnRef idx="1">
+            <a:schemeClr val="accent1"/>
+          </a:lnRef>
+          <a:fillRef idx="0">
+            <a:schemeClr val="accent1"/>
+          </a:fillRef>
+          <a:effectRef idx="0">
+            <a:schemeClr val="accent1"/>
+          </a:effectRef>
+          <a:fontRef idx="minor">
+            <a:schemeClr val="tx1"/>
+          </a:fontRef>
+        </p:style>
+      </p:cxnSp>
+      <p:sp>
+        <p:nvSpPr>
+          <p:cNvPr id="35" name="ZoneTexte 34">
+            <a:extLst>
+              <a:ext uri="{FF2B5EF4-FFF2-40B4-BE49-F238E27FC236}">
+                <a16:creationId xmlns:a16="http://schemas.microsoft.com/office/drawing/2014/main" id="{4B3E533C-24CF-4AE5-A1A9-F2351CA41388}"/>
+              </a:ext>
+            </a:extLst>
+          </p:cNvPr>
+          <p:cNvSpPr txBox="1"/>
+          <p:nvPr/>
+        </p:nvSpPr>
+        <p:spPr>
+          <a:xfrm>
+            <a:off x="752188" y="4006680"/>
+            <a:ext cx="2115387" cy="646331"/>
+          </a:xfrm>
+          <a:prstGeom prst="rect">
+            <a:avLst/>
+          </a:prstGeom>
+          <a:noFill/>
+        </p:spPr>
+        <p:txBody>
+          <a:bodyPr wrap="none" rtlCol="0">
+            <a:spAutoFit/>
+          </a:bodyPr>
+          <a:lstStyle/>
+          <a:p>
+            <a:r>
+              <a:rPr lang="fr-FR" dirty="0"/>
+              <a:t>Asian </a:t>
+            </a:r>
+            <a:r>
+              <a:rPr lang="fr-FR" dirty="0" err="1"/>
+              <a:t>subsidiary</a:t>
+            </a:r>
+            <a:endParaRPr lang="fr-FR" dirty="0"/>
+          </a:p>
+          <a:p>
+            <a:r>
+              <a:rPr lang="fr-FR" dirty="0" err="1"/>
+              <a:t>opened</a:t>
+            </a:r>
+            <a:r>
+              <a:rPr lang="fr-FR" dirty="0"/>
+              <a:t> in Singapore</a:t>
+            </a:r>
+          </a:p>
+        </p:txBody>
+      </p:sp>
+      <p:cxnSp>
+        <p:nvCxnSpPr>
+          <p:cNvPr id="39" name="Connecteur droit 38">
+            <a:extLst>
+              <a:ext uri="{FF2B5EF4-FFF2-40B4-BE49-F238E27FC236}">
+                <a16:creationId xmlns:a16="http://schemas.microsoft.com/office/drawing/2014/main" id="{C324B81F-26D1-48E1-9FF6-10761A568E09}"/>
+              </a:ext>
+            </a:extLst>
+          </p:cNvPr>
+          <p:cNvCxnSpPr>
+            <a:stCxn id="35" idx="3"/>
+            <a:endCxn id="14" idx="2"/>
+          </p:cNvCxnSpPr>
+          <p:nvPr/>
+        </p:nvCxnSpPr>
+        <p:spPr>
+          <a:xfrm flipV="1">
+            <a:off x="2867575" y="4326809"/>
+            <a:ext cx="963861" cy="3037"/>
+          </a:xfrm>
+          <a:prstGeom prst="line">
+            <a:avLst/>
+          </a:prstGeom>
+          <a:ln w="12700">
+            <a:solidFill>
+              <a:schemeClr val="tx1"/>
+            </a:solidFill>
+          </a:ln>
+        </p:spPr>
+        <p:style>
+          <a:lnRef idx="1">
+            <a:schemeClr val="accent1"/>
+          </a:lnRef>
+          <a:fillRef idx="0">
+            <a:schemeClr val="accent1"/>
+          </a:fillRef>
+          <a:effectRef idx="0">
+            <a:schemeClr val="accent1"/>
+          </a:effectRef>
+          <a:fontRef idx="minor">
+            <a:schemeClr val="tx1"/>
+          </a:fontRef>
+        </p:style>
+      </p:cxnSp>
+      <p:sp>
+        <p:nvSpPr>
+          <p:cNvPr id="40" name="ZoneTexte 39">
+            <a:extLst>
+              <a:ext uri="{FF2B5EF4-FFF2-40B4-BE49-F238E27FC236}">
+                <a16:creationId xmlns:a16="http://schemas.microsoft.com/office/drawing/2014/main" id="{90AD2E33-2B44-4D41-8C29-6D2464F96160}"/>
+              </a:ext>
+            </a:extLst>
+          </p:cNvPr>
+          <p:cNvSpPr txBox="1"/>
+          <p:nvPr/>
+        </p:nvSpPr>
+        <p:spPr>
+          <a:xfrm>
+            <a:off x="5168952" y="3285992"/>
+            <a:ext cx="2037737" cy="646331"/>
+          </a:xfrm>
+          <a:prstGeom prst="rect">
+            <a:avLst/>
+          </a:prstGeom>
+          <a:noFill/>
+        </p:spPr>
+        <p:txBody>
+          <a:bodyPr wrap="none" rtlCol="0">
+            <a:spAutoFit/>
+          </a:bodyPr>
+          <a:lstStyle/>
+          <a:p>
+            <a:r>
+              <a:rPr lang="fr-FR" dirty="0"/>
+              <a:t>Sales office</a:t>
+            </a:r>
+          </a:p>
+          <a:p>
+            <a:r>
+              <a:rPr lang="fr-FR" dirty="0" err="1"/>
+              <a:t>opened</a:t>
+            </a:r>
+            <a:r>
+              <a:rPr lang="fr-FR" dirty="0"/>
+              <a:t> in Shanghai</a:t>
+            </a:r>
+          </a:p>
+        </p:txBody>
+      </p:sp>
+      <p:cxnSp>
+        <p:nvCxnSpPr>
+          <p:cNvPr id="42" name="Connecteur droit 41">
+            <a:extLst>
+              <a:ext uri="{FF2B5EF4-FFF2-40B4-BE49-F238E27FC236}">
+                <a16:creationId xmlns:a16="http://schemas.microsoft.com/office/drawing/2014/main" id="{D890E45B-FC2C-4F12-98DC-FF06BF46F128}"/>
+              </a:ext>
+            </a:extLst>
+          </p:cNvPr>
+          <p:cNvCxnSpPr>
+            <a:stCxn id="40" idx="1"/>
+            <a:endCxn id="16" idx="6"/>
+          </p:cNvCxnSpPr>
+          <p:nvPr/>
+        </p:nvCxnSpPr>
+        <p:spPr>
+          <a:xfrm flipH="1">
+            <a:off x="4011436" y="3609158"/>
+            <a:ext cx="1157516" cy="1"/>
+          </a:xfrm>
+          <a:prstGeom prst="line">
+            <a:avLst/>
+          </a:prstGeom>
+          <a:ln w="12700">
+            <a:solidFill>
+              <a:schemeClr val="tx1"/>
+            </a:solidFill>
+          </a:ln>
+        </p:spPr>
+        <p:style>
+          <a:lnRef idx="1">
+            <a:schemeClr val="accent1"/>
+          </a:lnRef>
+          <a:fillRef idx="0">
+            <a:schemeClr val="accent1"/>
+          </a:fillRef>
+          <a:effectRef idx="0">
+            <a:schemeClr val="accent1"/>
+          </a:effectRef>
+          <a:fontRef idx="minor">
+            <a:schemeClr val="tx1"/>
+          </a:fontRef>
+        </p:style>
+      </p:cxnSp>
+      <p:sp>
+        <p:nvSpPr>
+          <p:cNvPr id="43" name="ZoneTexte 42">
+            <a:extLst>
+              <a:ext uri="{FF2B5EF4-FFF2-40B4-BE49-F238E27FC236}">
+                <a16:creationId xmlns:a16="http://schemas.microsoft.com/office/drawing/2014/main" id="{7DE636DB-2595-4100-B51A-3D67C0D8D549}"/>
+              </a:ext>
+            </a:extLst>
+          </p:cNvPr>
+          <p:cNvSpPr txBox="1"/>
+          <p:nvPr/>
+        </p:nvSpPr>
+        <p:spPr>
+          <a:xfrm>
+            <a:off x="752188" y="2835150"/>
+            <a:ext cx="2367379" cy="369332"/>
+          </a:xfrm>
+          <a:prstGeom prst="rect">
+            <a:avLst/>
+          </a:prstGeom>
+          <a:noFill/>
+        </p:spPr>
+        <p:txBody>
+          <a:bodyPr wrap="none" rtlCol="0">
+            <a:spAutoFit/>
+          </a:bodyPr>
+          <a:lstStyle/>
+          <a:p>
+            <a:r>
+              <a:rPr lang="fr-FR" dirty="0"/>
+              <a:t>Acquisition of </a:t>
+            </a:r>
+            <a:r>
+              <a:rPr lang="fr-FR" dirty="0" err="1"/>
+              <a:t>Sogedex</a:t>
+            </a:r>
+            <a:endParaRPr lang="fr-FR" dirty="0"/>
+          </a:p>
+        </p:txBody>
+      </p:sp>
+      <p:cxnSp>
+        <p:nvCxnSpPr>
+          <p:cNvPr id="44" name="Connecteur droit 43">
+            <a:extLst>
+              <a:ext uri="{FF2B5EF4-FFF2-40B4-BE49-F238E27FC236}">
+                <a16:creationId xmlns:a16="http://schemas.microsoft.com/office/drawing/2014/main" id="{6D43EDA3-4DF5-47C6-956F-818FA093AB5B}"/>
+              </a:ext>
+            </a:extLst>
+          </p:cNvPr>
+          <p:cNvCxnSpPr>
+            <a:cxnSpLocks/>
+            <a:stCxn id="43" idx="3"/>
+            <a:endCxn id="18" idx="2"/>
+          </p:cNvCxnSpPr>
+          <p:nvPr/>
+        </p:nvCxnSpPr>
+        <p:spPr>
+          <a:xfrm flipV="1">
+            <a:off x="3119567" y="3011663"/>
+            <a:ext cx="711869" cy="8153"/>
+          </a:xfrm>
+          <a:prstGeom prst="line">
+            <a:avLst/>
+          </a:prstGeom>
+          <a:ln w="12700">
+            <a:solidFill>
+              <a:schemeClr val="tx1"/>
+            </a:solidFill>
+          </a:ln>
+        </p:spPr>
+        <p:style>
+          <a:lnRef idx="1">
+            <a:schemeClr val="accent1"/>
+          </a:lnRef>
+          <a:fillRef idx="0">
+            <a:schemeClr val="accent1"/>
+          </a:fillRef>
+          <a:effectRef idx="0">
+            <a:schemeClr val="accent1"/>
+          </a:effectRef>
+          <a:fontRef idx="minor">
+            <a:schemeClr val="tx1"/>
+          </a:fontRef>
+        </p:style>
+      </p:cxnSp>
+      <p:sp>
+        <p:nvSpPr>
+          <p:cNvPr id="47" name="Rectangle 46">
+            <a:extLst>
+              <a:ext uri="{FF2B5EF4-FFF2-40B4-BE49-F238E27FC236}">
+                <a16:creationId xmlns:a16="http://schemas.microsoft.com/office/drawing/2014/main" id="{DB14458D-FD89-479A-8A7D-FBF05FCB81C9}"/>
+              </a:ext>
+            </a:extLst>
+          </p:cNvPr>
+          <p:cNvSpPr/>
+          <p:nvPr/>
+        </p:nvSpPr>
+        <p:spPr>
+          <a:xfrm>
+            <a:off x="5168952" y="2348656"/>
+            <a:ext cx="2662908" cy="369332"/>
+          </a:xfrm>
+          <a:prstGeom prst="rect">
+            <a:avLst/>
+          </a:prstGeom>
+        </p:spPr>
+        <p:txBody>
+          <a:bodyPr wrap="none">
+            <a:spAutoFit/>
+          </a:bodyPr>
+          <a:lstStyle/>
+          <a:p>
+            <a:r>
+              <a:rPr lang="fr-FR" dirty="0" err="1"/>
+              <a:t>Subsidiary</a:t>
+            </a:r>
+            <a:r>
+              <a:rPr lang="fr-FR" dirty="0"/>
+              <a:t> </a:t>
+            </a:r>
+            <a:r>
+              <a:rPr lang="fr-FR" dirty="0" err="1"/>
+              <a:t>opened</a:t>
+            </a:r>
+            <a:r>
+              <a:rPr lang="fr-FR" dirty="0"/>
+              <a:t> in </a:t>
+            </a:r>
+            <a:r>
+              <a:rPr lang="fr-FR" dirty="0" err="1"/>
+              <a:t>India</a:t>
+            </a:r>
+            <a:endParaRPr lang="fr-FR" dirty="0"/>
+          </a:p>
+        </p:txBody>
+      </p:sp>
+      <p:sp>
+        <p:nvSpPr>
+          <p:cNvPr id="48" name="ZoneTexte 47">
+            <a:extLst>
+              <a:ext uri="{FF2B5EF4-FFF2-40B4-BE49-F238E27FC236}">
+                <a16:creationId xmlns:a16="http://schemas.microsoft.com/office/drawing/2014/main" id="{76A3C6A8-EBF9-4555-B518-C9EAA7741B6E}"/>
+              </a:ext>
+            </a:extLst>
+          </p:cNvPr>
+          <p:cNvSpPr txBox="1"/>
+          <p:nvPr/>
+        </p:nvSpPr>
+        <p:spPr>
+          <a:xfrm>
+            <a:off x="778199" y="1835876"/>
+            <a:ext cx="1917513" cy="646331"/>
+          </a:xfrm>
+          <a:prstGeom prst="rect">
+            <a:avLst/>
+          </a:prstGeom>
+          <a:noFill/>
+        </p:spPr>
+        <p:txBody>
+          <a:bodyPr wrap="none" rtlCol="0">
+            <a:spAutoFit/>
+          </a:bodyPr>
+          <a:lstStyle/>
+          <a:p>
+            <a:r>
+              <a:rPr lang="fr-FR" dirty="0" err="1"/>
+              <a:t>Subsidiary</a:t>
+            </a:r>
+            <a:r>
+              <a:rPr lang="fr-FR" dirty="0"/>
+              <a:t> </a:t>
+            </a:r>
+            <a:r>
+              <a:rPr lang="fr-FR" dirty="0" err="1"/>
+              <a:t>opened</a:t>
+            </a:r>
+            <a:endParaRPr lang="fr-FR" dirty="0"/>
+          </a:p>
+          <a:p>
+            <a:r>
+              <a:rPr lang="fr-FR" dirty="0"/>
+              <a:t>in Shanghai</a:t>
+            </a:r>
+          </a:p>
+        </p:txBody>
+      </p:sp>
+      <p:cxnSp>
+        <p:nvCxnSpPr>
+          <p:cNvPr id="50" name="Connecteur droit 49">
+            <a:extLst>
+              <a:ext uri="{FF2B5EF4-FFF2-40B4-BE49-F238E27FC236}">
+                <a16:creationId xmlns:a16="http://schemas.microsoft.com/office/drawing/2014/main" id="{7AE6C816-C557-458B-9C93-9D1CDF3B6CDE}"/>
+              </a:ext>
+            </a:extLst>
+          </p:cNvPr>
+          <p:cNvCxnSpPr>
+            <a:stCxn id="47" idx="1"/>
+            <a:endCxn id="20" idx="6"/>
+          </p:cNvCxnSpPr>
+          <p:nvPr/>
+        </p:nvCxnSpPr>
+        <p:spPr>
+          <a:xfrm flipH="1" flipV="1">
+            <a:off x="4011436" y="2528076"/>
+            <a:ext cx="1157516" cy="5246"/>
+          </a:xfrm>
+          <a:prstGeom prst="line">
+            <a:avLst/>
+          </a:prstGeom>
+          <a:ln w="12700">
+            <a:solidFill>
+              <a:schemeClr val="tx1"/>
+            </a:solidFill>
+          </a:ln>
+        </p:spPr>
+        <p:style>
+          <a:lnRef idx="1">
+            <a:schemeClr val="accent1"/>
+          </a:lnRef>
+          <a:fillRef idx="0">
+            <a:schemeClr val="accent1"/>
+          </a:fillRef>
+          <a:effectRef idx="0">
+            <a:schemeClr val="accent1"/>
+          </a:effectRef>
+          <a:fontRef idx="minor">
+            <a:schemeClr val="tx1"/>
+          </a:fontRef>
+        </p:style>
+      </p:cxnSp>
+      <p:cxnSp>
+        <p:nvCxnSpPr>
+          <p:cNvPr id="52" name="Connecteur droit 51">
+            <a:extLst>
+              <a:ext uri="{FF2B5EF4-FFF2-40B4-BE49-F238E27FC236}">
+                <a16:creationId xmlns:a16="http://schemas.microsoft.com/office/drawing/2014/main" id="{F9EE999F-A3A0-43B9-8985-3325A82C86A0}"/>
+              </a:ext>
+            </a:extLst>
+          </p:cNvPr>
+          <p:cNvCxnSpPr>
+            <a:stCxn id="48" idx="3"/>
+            <a:endCxn id="22" idx="2"/>
+          </p:cNvCxnSpPr>
+          <p:nvPr/>
+        </p:nvCxnSpPr>
+        <p:spPr>
+          <a:xfrm>
+            <a:off x="2695712" y="2159042"/>
+            <a:ext cx="1135724" cy="2"/>
+          </a:xfrm>
+          <a:prstGeom prst="line">
+            <a:avLst/>
+          </a:prstGeom>
+          <a:ln w="12700">
+            <a:solidFill>
+              <a:schemeClr val="tx1"/>
+            </a:solidFill>
           </a:ln>
         </p:spPr>
         <p:style>
@@ -5970,7 +6397,7 @@
         <p:spPr>
           <a:xfrm>
             <a:off x="545284" y="218113"/>
-            <a:ext cx="1795684" cy="523220"/>
+            <a:ext cx="3036729" cy="523220"/>
           </a:xfrm>
           <a:prstGeom prst="rect">
             <a:avLst/>
@@ -5990,11 +6417,14 @@
                 </a:solidFill>
                 <a:latin typeface="Myriad Pro" panose="020B0503030403020204" pitchFamily="34" charset="0"/>
               </a:rPr>
-              <a:t>FIRST TASK</a:t>
-            </a:r>
-            <a:endParaRPr lang="fr-FR" sz="2800" dirty="0">
-              <a:latin typeface="Myriad Pro" panose="020B0503030403020204" pitchFamily="34" charset="0"/>
-            </a:endParaRPr>
+              <a:t>MY TASK</a:t>
+            </a:r>
+            <a:r>
+              <a:rPr lang="fr-FR" sz="2800" dirty="0">
+                <a:latin typeface="Myriad Pro" panose="020B0503030403020204" pitchFamily="34" charset="0"/>
+              </a:rPr>
+              <a:t> - GOALS</a:t>
+            </a:r>
           </a:p>
         </p:txBody>
       </p:sp>
@@ -6106,10 +6536,119 @@
           </a:prstGeom>
         </p:spPr>
       </p:pic>
+      <p:pic>
+        <p:nvPicPr>
+          <p:cNvPr id="8" name="Image 7">
+            <a:extLst>
+              <a:ext uri="{FF2B5EF4-FFF2-40B4-BE49-F238E27FC236}">
+                <a16:creationId xmlns:a16="http://schemas.microsoft.com/office/drawing/2014/main" id="{06CC9D4D-124D-46F2-9114-52F32BD3CCDF}"/>
+              </a:ext>
+            </a:extLst>
+          </p:cNvPr>
+          <p:cNvPicPr>
+            <a:picLocks noChangeAspect="1"/>
+          </p:cNvPicPr>
+          <p:nvPr/>
+        </p:nvPicPr>
+        <p:blipFill>
+          <a:blip r:embed="rId3"/>
+          <a:stretch>
+            <a:fillRect/>
+          </a:stretch>
+        </p:blipFill>
+        <p:spPr>
+          <a:xfrm>
+            <a:off x="394927" y="1455199"/>
+            <a:ext cx="5550230" cy="3947601"/>
+          </a:xfrm>
+          <a:prstGeom prst="rect">
+            <a:avLst/>
+          </a:prstGeom>
+        </p:spPr>
+      </p:pic>
+      <p:sp>
+        <p:nvSpPr>
+          <p:cNvPr id="2" name="ZoneTexte 1">
+            <a:extLst>
+              <a:ext uri="{FF2B5EF4-FFF2-40B4-BE49-F238E27FC236}">
+                <a16:creationId xmlns:a16="http://schemas.microsoft.com/office/drawing/2014/main" id="{52257530-9EC3-4A85-8FC9-870016CDD2B4}"/>
+              </a:ext>
+            </a:extLst>
+          </p:cNvPr>
+          <p:cNvSpPr txBox="1"/>
+          <p:nvPr/>
+        </p:nvSpPr>
+        <p:spPr>
+          <a:xfrm>
+            <a:off x="6824870" y="2413336"/>
+            <a:ext cx="4629729" cy="2031325"/>
+          </a:xfrm>
+          <a:prstGeom prst="rect">
+            <a:avLst/>
+          </a:prstGeom>
+          <a:noFill/>
+        </p:spPr>
+        <p:txBody>
+          <a:bodyPr wrap="none" rtlCol="0">
+            <a:spAutoFit/>
+          </a:bodyPr>
+          <a:lstStyle/>
+          <a:p>
+            <a:r>
+              <a:rPr lang="fr-FR" dirty="0"/>
+              <a:t>Speed up the </a:t>
+            </a:r>
+            <a:r>
+              <a:rPr lang="fr-FR" dirty="0" err="1"/>
+              <a:t>preparation</a:t>
+            </a:r>
+            <a:r>
+              <a:rPr lang="fr-FR" dirty="0"/>
+              <a:t> of the computer</a:t>
+            </a:r>
+          </a:p>
+          <a:p>
+            <a:endParaRPr lang="fr-FR" dirty="0"/>
+          </a:p>
+          <a:p>
+            <a:endParaRPr lang="fr-FR" dirty="0"/>
+          </a:p>
+          <a:p>
+            <a:r>
+              <a:rPr lang="fr-FR" dirty="0"/>
+              <a:t>Assure the maintenance of the IT infrastructure</a:t>
+            </a:r>
+          </a:p>
+          <a:p>
+            <a:endParaRPr lang="fr-FR" dirty="0"/>
+          </a:p>
+          <a:p>
+            <a:endParaRPr lang="fr-FR" dirty="0"/>
+          </a:p>
+          <a:p>
+            <a:r>
+              <a:rPr lang="fr-FR" dirty="0" err="1"/>
+              <a:t>Improve</a:t>
+            </a:r>
+            <a:r>
+              <a:rPr lang="fr-FR" dirty="0"/>
+              <a:t> </a:t>
+            </a:r>
+            <a:r>
+              <a:rPr lang="fr-FR" dirty="0" err="1"/>
+              <a:t>security</a:t>
+            </a:r>
+            <a:r>
+              <a:rPr lang="fr-FR" dirty="0"/>
+              <a:t> of the IT infrastructure</a:t>
+            </a:r>
+          </a:p>
+        </p:txBody>
+      </p:sp>
     </p:spTree>
     <p:extLst>
       <p:ext uri="{BB962C8B-B14F-4D97-AF65-F5344CB8AC3E}">
-        <p14:creationId xmlns:p14="http://schemas.microsoft.com/office/powerpoint/2010/main" val="2130716136"/>
+        <p14:creationId xmlns:p14="http://schemas.microsoft.com/office/powerpoint/2010/main" val="4223300681"/>
       </p:ext>
     </p:extLst>
   </p:cSld>
@@ -6151,7 +6690,7 @@
         <p:spPr>
           <a:xfrm>
             <a:off x="545284" y="218113"/>
-            <a:ext cx="1795684" cy="523220"/>
+            <a:ext cx="5579413" cy="523220"/>
           </a:xfrm>
           <a:prstGeom prst="rect">
             <a:avLst/>
@@ -6171,11 +6710,14 @@
                 </a:solidFill>
                 <a:latin typeface="Myriad Pro" panose="020B0503030403020204" pitchFamily="34" charset="0"/>
               </a:rPr>
-              <a:t>FIRST TASK</a:t>
-            </a:r>
-            <a:endParaRPr lang="fr-FR" sz="2800" dirty="0">
-              <a:latin typeface="Myriad Pro" panose="020B0503030403020204" pitchFamily="34" charset="0"/>
-            </a:endParaRPr>
+              <a:t>MY TASK</a:t>
+            </a:r>
+            <a:r>
+              <a:rPr lang="fr-FR" sz="2800" dirty="0">
+                <a:latin typeface="Myriad Pro" panose="020B0503030403020204" pitchFamily="34" charset="0"/>
+              </a:rPr>
+              <a:t> - PRODUCT CATALOGUE</a:t>
+            </a:r>
           </a:p>
         </p:txBody>
       </p:sp>
@@ -6287,10 +6829,694 @@
           </a:prstGeom>
         </p:spPr>
       </p:pic>
+      <p:pic>
+        <p:nvPicPr>
+          <p:cNvPr id="9" name="Graphique 8">
+            <a:extLst>
+              <a:ext uri="{FF2B5EF4-FFF2-40B4-BE49-F238E27FC236}">
+                <a16:creationId xmlns:a16="http://schemas.microsoft.com/office/drawing/2014/main" id="{DA5127AF-59FB-44AB-BC2E-47064960B920}"/>
+              </a:ext>
+            </a:extLst>
+          </p:cNvPr>
+          <p:cNvPicPr>
+            <a:picLocks noChangeAspect="1"/>
+          </p:cNvPicPr>
+          <p:nvPr/>
+        </p:nvPicPr>
+        <p:blipFill>
+          <a:blip r:embed="rId3">
+            <a:extLst>
+              <a:ext uri="{28A0092B-C50C-407E-A947-70E740481C1C}">
+                <a14:useLocalDpi xmlns:a14="http://schemas.microsoft.com/office/drawing/2010/main" val="0"/>
+              </a:ext>
+              <a:ext uri="{96DAC541-7B7A-43D3-8B79-37D633B846F1}">
+                <asvg:svgBlip xmlns:asvg="http://schemas.microsoft.com/office/drawing/2016/SVG/main" r:embed="rId4"/>
+              </a:ext>
+            </a:extLst>
+          </a:blip>
+          <a:stretch>
+            <a:fillRect/>
+          </a:stretch>
+        </p:blipFill>
+        <p:spPr>
+          <a:xfrm>
+            <a:off x="3180293" y="4684517"/>
+            <a:ext cx="1099584" cy="1099584"/>
+          </a:xfrm>
+          <a:prstGeom prst="rect">
+            <a:avLst/>
+          </a:prstGeom>
+        </p:spPr>
+      </p:pic>
+      <p:pic>
+        <p:nvPicPr>
+          <p:cNvPr id="13" name="Graphique 12">
+            <a:extLst>
+              <a:ext uri="{FF2B5EF4-FFF2-40B4-BE49-F238E27FC236}">
+                <a16:creationId xmlns:a16="http://schemas.microsoft.com/office/drawing/2014/main" id="{725F90DC-DF5B-43AF-9080-1BFEBE37AF73}"/>
+              </a:ext>
+            </a:extLst>
+          </p:cNvPr>
+          <p:cNvPicPr>
+            <a:picLocks noChangeAspect="1"/>
+          </p:cNvPicPr>
+          <p:nvPr/>
+        </p:nvPicPr>
+        <p:blipFill>
+          <a:blip r:embed="rId5">
+            <a:extLst>
+              <a:ext uri="{28A0092B-C50C-407E-A947-70E740481C1C}">
+                <a14:useLocalDpi xmlns:a14="http://schemas.microsoft.com/office/drawing/2010/main" val="0"/>
+              </a:ext>
+              <a:ext uri="{96DAC541-7B7A-43D3-8B79-37D633B846F1}">
+                <asvg:svgBlip xmlns:asvg="http://schemas.microsoft.com/office/drawing/2016/SVG/main" r:embed="rId6"/>
+              </a:ext>
+            </a:extLst>
+          </a:blip>
+          <a:stretch>
+            <a:fillRect/>
+          </a:stretch>
+        </p:blipFill>
+        <p:spPr>
+          <a:xfrm>
+            <a:off x="3134181" y="2648681"/>
+            <a:ext cx="1191808" cy="1191808"/>
+          </a:xfrm>
+          <a:prstGeom prst="rect">
+            <a:avLst/>
+          </a:prstGeom>
+        </p:spPr>
+      </p:pic>
+      <p:pic>
+        <p:nvPicPr>
+          <p:cNvPr id="14" name="Image 13">
+            <a:extLst>
+              <a:ext uri="{FF2B5EF4-FFF2-40B4-BE49-F238E27FC236}">
+                <a16:creationId xmlns:a16="http://schemas.microsoft.com/office/drawing/2014/main" id="{7CF084F8-2A0B-4155-B212-5E310C469398}"/>
+              </a:ext>
+            </a:extLst>
+          </p:cNvPr>
+          <p:cNvPicPr>
+            <a:picLocks noChangeAspect="1"/>
+          </p:cNvPicPr>
+          <p:nvPr/>
+        </p:nvPicPr>
+        <p:blipFill>
+          <a:blip r:embed="rId7"/>
+          <a:stretch>
+            <a:fillRect/>
+          </a:stretch>
+        </p:blipFill>
+        <p:spPr>
+          <a:xfrm>
+            <a:off x="6338637" y="1227555"/>
+            <a:ext cx="921185" cy="921185"/>
+          </a:xfrm>
+          <a:prstGeom prst="rect">
+            <a:avLst/>
+          </a:prstGeom>
+        </p:spPr>
+      </p:pic>
+      <p:sp>
+        <p:nvSpPr>
+          <p:cNvPr id="15" name="ZoneTexte 14">
+            <a:extLst>
+              <a:ext uri="{FF2B5EF4-FFF2-40B4-BE49-F238E27FC236}">
+                <a16:creationId xmlns:a16="http://schemas.microsoft.com/office/drawing/2014/main" id="{79626169-BD9A-453C-B7E5-458E111A9F50}"/>
+              </a:ext>
+            </a:extLst>
+          </p:cNvPr>
+          <p:cNvSpPr txBox="1"/>
+          <p:nvPr/>
+        </p:nvSpPr>
+        <p:spPr>
+          <a:xfrm>
+            <a:off x="3237915" y="3840489"/>
+            <a:ext cx="872355" cy="369332"/>
+          </a:xfrm>
+          <a:prstGeom prst="rect">
+            <a:avLst/>
+          </a:prstGeom>
+          <a:noFill/>
+        </p:spPr>
+        <p:txBody>
+          <a:bodyPr wrap="none" rtlCol="0">
+            <a:spAutoFit/>
+          </a:bodyPr>
+          <a:lstStyle/>
+          <a:p>
+            <a:r>
+              <a:rPr lang="fr-FR" dirty="0"/>
+              <a:t>Nomad</a:t>
+            </a:r>
+          </a:p>
+        </p:txBody>
+      </p:sp>
+      <p:sp>
+        <p:nvSpPr>
+          <p:cNvPr id="16" name="ZoneTexte 15">
+            <a:extLst>
+              <a:ext uri="{FF2B5EF4-FFF2-40B4-BE49-F238E27FC236}">
+                <a16:creationId xmlns:a16="http://schemas.microsoft.com/office/drawing/2014/main" id="{DF67989C-8C70-423A-BCE2-D17B3EA1FA82}"/>
+              </a:ext>
+            </a:extLst>
+          </p:cNvPr>
+          <p:cNvSpPr txBox="1"/>
+          <p:nvPr/>
+        </p:nvSpPr>
+        <p:spPr>
+          <a:xfrm>
+            <a:off x="3107560" y="5784101"/>
+            <a:ext cx="1133067" cy="369332"/>
+          </a:xfrm>
+          <a:prstGeom prst="rect">
+            <a:avLst/>
+          </a:prstGeom>
+          <a:noFill/>
+        </p:spPr>
+        <p:txBody>
+          <a:bodyPr wrap="none" rtlCol="0">
+            <a:spAutoFit/>
+          </a:bodyPr>
+          <a:lstStyle/>
+          <a:p>
+            <a:r>
+              <a:rPr lang="fr-FR" dirty="0" err="1"/>
+              <a:t>Sedentary</a:t>
+            </a:r>
+            <a:endParaRPr lang="fr-FR" dirty="0"/>
+          </a:p>
+        </p:txBody>
+      </p:sp>
+      <p:pic>
+        <p:nvPicPr>
+          <p:cNvPr id="17" name="Image 16">
+            <a:extLst>
+              <a:ext uri="{FF2B5EF4-FFF2-40B4-BE49-F238E27FC236}">
+                <a16:creationId xmlns:a16="http://schemas.microsoft.com/office/drawing/2014/main" id="{08D01062-0065-410B-B1BD-E4B598C17F56}"/>
+              </a:ext>
+            </a:extLst>
+          </p:cNvPr>
+          <p:cNvPicPr>
+            <a:picLocks noChangeAspect="1"/>
+          </p:cNvPicPr>
+          <p:nvPr/>
+        </p:nvPicPr>
+        <p:blipFill>
+          <a:blip r:embed="rId8"/>
+          <a:stretch>
+            <a:fillRect/>
+          </a:stretch>
+        </p:blipFill>
+        <p:spPr>
+          <a:xfrm>
+            <a:off x="4932589" y="1257309"/>
+            <a:ext cx="921185" cy="921185"/>
+          </a:xfrm>
+          <a:prstGeom prst="rect">
+            <a:avLst/>
+          </a:prstGeom>
+        </p:spPr>
+      </p:pic>
+      <p:pic>
+        <p:nvPicPr>
+          <p:cNvPr id="18" name="Image 17">
+            <a:extLst>
+              <a:ext uri="{FF2B5EF4-FFF2-40B4-BE49-F238E27FC236}">
+                <a16:creationId xmlns:a16="http://schemas.microsoft.com/office/drawing/2014/main" id="{504D458E-CAA2-4A9A-AD68-AE1DE42024EF}"/>
+              </a:ext>
+            </a:extLst>
+          </p:cNvPr>
+          <p:cNvPicPr>
+            <a:picLocks noChangeAspect="1"/>
+          </p:cNvPicPr>
+          <p:nvPr/>
+        </p:nvPicPr>
+        <p:blipFill>
+          <a:blip r:embed="rId9"/>
+          <a:stretch>
+            <a:fillRect/>
+          </a:stretch>
+        </p:blipFill>
+        <p:spPr>
+          <a:xfrm>
+            <a:off x="5017954" y="2818694"/>
+            <a:ext cx="750454" cy="851781"/>
+          </a:xfrm>
+          <a:prstGeom prst="rect">
+            <a:avLst/>
+          </a:prstGeom>
+        </p:spPr>
+      </p:pic>
+      <p:pic>
+        <p:nvPicPr>
+          <p:cNvPr id="19" name="Image 18">
+            <a:extLst>
+              <a:ext uri="{FF2B5EF4-FFF2-40B4-BE49-F238E27FC236}">
+                <a16:creationId xmlns:a16="http://schemas.microsoft.com/office/drawing/2014/main" id="{029868AD-0BC2-410B-BAE0-5F0C97789D34}"/>
+              </a:ext>
+            </a:extLst>
+          </p:cNvPr>
+          <p:cNvPicPr>
+            <a:picLocks noChangeAspect="1"/>
+          </p:cNvPicPr>
+          <p:nvPr/>
+        </p:nvPicPr>
+        <p:blipFill>
+          <a:blip r:embed="rId9"/>
+          <a:stretch>
+            <a:fillRect/>
+          </a:stretch>
+        </p:blipFill>
+        <p:spPr>
+          <a:xfrm>
+            <a:off x="5017954" y="4808418"/>
+            <a:ext cx="750454" cy="851781"/>
+          </a:xfrm>
+          <a:prstGeom prst="rect">
+            <a:avLst/>
+          </a:prstGeom>
+        </p:spPr>
+      </p:pic>
+      <p:pic>
+        <p:nvPicPr>
+          <p:cNvPr id="20" name="Image 19">
+            <a:extLst>
+              <a:ext uri="{FF2B5EF4-FFF2-40B4-BE49-F238E27FC236}">
+                <a16:creationId xmlns:a16="http://schemas.microsoft.com/office/drawing/2014/main" id="{1AA28AFF-E98E-42C1-9051-F01C142C4BE0}"/>
+              </a:ext>
+            </a:extLst>
+          </p:cNvPr>
+          <p:cNvPicPr>
+            <a:picLocks noChangeAspect="1"/>
+          </p:cNvPicPr>
+          <p:nvPr/>
+        </p:nvPicPr>
+        <p:blipFill>
+          <a:blip r:embed="rId9"/>
+          <a:stretch>
+            <a:fillRect/>
+          </a:stretch>
+        </p:blipFill>
+        <p:spPr>
+          <a:xfrm>
+            <a:off x="6424003" y="2818694"/>
+            <a:ext cx="750454" cy="851781"/>
+          </a:xfrm>
+          <a:prstGeom prst="rect">
+            <a:avLst/>
+          </a:prstGeom>
+        </p:spPr>
+      </p:pic>
+      <p:pic>
+        <p:nvPicPr>
+          <p:cNvPr id="26" name="Image 25">
+            <a:extLst>
+              <a:ext uri="{FF2B5EF4-FFF2-40B4-BE49-F238E27FC236}">
+                <a16:creationId xmlns:a16="http://schemas.microsoft.com/office/drawing/2014/main" id="{46FEF95E-E6FF-4B91-BB6B-B1425E8F18CA}"/>
+              </a:ext>
+            </a:extLst>
+          </p:cNvPr>
+          <p:cNvPicPr>
+            <a:picLocks noChangeAspect="1"/>
+          </p:cNvPicPr>
+          <p:nvPr/>
+        </p:nvPicPr>
+        <p:blipFill>
+          <a:blip r:embed="rId10">
+            <a:extLst>
+              <a:ext uri="{28A0092B-C50C-407E-A947-70E740481C1C}">
+                <a14:useLocalDpi xmlns:a14="http://schemas.microsoft.com/office/drawing/2010/main" val="0"/>
+              </a:ext>
+            </a:extLst>
+          </a:blip>
+          <a:stretch>
+            <a:fillRect/>
+          </a:stretch>
+        </p:blipFill>
+        <p:spPr>
+          <a:xfrm>
+            <a:off x="6422416" y="4838171"/>
+            <a:ext cx="752041" cy="792274"/>
+          </a:xfrm>
+          <a:prstGeom prst="rect">
+            <a:avLst/>
+          </a:prstGeom>
+        </p:spPr>
+      </p:pic>
+      <p:cxnSp>
+        <p:nvCxnSpPr>
+          <p:cNvPr id="28" name="Connecteur droit 27">
+            <a:extLst>
+              <a:ext uri="{FF2B5EF4-FFF2-40B4-BE49-F238E27FC236}">
+                <a16:creationId xmlns:a16="http://schemas.microsoft.com/office/drawing/2014/main" id="{AE6C935E-99E1-416D-AEE4-992AEDE7C5E4}"/>
+              </a:ext>
+            </a:extLst>
+          </p:cNvPr>
+          <p:cNvCxnSpPr/>
+          <p:nvPr/>
+        </p:nvCxnSpPr>
+        <p:spPr>
+          <a:xfrm>
+            <a:off x="6101603" y="1046922"/>
+            <a:ext cx="0" cy="5337318"/>
+          </a:xfrm>
+          <a:prstGeom prst="line">
+            <a:avLst/>
+          </a:prstGeom>
+          <a:ln w="12700">
+            <a:solidFill>
+              <a:srgbClr val="E6E6E6"/>
+            </a:solidFill>
+          </a:ln>
+        </p:spPr>
+        <p:style>
+          <a:lnRef idx="1">
+            <a:schemeClr val="accent1"/>
+          </a:lnRef>
+          <a:fillRef idx="0">
+            <a:schemeClr val="accent1"/>
+          </a:fillRef>
+          <a:effectRef idx="0">
+            <a:schemeClr val="accent1"/>
+          </a:effectRef>
+          <a:fontRef idx="minor">
+            <a:schemeClr val="tx1"/>
+          </a:fontRef>
+        </p:style>
+      </p:cxnSp>
+      <p:cxnSp>
+        <p:nvCxnSpPr>
+          <p:cNvPr id="29" name="Connecteur droit 28">
+            <a:extLst>
+              <a:ext uri="{FF2B5EF4-FFF2-40B4-BE49-F238E27FC236}">
+                <a16:creationId xmlns:a16="http://schemas.microsoft.com/office/drawing/2014/main" id="{62E9A0BF-463F-4F42-8714-53DC791144A6}"/>
+              </a:ext>
+            </a:extLst>
+          </p:cNvPr>
+          <p:cNvCxnSpPr/>
+          <p:nvPr/>
+        </p:nvCxnSpPr>
+        <p:spPr>
+          <a:xfrm>
+            <a:off x="4650487" y="1085189"/>
+            <a:ext cx="0" cy="5337318"/>
+          </a:xfrm>
+          <a:prstGeom prst="line">
+            <a:avLst/>
+          </a:prstGeom>
+          <a:ln w="12700">
+            <a:solidFill>
+              <a:srgbClr val="E6E6E6"/>
+            </a:solidFill>
+          </a:ln>
+        </p:spPr>
+        <p:style>
+          <a:lnRef idx="1">
+            <a:schemeClr val="accent1"/>
+          </a:lnRef>
+          <a:fillRef idx="0">
+            <a:schemeClr val="accent1"/>
+          </a:fillRef>
+          <a:effectRef idx="0">
+            <a:schemeClr val="accent1"/>
+          </a:effectRef>
+          <a:fontRef idx="minor">
+            <a:schemeClr val="tx1"/>
+          </a:fontRef>
+        </p:style>
+      </p:cxnSp>
+      <p:cxnSp>
+        <p:nvCxnSpPr>
+          <p:cNvPr id="30" name="Connecteur droit 29">
+            <a:extLst>
+              <a:ext uri="{FF2B5EF4-FFF2-40B4-BE49-F238E27FC236}">
+                <a16:creationId xmlns:a16="http://schemas.microsoft.com/office/drawing/2014/main" id="{14694F64-C0C9-4EC8-B7A5-8F9629382AB7}"/>
+              </a:ext>
+            </a:extLst>
+          </p:cNvPr>
+          <p:cNvCxnSpPr/>
+          <p:nvPr/>
+        </p:nvCxnSpPr>
+        <p:spPr>
+          <a:xfrm>
+            <a:off x="7466574" y="1046922"/>
+            <a:ext cx="0" cy="5337318"/>
+          </a:xfrm>
+          <a:prstGeom prst="line">
+            <a:avLst/>
+          </a:prstGeom>
+          <a:ln w="12700">
+            <a:solidFill>
+              <a:srgbClr val="E6E6E6"/>
+            </a:solidFill>
+          </a:ln>
+        </p:spPr>
+        <p:style>
+          <a:lnRef idx="1">
+            <a:schemeClr val="accent1"/>
+          </a:lnRef>
+          <a:fillRef idx="0">
+            <a:schemeClr val="accent1"/>
+          </a:fillRef>
+          <a:effectRef idx="0">
+            <a:schemeClr val="accent1"/>
+          </a:effectRef>
+          <a:fontRef idx="minor">
+            <a:schemeClr val="tx1"/>
+          </a:fontRef>
+        </p:style>
+      </p:cxnSp>
+      <p:cxnSp>
+        <p:nvCxnSpPr>
+          <p:cNvPr id="31" name="Connecteur droit 30">
+            <a:extLst>
+              <a:ext uri="{FF2B5EF4-FFF2-40B4-BE49-F238E27FC236}">
+                <a16:creationId xmlns:a16="http://schemas.microsoft.com/office/drawing/2014/main" id="{24C35B34-FA7E-47DE-A712-867D9A66C767}"/>
+              </a:ext>
+            </a:extLst>
+          </p:cNvPr>
+          <p:cNvCxnSpPr>
+            <a:cxnSpLocks/>
+          </p:cNvCxnSpPr>
+          <p:nvPr/>
+        </p:nvCxnSpPr>
+        <p:spPr>
+          <a:xfrm flipH="1">
+            <a:off x="3134182" y="4367509"/>
+            <a:ext cx="5742092" cy="20367"/>
+          </a:xfrm>
+          <a:prstGeom prst="line">
+            <a:avLst/>
+          </a:prstGeom>
+          <a:ln w="12700">
+            <a:solidFill>
+              <a:srgbClr val="E6E6E6"/>
+            </a:solidFill>
+          </a:ln>
+        </p:spPr>
+        <p:style>
+          <a:lnRef idx="1">
+            <a:schemeClr val="accent1"/>
+          </a:lnRef>
+          <a:fillRef idx="0">
+            <a:schemeClr val="accent1"/>
+          </a:fillRef>
+          <a:effectRef idx="0">
+            <a:schemeClr val="accent1"/>
+          </a:effectRef>
+          <a:fontRef idx="minor">
+            <a:schemeClr val="tx1"/>
+          </a:fontRef>
+        </p:style>
+      </p:cxnSp>
+      <p:cxnSp>
+        <p:nvCxnSpPr>
+          <p:cNvPr id="36" name="Connecteur droit 35">
+            <a:extLst>
+              <a:ext uri="{FF2B5EF4-FFF2-40B4-BE49-F238E27FC236}">
+                <a16:creationId xmlns:a16="http://schemas.microsoft.com/office/drawing/2014/main" id="{93B6CCBA-8176-400B-A293-079CC1F6280D}"/>
+              </a:ext>
+            </a:extLst>
+          </p:cNvPr>
+          <p:cNvCxnSpPr>
+            <a:cxnSpLocks/>
+          </p:cNvCxnSpPr>
+          <p:nvPr/>
+        </p:nvCxnSpPr>
+        <p:spPr>
+          <a:xfrm flipH="1" flipV="1">
+            <a:off x="3150074" y="2458925"/>
+            <a:ext cx="5726200" cy="6610"/>
+          </a:xfrm>
+          <a:prstGeom prst="line">
+            <a:avLst/>
+          </a:prstGeom>
+          <a:ln w="12700">
+            <a:solidFill>
+              <a:srgbClr val="E6E6E6"/>
+            </a:solidFill>
+          </a:ln>
+        </p:spPr>
+        <p:style>
+          <a:lnRef idx="1">
+            <a:schemeClr val="accent1"/>
+          </a:lnRef>
+          <a:fillRef idx="0">
+            <a:schemeClr val="accent1"/>
+          </a:fillRef>
+          <a:effectRef idx="0">
+            <a:schemeClr val="accent1"/>
+          </a:effectRef>
+          <a:fontRef idx="minor">
+            <a:schemeClr val="tx1"/>
+          </a:fontRef>
+        </p:style>
+      </p:cxnSp>
+      <p:pic>
+        <p:nvPicPr>
+          <p:cNvPr id="38" name="Graphique 37">
+            <a:extLst>
+              <a:ext uri="{FF2B5EF4-FFF2-40B4-BE49-F238E27FC236}">
+                <a16:creationId xmlns:a16="http://schemas.microsoft.com/office/drawing/2014/main" id="{AAD5C9B6-E1D6-4738-B79D-B4B1077A128D}"/>
+              </a:ext>
+            </a:extLst>
+          </p:cNvPr>
+          <p:cNvPicPr>
+            <a:picLocks noChangeAspect="1"/>
+          </p:cNvPicPr>
+          <p:nvPr/>
+        </p:nvPicPr>
+        <p:blipFill>
+          <a:blip r:embed="rId11">
+            <a:extLst>
+              <a:ext uri="{28A0092B-C50C-407E-A947-70E740481C1C}">
+                <a14:useLocalDpi xmlns:a14="http://schemas.microsoft.com/office/drawing/2010/main" val="0"/>
+              </a:ext>
+              <a:ext uri="{96DAC541-7B7A-43D3-8B79-37D633B846F1}">
+                <asvg:svgBlip xmlns:asvg="http://schemas.microsoft.com/office/drawing/2016/SVG/main" r:embed="rId12"/>
+              </a:ext>
+            </a:extLst>
+          </a:blip>
+          <a:stretch>
+            <a:fillRect/>
+          </a:stretch>
+        </p:blipFill>
+        <p:spPr>
+          <a:xfrm>
+            <a:off x="7744278" y="1227555"/>
+            <a:ext cx="945201" cy="945201"/>
+          </a:xfrm>
+          <a:prstGeom prst="rect">
+            <a:avLst/>
+          </a:prstGeom>
+        </p:spPr>
+      </p:pic>
+      <p:cxnSp>
+        <p:nvCxnSpPr>
+          <p:cNvPr id="39" name="Connecteur droit 38">
+            <a:extLst>
+              <a:ext uri="{FF2B5EF4-FFF2-40B4-BE49-F238E27FC236}">
+                <a16:creationId xmlns:a16="http://schemas.microsoft.com/office/drawing/2014/main" id="{0E94EAD8-CF3F-42F0-BEAC-B97031945D06}"/>
+              </a:ext>
+            </a:extLst>
+          </p:cNvPr>
+          <p:cNvCxnSpPr/>
+          <p:nvPr/>
+        </p:nvCxnSpPr>
+        <p:spPr>
+          <a:xfrm>
+            <a:off x="8876274" y="1085189"/>
+            <a:ext cx="0" cy="5337318"/>
+          </a:xfrm>
+          <a:prstGeom prst="line">
+            <a:avLst/>
+          </a:prstGeom>
+          <a:ln w="12700">
+            <a:solidFill>
+              <a:srgbClr val="E6E6E6"/>
+            </a:solidFill>
+          </a:ln>
+        </p:spPr>
+        <p:style>
+          <a:lnRef idx="1">
+            <a:schemeClr val="accent1"/>
+          </a:lnRef>
+          <a:fillRef idx="0">
+            <a:schemeClr val="accent1"/>
+          </a:fillRef>
+          <a:effectRef idx="0">
+            <a:schemeClr val="accent1"/>
+          </a:effectRef>
+          <a:fontRef idx="minor">
+            <a:schemeClr val="tx1"/>
+          </a:fontRef>
+        </p:style>
+      </p:cxnSp>
+      <p:pic>
+        <p:nvPicPr>
+          <p:cNvPr id="42" name="Image 41">
+            <a:extLst>
+              <a:ext uri="{FF2B5EF4-FFF2-40B4-BE49-F238E27FC236}">
+                <a16:creationId xmlns:a16="http://schemas.microsoft.com/office/drawing/2014/main" id="{AB59EBCD-EDBD-406E-8C42-5CFF61429E47}"/>
+              </a:ext>
+            </a:extLst>
+          </p:cNvPr>
+          <p:cNvPicPr>
+            <a:picLocks noChangeAspect="1"/>
+          </p:cNvPicPr>
+          <p:nvPr/>
+        </p:nvPicPr>
+        <p:blipFill>
+          <a:blip r:embed="rId9"/>
+          <a:stretch>
+            <a:fillRect/>
+          </a:stretch>
+        </p:blipFill>
+        <p:spPr>
+          <a:xfrm>
+            <a:off x="7801321" y="2818693"/>
+            <a:ext cx="750454" cy="851781"/>
+          </a:xfrm>
+          <a:prstGeom prst="rect">
+            <a:avLst/>
+          </a:prstGeom>
+        </p:spPr>
+      </p:pic>
+      <p:pic>
+        <p:nvPicPr>
+          <p:cNvPr id="43" name="Image 42">
+            <a:extLst>
+              <a:ext uri="{FF2B5EF4-FFF2-40B4-BE49-F238E27FC236}">
+                <a16:creationId xmlns:a16="http://schemas.microsoft.com/office/drawing/2014/main" id="{EBA1D017-2764-4CD6-9B02-F0849F6A899B}"/>
+              </a:ext>
+            </a:extLst>
+          </p:cNvPr>
+          <p:cNvPicPr>
+            <a:picLocks noChangeAspect="1"/>
+          </p:cNvPicPr>
+          <p:nvPr/>
+        </p:nvPicPr>
+        <p:blipFill>
+          <a:blip r:embed="rId9"/>
+          <a:stretch>
+            <a:fillRect/>
+          </a:stretch>
+        </p:blipFill>
+        <p:spPr>
+          <a:xfrm>
+            <a:off x="7801321" y="4808418"/>
+            <a:ext cx="750454" cy="851781"/>
+          </a:xfrm>
+          <a:prstGeom prst="rect">
+            <a:avLst/>
+          </a:prstGeom>
+        </p:spPr>
+      </p:pic>
     </p:spTree>
     <p:extLst>
       <p:ext uri="{BB962C8B-B14F-4D97-AF65-F5344CB8AC3E}">
-        <p14:creationId xmlns:p14="http://schemas.microsoft.com/office/powerpoint/2010/main" val="3409510597"/>
+        <p14:creationId xmlns:p14="http://schemas.microsoft.com/office/powerpoint/2010/main" val="2130716136"/>
       </p:ext>
     </p:extLst>
   </p:cSld>
@@ -6332,7 +7558,7 @@
         <p:spPr>
           <a:xfrm>
             <a:off x="545284" y="218113"/>
-            <a:ext cx="2261004" cy="523220"/>
+            <a:ext cx="3417859" cy="523220"/>
           </a:xfrm>
           <a:prstGeom prst="rect">
             <a:avLst/>
@@ -6352,11 +7578,14 @@
                 </a:solidFill>
                 <a:latin typeface="Myriad Pro" panose="020B0503030403020204" pitchFamily="34" charset="0"/>
               </a:rPr>
-              <a:t>SECOND TASK</a:t>
-            </a:r>
-            <a:endParaRPr lang="fr-FR" sz="2800" dirty="0">
-              <a:latin typeface="Myriad Pro" panose="020B0503030403020204" pitchFamily="34" charset="0"/>
-            </a:endParaRPr>
+              <a:t>MY TASK</a:t>
+            </a:r>
+            <a:r>
+              <a:rPr lang="fr-FR" sz="2800" dirty="0">
+                <a:latin typeface="Myriad Pro" panose="020B0503030403020204" pitchFamily="34" charset="0"/>
+              </a:rPr>
+              <a:t> - PACKAGE</a:t>
+            </a:r>
           </a:p>
         </p:txBody>
       </p:sp>
@@ -6468,10 +7697,307 @@
           </a:prstGeom>
         </p:spPr>
       </p:pic>
+      <p:pic>
+        <p:nvPicPr>
+          <p:cNvPr id="9" name="Image 8">
+            <a:extLst>
+              <a:ext uri="{FF2B5EF4-FFF2-40B4-BE49-F238E27FC236}">
+                <a16:creationId xmlns:a16="http://schemas.microsoft.com/office/drawing/2014/main" id="{8D726389-4A96-4405-8087-BBAE034DCC83}"/>
+              </a:ext>
+            </a:extLst>
+          </p:cNvPr>
+          <p:cNvPicPr>
+            <a:picLocks noChangeAspect="1"/>
+          </p:cNvPicPr>
+          <p:nvPr/>
+        </p:nvPicPr>
+        <p:blipFill>
+          <a:blip r:embed="rId3"/>
+          <a:stretch>
+            <a:fillRect/>
+          </a:stretch>
+        </p:blipFill>
+        <p:spPr>
+          <a:xfrm>
+            <a:off x="1768437" y="2684444"/>
+            <a:ext cx="1489112" cy="1489112"/>
+          </a:xfrm>
+          <a:prstGeom prst="rect">
+            <a:avLst/>
+          </a:prstGeom>
+        </p:spPr>
+      </p:pic>
+      <p:pic>
+        <p:nvPicPr>
+          <p:cNvPr id="3" name="Graphique 2">
+            <a:extLst>
+              <a:ext uri="{FF2B5EF4-FFF2-40B4-BE49-F238E27FC236}">
+                <a16:creationId xmlns:a16="http://schemas.microsoft.com/office/drawing/2014/main" id="{3328FDEA-FD83-42DD-8154-02933EC58306}"/>
+              </a:ext>
+            </a:extLst>
+          </p:cNvPr>
+          <p:cNvPicPr>
+            <a:picLocks noChangeAspect="1"/>
+          </p:cNvPicPr>
+          <p:nvPr/>
+        </p:nvPicPr>
+        <p:blipFill>
+          <a:blip r:embed="rId4">
+            <a:extLst>
+              <a:ext uri="{28A0092B-C50C-407E-A947-70E740481C1C}">
+                <a14:useLocalDpi xmlns:a14="http://schemas.microsoft.com/office/drawing/2010/main" val="0"/>
+              </a:ext>
+              <a:ext uri="{96DAC541-7B7A-43D3-8B79-37D633B846F1}">
+                <asvg:svgBlip xmlns:asvg="http://schemas.microsoft.com/office/drawing/2016/SVG/main" r:embed="rId5"/>
+              </a:ext>
+            </a:extLst>
+          </a:blip>
+          <a:stretch>
+            <a:fillRect/>
+          </a:stretch>
+        </p:blipFill>
+        <p:spPr>
+          <a:xfrm>
+            <a:off x="5159261" y="2684444"/>
+            <a:ext cx="1873477" cy="1873477"/>
+          </a:xfrm>
+          <a:prstGeom prst="rect">
+            <a:avLst/>
+          </a:prstGeom>
+        </p:spPr>
+      </p:pic>
+      <p:pic>
+        <p:nvPicPr>
+          <p:cNvPr id="11" name="Graphique 10">
+            <a:extLst>
+              <a:ext uri="{FF2B5EF4-FFF2-40B4-BE49-F238E27FC236}">
+                <a16:creationId xmlns:a16="http://schemas.microsoft.com/office/drawing/2014/main" id="{1C63F0FB-D376-4AA5-A9BE-668CBC27A120}"/>
+              </a:ext>
+            </a:extLst>
+          </p:cNvPr>
+          <p:cNvPicPr>
+            <a:picLocks noChangeAspect="1"/>
+          </p:cNvPicPr>
+          <p:nvPr/>
+        </p:nvPicPr>
+        <p:blipFill>
+          <a:blip r:embed="rId6">
+            <a:extLst>
+              <a:ext uri="{28A0092B-C50C-407E-A947-70E740481C1C}">
+                <a14:useLocalDpi xmlns:a14="http://schemas.microsoft.com/office/drawing/2010/main" val="0"/>
+              </a:ext>
+              <a:ext uri="{96DAC541-7B7A-43D3-8B79-37D633B846F1}">
+                <asvg:svgBlip xmlns:asvg="http://schemas.microsoft.com/office/drawing/2016/SVG/main" r:embed="rId7"/>
+              </a:ext>
+            </a:extLst>
+          </a:blip>
+          <a:stretch>
+            <a:fillRect/>
+          </a:stretch>
+        </p:blipFill>
+        <p:spPr>
+          <a:xfrm>
+            <a:off x="8940542" y="2684445"/>
+            <a:ext cx="1760796" cy="1760796"/>
+          </a:xfrm>
+          <a:prstGeom prst="rect">
+            <a:avLst/>
+          </a:prstGeom>
+        </p:spPr>
+      </p:pic>
+      <p:pic>
+        <p:nvPicPr>
+          <p:cNvPr id="15" name="Graphique 14">
+            <a:extLst>
+              <a:ext uri="{FF2B5EF4-FFF2-40B4-BE49-F238E27FC236}">
+                <a16:creationId xmlns:a16="http://schemas.microsoft.com/office/drawing/2014/main" id="{143C172A-4F50-44ED-852B-D0B93A45E406}"/>
+              </a:ext>
+            </a:extLst>
+          </p:cNvPr>
+          <p:cNvPicPr>
+            <a:picLocks noChangeAspect="1"/>
+          </p:cNvPicPr>
+          <p:nvPr/>
+        </p:nvPicPr>
+        <p:blipFill>
+          <a:blip r:embed="rId8">
+            <a:extLst>
+              <a:ext uri="{28A0092B-C50C-407E-A947-70E740481C1C}">
+                <a14:useLocalDpi xmlns:a14="http://schemas.microsoft.com/office/drawing/2010/main" val="0"/>
+              </a:ext>
+              <a:ext uri="{96DAC541-7B7A-43D3-8B79-37D633B846F1}">
+                <asvg:svgBlip xmlns:asvg="http://schemas.microsoft.com/office/drawing/2016/SVG/main" r:embed="rId9"/>
+              </a:ext>
+            </a:extLst>
+          </a:blip>
+          <a:stretch>
+            <a:fillRect/>
+          </a:stretch>
+        </p:blipFill>
+        <p:spPr>
+          <a:xfrm>
+            <a:off x="7514349" y="2956709"/>
+            <a:ext cx="944581" cy="944581"/>
+          </a:xfrm>
+          <a:prstGeom prst="rect">
+            <a:avLst/>
+          </a:prstGeom>
+        </p:spPr>
+      </p:pic>
+      <p:pic>
+        <p:nvPicPr>
+          <p:cNvPr id="17" name="Graphique 16">
+            <a:extLst>
+              <a:ext uri="{FF2B5EF4-FFF2-40B4-BE49-F238E27FC236}">
+                <a16:creationId xmlns:a16="http://schemas.microsoft.com/office/drawing/2014/main" id="{093C9E9F-D204-4C1E-8D33-96756C52A85E}"/>
+              </a:ext>
+            </a:extLst>
+          </p:cNvPr>
+          <p:cNvPicPr>
+            <a:picLocks noChangeAspect="1"/>
+          </p:cNvPicPr>
+          <p:nvPr/>
+        </p:nvPicPr>
+        <p:blipFill>
+          <a:blip r:embed="rId10">
+            <a:extLst>
+              <a:ext uri="{28A0092B-C50C-407E-A947-70E740481C1C}">
+                <a14:useLocalDpi xmlns:a14="http://schemas.microsoft.com/office/drawing/2010/main" val="0"/>
+              </a:ext>
+              <a:ext uri="{96DAC541-7B7A-43D3-8B79-37D633B846F1}">
+                <asvg:svgBlip xmlns:asvg="http://schemas.microsoft.com/office/drawing/2016/SVG/main" r:embed="rId11"/>
+              </a:ext>
+            </a:extLst>
+          </a:blip>
+          <a:stretch>
+            <a:fillRect/>
+          </a:stretch>
+        </p:blipFill>
+        <p:spPr>
+          <a:xfrm>
+            <a:off x="3733067" y="2956708"/>
+            <a:ext cx="944582" cy="944582"/>
+          </a:xfrm>
+          <a:prstGeom prst="rect">
+            <a:avLst/>
+          </a:prstGeom>
+        </p:spPr>
+      </p:pic>
+      <p:sp>
+        <p:nvSpPr>
+          <p:cNvPr id="18" name="ZoneTexte 17">
+            <a:extLst>
+              <a:ext uri="{FF2B5EF4-FFF2-40B4-BE49-F238E27FC236}">
+                <a16:creationId xmlns:a16="http://schemas.microsoft.com/office/drawing/2014/main" id="{A732001D-4A1C-49A3-88EF-85C936036CE0}"/>
+              </a:ext>
+            </a:extLst>
+          </p:cNvPr>
+          <p:cNvSpPr txBox="1"/>
+          <p:nvPr/>
+        </p:nvSpPr>
+        <p:spPr>
+          <a:xfrm>
+            <a:off x="2000256" y="4173556"/>
+            <a:ext cx="1074525" cy="369332"/>
+          </a:xfrm>
+          <a:prstGeom prst="rect">
+            <a:avLst/>
+          </a:prstGeom>
+          <a:noFill/>
+        </p:spPr>
+        <p:txBody>
+          <a:bodyPr wrap="none" rtlCol="0">
+            <a:spAutoFit/>
+          </a:bodyPr>
+          <a:lstStyle/>
+          <a:p>
+            <a:r>
+              <a:rPr lang="fr-FR" dirty="0">
+                <a:latin typeface="Myriad Pro" panose="020B0503030403020204"/>
+              </a:rPr>
+              <a:t>Software</a:t>
+            </a:r>
+          </a:p>
+        </p:txBody>
+      </p:sp>
+      <p:sp>
+        <p:nvSpPr>
+          <p:cNvPr id="19" name="ZoneTexte 18">
+            <a:extLst>
+              <a:ext uri="{FF2B5EF4-FFF2-40B4-BE49-F238E27FC236}">
+                <a16:creationId xmlns:a16="http://schemas.microsoft.com/office/drawing/2014/main" id="{FD35BF07-1C1D-40E4-84A4-5D366FBBA9CB}"/>
+              </a:ext>
+            </a:extLst>
+          </p:cNvPr>
+          <p:cNvSpPr txBox="1"/>
+          <p:nvPr/>
+        </p:nvSpPr>
+        <p:spPr>
+          <a:xfrm>
+            <a:off x="5708526" y="4445241"/>
+            <a:ext cx="766557" cy="369332"/>
+          </a:xfrm>
+          <a:prstGeom prst="rect">
+            <a:avLst/>
+          </a:prstGeom>
+          <a:noFill/>
+        </p:spPr>
+        <p:txBody>
+          <a:bodyPr wrap="none" rtlCol="0">
+            <a:spAutoFit/>
+          </a:bodyPr>
+          <a:lstStyle/>
+          <a:p>
+            <a:r>
+              <a:rPr lang="fr-FR" dirty="0">
+                <a:latin typeface="Myriad Pro" panose="020B0503030403020204"/>
+              </a:rPr>
+              <a:t>Script</a:t>
+            </a:r>
+          </a:p>
+        </p:txBody>
+      </p:sp>
+      <p:sp>
+        <p:nvSpPr>
+          <p:cNvPr id="20" name="ZoneTexte 19">
+            <a:extLst>
+              <a:ext uri="{FF2B5EF4-FFF2-40B4-BE49-F238E27FC236}">
+                <a16:creationId xmlns:a16="http://schemas.microsoft.com/office/drawing/2014/main" id="{FE454FCB-7129-4FE2-B7AD-2D5DCC1132AB}"/>
+              </a:ext>
+            </a:extLst>
+          </p:cNvPr>
+          <p:cNvSpPr txBox="1"/>
+          <p:nvPr/>
+        </p:nvSpPr>
+        <p:spPr>
+          <a:xfrm>
+            <a:off x="9310736" y="4445241"/>
+            <a:ext cx="1020408" cy="369332"/>
+          </a:xfrm>
+          <a:prstGeom prst="rect">
+            <a:avLst/>
+          </a:prstGeom>
+          <a:noFill/>
+        </p:spPr>
+        <p:txBody>
+          <a:bodyPr wrap="none" rtlCol="0">
+            <a:spAutoFit/>
+          </a:bodyPr>
+          <a:lstStyle/>
+          <a:p>
+            <a:r>
+              <a:rPr lang="fr-FR" dirty="0">
+                <a:latin typeface="Myriad Pro" panose="020B0503030403020204"/>
+              </a:rPr>
+              <a:t>Package</a:t>
+            </a:r>
+          </a:p>
+        </p:txBody>
+      </p:sp>
     </p:spTree>
     <p:extLst>
       <p:ext uri="{BB962C8B-B14F-4D97-AF65-F5344CB8AC3E}">
-        <p14:creationId xmlns:p14="http://schemas.microsoft.com/office/powerpoint/2010/main" val="4223300681"/>
+        <p14:creationId xmlns:p14="http://schemas.microsoft.com/office/powerpoint/2010/main" val="3409510597"/>
       </p:ext>
     </p:extLst>
   </p:cSld>
@@ -6513,7 +8039,7 @@
         <p:spPr>
           <a:xfrm>
             <a:off x="545284" y="218113"/>
-            <a:ext cx="2261004" cy="523220"/>
+            <a:ext cx="2142381" cy="523220"/>
           </a:xfrm>
           <a:prstGeom prst="rect">
             <a:avLst/>
@@ -6533,7 +8059,7 @@
                 </a:solidFill>
                 <a:latin typeface="Myriad Pro" panose="020B0503030403020204" pitchFamily="34" charset="0"/>
               </a:rPr>
-              <a:t>SECOND TASK</a:t>
+              <a:t>DIFFICULTIES</a:t>
             </a:r>
             <a:endParaRPr lang="fr-FR" sz="2800" dirty="0">
               <a:latin typeface="Myriad Pro" panose="020B0503030403020204" pitchFamily="34" charset="0"/>
@@ -6649,10 +8175,232 @@
           </a:prstGeom>
         </p:spPr>
       </p:pic>
+      <p:sp>
+        <p:nvSpPr>
+          <p:cNvPr id="2" name="ZoneTexte 1">
+            <a:extLst>
+              <a:ext uri="{FF2B5EF4-FFF2-40B4-BE49-F238E27FC236}">
+                <a16:creationId xmlns:a16="http://schemas.microsoft.com/office/drawing/2014/main" id="{303922B1-5BAF-46ED-B5BD-F26859080A50}"/>
+              </a:ext>
+            </a:extLst>
+          </p:cNvPr>
+          <p:cNvSpPr txBox="1"/>
+          <p:nvPr/>
+        </p:nvSpPr>
+        <p:spPr>
+          <a:xfrm>
+            <a:off x="1249389" y="4648199"/>
+            <a:ext cx="2173159" cy="461665"/>
+          </a:xfrm>
+          <a:prstGeom prst="rect">
+            <a:avLst/>
+          </a:prstGeom>
+          <a:noFill/>
+        </p:spPr>
+        <p:txBody>
+          <a:bodyPr wrap="none" rtlCol="0">
+            <a:spAutoFit/>
+          </a:bodyPr>
+          <a:lstStyle/>
+          <a:p>
+            <a:r>
+              <a:rPr lang="en-GB" sz="2400" dirty="0">
+                <a:latin typeface="Myriad Pro" panose="020B0503030403020204" pitchFamily="34" charset="0"/>
+              </a:rPr>
+              <a:t>Organizational</a:t>
+            </a:r>
+          </a:p>
+        </p:txBody>
+      </p:sp>
+      <p:sp>
+        <p:nvSpPr>
+          <p:cNvPr id="8" name="ZoneTexte 7">
+            <a:extLst>
+              <a:ext uri="{FF2B5EF4-FFF2-40B4-BE49-F238E27FC236}">
+                <a16:creationId xmlns:a16="http://schemas.microsoft.com/office/drawing/2014/main" id="{20132CDC-53E9-41AB-96CE-A0440655AFBA}"/>
+              </a:ext>
+            </a:extLst>
+          </p:cNvPr>
+          <p:cNvSpPr txBox="1"/>
+          <p:nvPr/>
+        </p:nvSpPr>
+        <p:spPr>
+          <a:xfrm>
+            <a:off x="5401263" y="4648200"/>
+            <a:ext cx="1417696" cy="461665"/>
+          </a:xfrm>
+          <a:prstGeom prst="rect">
+            <a:avLst/>
+          </a:prstGeom>
+          <a:noFill/>
+        </p:spPr>
+        <p:txBody>
+          <a:bodyPr wrap="none" rtlCol="0">
+            <a:spAutoFit/>
+          </a:bodyPr>
+          <a:lstStyle/>
+          <a:p>
+            <a:r>
+              <a:rPr lang="en-US" sz="2400" dirty="0">
+                <a:latin typeface="Myriad Pro" panose="020B0503030403020204" pitchFamily="34" charset="0"/>
+              </a:rPr>
+              <a:t>Technical</a:t>
+            </a:r>
+          </a:p>
+        </p:txBody>
+      </p:sp>
+      <p:sp>
+        <p:nvSpPr>
+          <p:cNvPr id="9" name="ZoneTexte 8">
+            <a:extLst>
+              <a:ext uri="{FF2B5EF4-FFF2-40B4-BE49-F238E27FC236}">
+                <a16:creationId xmlns:a16="http://schemas.microsoft.com/office/drawing/2014/main" id="{149B63AD-9B3F-4EBF-964E-EBB65F3B0B5C}"/>
+              </a:ext>
+            </a:extLst>
+          </p:cNvPr>
+          <p:cNvSpPr txBox="1"/>
+          <p:nvPr/>
+        </p:nvSpPr>
+        <p:spPr>
+          <a:xfrm>
+            <a:off x="8352391" y="4648199"/>
+            <a:ext cx="2883675" cy="461665"/>
+          </a:xfrm>
+          <a:prstGeom prst="rect">
+            <a:avLst/>
+          </a:prstGeom>
+          <a:noFill/>
+        </p:spPr>
+        <p:txBody>
+          <a:bodyPr wrap="none" rtlCol="0">
+            <a:spAutoFit/>
+          </a:bodyPr>
+          <a:lstStyle/>
+          <a:p>
+            <a:r>
+              <a:rPr lang="fr-FR" sz="2400" dirty="0">
+                <a:latin typeface="Myriad Pro" panose="020B0503030403020204" pitchFamily="34" charset="0"/>
+              </a:rPr>
+              <a:t>Project management</a:t>
+            </a:r>
+          </a:p>
+        </p:txBody>
+      </p:sp>
+      <p:pic>
+        <p:nvPicPr>
+          <p:cNvPr id="15" name="Image 14">
+            <a:extLst>
+              <a:ext uri="{FF2B5EF4-FFF2-40B4-BE49-F238E27FC236}">
+                <a16:creationId xmlns:a16="http://schemas.microsoft.com/office/drawing/2014/main" id="{E01BAF79-CB91-463A-8F18-AF266280BA01}"/>
+              </a:ext>
+            </a:extLst>
+          </p:cNvPr>
+          <p:cNvPicPr>
+            <a:picLocks noChangeAspect="1"/>
+          </p:cNvPicPr>
+          <p:nvPr/>
+        </p:nvPicPr>
+        <p:blipFill>
+          <a:blip r:embed="rId3">
+            <a:extLst>
+              <a:ext uri="{28A0092B-C50C-407E-A947-70E740481C1C}">
+                <a14:useLocalDpi xmlns:a14="http://schemas.microsoft.com/office/drawing/2010/main" val="0"/>
+              </a:ext>
+            </a:extLst>
+          </a:blip>
+          <a:stretch>
+            <a:fillRect/>
+          </a:stretch>
+        </p:blipFill>
+        <p:spPr>
+          <a:xfrm>
+            <a:off x="4784053" y="1732314"/>
+            <a:ext cx="2623893" cy="2623893"/>
+          </a:xfrm>
+          <a:prstGeom prst="rect">
+            <a:avLst/>
+          </a:prstGeom>
+        </p:spPr>
+      </p:pic>
+      <p:pic>
+        <p:nvPicPr>
+          <p:cNvPr id="17" name="Image 16">
+            <a:extLst>
+              <a:ext uri="{FF2B5EF4-FFF2-40B4-BE49-F238E27FC236}">
+                <a16:creationId xmlns:a16="http://schemas.microsoft.com/office/drawing/2014/main" id="{B9834A57-F5E5-4E81-BB1C-F93C2612B44A}"/>
+              </a:ext>
+            </a:extLst>
+          </p:cNvPr>
+          <p:cNvPicPr>
+            <a:picLocks noChangeAspect="1"/>
+          </p:cNvPicPr>
+          <p:nvPr/>
+        </p:nvPicPr>
+        <p:blipFill>
+          <a:blip r:embed="rId4">
+            <a:extLst>
+              <a:ext uri="{28A0092B-C50C-407E-A947-70E740481C1C}">
+                <a14:useLocalDpi xmlns:a14="http://schemas.microsoft.com/office/drawing/2010/main" val="0"/>
+              </a:ext>
+            </a:extLst>
+          </a:blip>
+          <a:stretch>
+            <a:fillRect/>
+          </a:stretch>
+        </p:blipFill>
+        <p:spPr>
+          <a:xfrm>
+            <a:off x="974521" y="1732314"/>
+            <a:ext cx="2623893" cy="2623893"/>
+          </a:xfrm>
+          <a:prstGeom prst="rect">
+            <a:avLst/>
+          </a:prstGeom>
+        </p:spPr>
+      </p:pic>
+      <p:pic>
+        <p:nvPicPr>
+          <p:cNvPr id="21" name="Graphique 20">
+            <a:extLst>
+              <a:ext uri="{FF2B5EF4-FFF2-40B4-BE49-F238E27FC236}">
+                <a16:creationId xmlns:a16="http://schemas.microsoft.com/office/drawing/2014/main" id="{6007FAE1-08E3-4FF9-92AA-D9BC28848035}"/>
+              </a:ext>
+            </a:extLst>
+          </p:cNvPr>
+          <p:cNvPicPr>
+            <a:picLocks noChangeAspect="1"/>
+          </p:cNvPicPr>
+          <p:nvPr/>
+        </p:nvPicPr>
+        <p:blipFill>
+          <a:blip r:embed="rId5">
+            <a:extLst>
+              <a:ext uri="{28A0092B-C50C-407E-A947-70E740481C1C}">
+                <a14:useLocalDpi xmlns:a14="http://schemas.microsoft.com/office/drawing/2010/main" val="0"/>
+              </a:ext>
+              <a:ext uri="{96DAC541-7B7A-43D3-8B79-37D633B846F1}">
+                <asvg:svgBlip xmlns:asvg="http://schemas.microsoft.com/office/drawing/2016/SVG/main" r:embed="rId6"/>
+              </a:ext>
+            </a:extLst>
+          </a:blip>
+          <a:stretch>
+            <a:fillRect/>
+          </a:stretch>
+        </p:blipFill>
+        <p:spPr>
+          <a:xfrm>
+            <a:off x="8593584" y="1732314"/>
+            <a:ext cx="2623893" cy="2623893"/>
+          </a:xfrm>
+          <a:prstGeom prst="rect">
+            <a:avLst/>
+          </a:prstGeom>
+        </p:spPr>
+      </p:pic>
     </p:spTree>
     <p:extLst>
       <p:ext uri="{BB962C8B-B14F-4D97-AF65-F5344CB8AC3E}">
-        <p14:creationId xmlns:p14="http://schemas.microsoft.com/office/powerpoint/2010/main" val="955753488"/>
+        <p14:creationId xmlns:p14="http://schemas.microsoft.com/office/powerpoint/2010/main" val="1257021797"/>
       </p:ext>
     </p:extLst>
   </p:cSld>
@@ -6694,7 +8442,7 @@
         <p:spPr>
           <a:xfrm>
             <a:off x="545284" y="218113"/>
-            <a:ext cx="2142381" cy="523220"/>
+            <a:ext cx="2211183" cy="523220"/>
           </a:xfrm>
           <a:prstGeom prst="rect">
             <a:avLst/>
@@ -6714,7 +8462,7 @@
                 </a:solidFill>
                 <a:latin typeface="Myriad Pro" panose="020B0503030403020204" pitchFamily="34" charset="0"/>
               </a:rPr>
-              <a:t>DIFFICULTIES</a:t>
+              <a:t>CONCLUSION</a:t>
             </a:r>
             <a:endParaRPr lang="fr-FR" sz="2800" dirty="0">
               <a:latin typeface="Myriad Pro" panose="020B0503030403020204" pitchFamily="34" charset="0"/>
@@ -6835,7 +8583,7 @@
           <p:cNvPr id="2" name="ZoneTexte 1">
             <a:extLst>
               <a:ext uri="{FF2B5EF4-FFF2-40B4-BE49-F238E27FC236}">
-                <a16:creationId xmlns:a16="http://schemas.microsoft.com/office/drawing/2014/main" id="{303922B1-5BAF-46ED-B5BD-F26859080A50}"/>
+                <a16:creationId xmlns:a16="http://schemas.microsoft.com/office/drawing/2014/main" id="{BA1981B7-A707-44F7-A10A-7EE27E31D8B9}"/>
               </a:ext>
             </a:extLst>
           </p:cNvPr>
@@ -6844,8 +8592,8 @@
         </p:nvSpPr>
         <p:spPr>
           <a:xfrm>
-            <a:off x="1249390" y="4648198"/>
-            <a:ext cx="2074158" cy="461665"/>
+            <a:off x="3256344" y="2350123"/>
+            <a:ext cx="5377626" cy="2677656"/>
           </a:xfrm>
           <a:prstGeom prst="rect">
             <a:avLst/>
@@ -6858,91 +8606,79 @@
           </a:bodyPr>
           <a:lstStyle/>
           <a:p>
-            <a:r>
-              <a:rPr lang="fr-FR" sz="2400" dirty="0" err="1">
-                <a:latin typeface="Myriad Pro" panose="020B0503030403020204" pitchFamily="34" charset="0"/>
-              </a:rPr>
-              <a:t>Organizational</a:t>
-            </a:r>
-            <a:endParaRPr lang="fr-FR" sz="2400" dirty="0">
-              <a:latin typeface="Myriad Pro" panose="020B0503030403020204" pitchFamily="34" charset="0"/>
-            </a:endParaRPr>
-          </a:p>
-        </p:txBody>
-      </p:sp>
-      <p:sp>
-        <p:nvSpPr>
-          <p:cNvPr id="8" name="ZoneTexte 7">
-            <a:extLst>
-              <a:ext uri="{FF2B5EF4-FFF2-40B4-BE49-F238E27FC236}">
-                <a16:creationId xmlns:a16="http://schemas.microsoft.com/office/drawing/2014/main" id="{20132CDC-53E9-41AB-96CE-A0440655AFBA}"/>
-              </a:ext>
-            </a:extLst>
-          </p:cNvPr>
-          <p:cNvSpPr txBox="1"/>
-          <p:nvPr/>
-        </p:nvSpPr>
-        <p:spPr>
-          <a:xfrm>
-            <a:off x="5401263" y="4648200"/>
-            <a:ext cx="1381084" cy="461665"/>
-          </a:xfrm>
-          <a:prstGeom prst="rect">
-            <a:avLst/>
-          </a:prstGeom>
-          <a:noFill/>
-        </p:spPr>
-        <p:txBody>
-          <a:bodyPr wrap="none" rtlCol="0">
-            <a:spAutoFit/>
-          </a:bodyPr>
-          <a:lstStyle/>
-          <a:p>
-            <a:r>
-              <a:rPr lang="fr-FR" sz="2400" dirty="0" err="1">
-                <a:latin typeface="Myriad Pro" panose="020B0503030403020204" pitchFamily="34" charset="0"/>
-              </a:rPr>
-              <a:t>Technical</a:t>
-            </a:r>
-            <a:endParaRPr lang="fr-FR" sz="2400" dirty="0">
-              <a:latin typeface="Myriad Pro" panose="020B0503030403020204" pitchFamily="34" charset="0"/>
-            </a:endParaRPr>
-          </a:p>
-        </p:txBody>
-      </p:sp>
-      <p:sp>
-        <p:nvSpPr>
-          <p:cNvPr id="9" name="ZoneTexte 8">
-            <a:extLst>
-              <a:ext uri="{FF2B5EF4-FFF2-40B4-BE49-F238E27FC236}">
-                <a16:creationId xmlns:a16="http://schemas.microsoft.com/office/drawing/2014/main" id="{149B63AD-9B3F-4EBF-964E-EBB65F3B0B5C}"/>
-              </a:ext>
-            </a:extLst>
-          </p:cNvPr>
-          <p:cNvSpPr txBox="1"/>
-          <p:nvPr/>
-        </p:nvSpPr>
-        <p:spPr>
-          <a:xfrm>
-            <a:off x="7926415" y="4648199"/>
-            <a:ext cx="2883675" cy="461665"/>
-          </a:xfrm>
-          <a:prstGeom prst="rect">
-            <a:avLst/>
-          </a:prstGeom>
-          <a:noFill/>
-        </p:spPr>
-        <p:txBody>
-          <a:bodyPr wrap="none" rtlCol="0">
-            <a:spAutoFit/>
-          </a:bodyPr>
-          <a:lstStyle/>
-          <a:p>
-            <a:r>
-              <a:rPr lang="fr-FR" sz="2400" dirty="0">
-                <a:latin typeface="Myriad Pro" panose="020B0503030403020204" pitchFamily="34" charset="0"/>
-              </a:rPr>
-              <a:t>Project management</a:t>
+            <a:pPr marL="342900" indent="-342900">
+              <a:buFont typeface="Arial" panose="020B0604020202020204" pitchFamily="34" charset="0"/>
+              <a:buChar char="•"/>
+            </a:pPr>
+            <a:r>
+              <a:rPr lang="fr-FR" sz="2400" dirty="0"/>
+              <a:t>A real </a:t>
+            </a:r>
+            <a:r>
+              <a:rPr lang="fr-FR" sz="2400" dirty="0" err="1"/>
+              <a:t>enterprise</a:t>
+            </a:r>
+            <a:r>
+              <a:rPr lang="fr-FR" sz="2400" dirty="0"/>
+              <a:t> </a:t>
+            </a:r>
+            <a:r>
+              <a:rPr lang="fr-FR" sz="2400" dirty="0" err="1"/>
+              <a:t>need</a:t>
+            </a:r>
+            <a:endParaRPr lang="fr-FR" sz="2400" dirty="0"/>
+          </a:p>
+          <a:p>
+            <a:endParaRPr lang="fr-FR" sz="2400" dirty="0"/>
+          </a:p>
+          <a:p>
+            <a:endParaRPr lang="fr-FR" sz="2400" dirty="0"/>
+          </a:p>
+          <a:p>
+            <a:pPr marL="342900" indent="-342900">
+              <a:buFont typeface="Arial" panose="020B0604020202020204" pitchFamily="34" charset="0"/>
+              <a:buChar char="•"/>
+            </a:pPr>
+            <a:r>
+              <a:rPr lang="fr-FR" sz="2400" dirty="0"/>
+              <a:t>Project </a:t>
+            </a:r>
+            <a:r>
+              <a:rPr lang="fr-FR" sz="2400" dirty="0" err="1"/>
+              <a:t>realized</a:t>
+            </a:r>
+            <a:r>
+              <a:rPr lang="fr-FR" sz="2400" dirty="0"/>
+              <a:t> </a:t>
+            </a:r>
+            <a:r>
+              <a:rPr lang="fr-FR" sz="2400" dirty="0" err="1"/>
+              <a:t>despite</a:t>
+            </a:r>
+            <a:r>
+              <a:rPr lang="fr-FR" sz="2400" dirty="0"/>
+              <a:t> the </a:t>
+            </a:r>
+            <a:r>
+              <a:rPr lang="fr-FR" sz="2400" dirty="0" err="1"/>
+              <a:t>constraints</a:t>
+            </a:r>
+            <a:endParaRPr lang="fr-FR" sz="2400" dirty="0"/>
+          </a:p>
+          <a:p>
+            <a:endParaRPr lang="fr-FR" sz="2400" dirty="0"/>
+          </a:p>
+          <a:p>
+            <a:endParaRPr lang="fr-FR" sz="2400" dirty="0"/>
+          </a:p>
+          <a:p>
+            <a:pPr marL="342900" indent="-342900">
+              <a:buFont typeface="Arial" panose="020B0604020202020204" pitchFamily="34" charset="0"/>
+              <a:buChar char="•"/>
+            </a:pPr>
+            <a:r>
+              <a:rPr lang="fr-FR" sz="2400" dirty="0"/>
+              <a:t>I.T. culture</a:t>
             </a:r>
           </a:p>
         </p:txBody>
@@ -6950,7 +8686,7 @@
     </p:spTree>
     <p:extLst>
       <p:ext uri="{BB962C8B-B14F-4D97-AF65-F5344CB8AC3E}">
-        <p14:creationId xmlns:p14="http://schemas.microsoft.com/office/powerpoint/2010/main" val="1257021797"/>
+        <p14:creationId xmlns:p14="http://schemas.microsoft.com/office/powerpoint/2010/main" val="476848265"/>
       </p:ext>
     </p:extLst>
   </p:cSld>

</xml_diff>